<commit_message>
Complete Databricks Associate Course
</commit_message>
<xml_diff>
--- a/MyNotes/SonarQube/SonarQube.pptx
+++ b/MyNotes/SonarQube/SonarQube.pptx
@@ -9,16 +9,18 @@
     <p:sldId id="263" r:id="rId3"/>
     <p:sldId id="265" r:id="rId4"/>
     <p:sldId id="266" r:id="rId5"/>
-    <p:sldId id="267" r:id="rId6"/>
-    <p:sldId id="268" r:id="rId7"/>
-    <p:sldId id="269" r:id="rId8"/>
-    <p:sldId id="270" r:id="rId9"/>
-    <p:sldId id="264" r:id="rId10"/>
-    <p:sldId id="274" r:id="rId11"/>
-    <p:sldId id="272" r:id="rId12"/>
-    <p:sldId id="275" r:id="rId13"/>
-    <p:sldId id="273" r:id="rId14"/>
-    <p:sldId id="271" r:id="rId15"/>
+    <p:sldId id="276" r:id="rId6"/>
+    <p:sldId id="267" r:id="rId7"/>
+    <p:sldId id="268" r:id="rId8"/>
+    <p:sldId id="269" r:id="rId9"/>
+    <p:sldId id="270" r:id="rId10"/>
+    <p:sldId id="264" r:id="rId11"/>
+    <p:sldId id="274" r:id="rId12"/>
+    <p:sldId id="272" r:id="rId13"/>
+    <p:sldId id="275" r:id="rId14"/>
+    <p:sldId id="277" r:id="rId15"/>
+    <p:sldId id="273" r:id="rId16"/>
+    <p:sldId id="271" r:id="rId17"/>
   </p:sldIdLst>
   <p:sldSz cx="12192000" cy="6858000"/>
   <p:notesSz cx="6858000" cy="9144000"/>
@@ -1509,7 +1511,7 @@
           <a:p>
             <a:fld id="{81F9330C-0A3B-E743-8965-F97E7BC157CF}" type="datetimeFigureOut">
               <a:rPr lang="en-GB" smtClean="0"/>
-              <a:t>02/04/2023</a:t>
+              <a:t>16/06/2023</a:t>
             </a:fld>
             <a:endParaRPr lang="en-GB"/>
           </a:p>
@@ -1551,7 +1553,7 @@
           <a:p>
             <a:fld id="{C3E2FF01-B573-E64C-A82C-C2CA19578300}" type="slidenum">
               <a:rPr lang="en-GB" smtClean="0"/>
-              <a:t>‹N›</a:t>
+              <a:t>‹#›</a:t>
             </a:fld>
             <a:endParaRPr lang="en-GB"/>
           </a:p>
@@ -1674,7 +1676,7 @@
           <a:p>
             <a:fld id="{81F9330C-0A3B-E743-8965-F97E7BC157CF}" type="datetimeFigureOut">
               <a:rPr lang="en-GB" smtClean="0"/>
-              <a:t>02/04/2023</a:t>
+              <a:t>16/06/2023</a:t>
             </a:fld>
             <a:endParaRPr lang="en-GB"/>
           </a:p>
@@ -1716,7 +1718,7 @@
           <a:p>
             <a:fld id="{C3E2FF01-B573-E64C-A82C-C2CA19578300}" type="slidenum">
               <a:rPr lang="en-GB" smtClean="0"/>
-              <a:t>‹N›</a:t>
+              <a:t>‹#›</a:t>
             </a:fld>
             <a:endParaRPr lang="en-GB"/>
           </a:p>
@@ -1849,7 +1851,7 @@
           <a:p>
             <a:fld id="{81F9330C-0A3B-E743-8965-F97E7BC157CF}" type="datetimeFigureOut">
               <a:rPr lang="en-GB" smtClean="0"/>
-              <a:t>02/04/2023</a:t>
+              <a:t>16/06/2023</a:t>
             </a:fld>
             <a:endParaRPr lang="en-GB"/>
           </a:p>
@@ -1891,7 +1893,7 @@
           <a:p>
             <a:fld id="{C3E2FF01-B573-E64C-A82C-C2CA19578300}" type="slidenum">
               <a:rPr lang="en-GB" smtClean="0"/>
-              <a:t>‹N›</a:t>
+              <a:t>‹#›</a:t>
             </a:fld>
             <a:endParaRPr lang="en-GB"/>
           </a:p>
@@ -2014,7 +2016,7 @@
           <a:p>
             <a:fld id="{81F9330C-0A3B-E743-8965-F97E7BC157CF}" type="datetimeFigureOut">
               <a:rPr lang="en-GB" smtClean="0"/>
-              <a:t>02/04/2023</a:t>
+              <a:t>16/06/2023</a:t>
             </a:fld>
             <a:endParaRPr lang="en-GB"/>
           </a:p>
@@ -2056,7 +2058,7 @@
           <a:p>
             <a:fld id="{C3E2FF01-B573-E64C-A82C-C2CA19578300}" type="slidenum">
               <a:rPr lang="en-GB" smtClean="0"/>
-              <a:t>‹N›</a:t>
+              <a:t>‹#›</a:t>
             </a:fld>
             <a:endParaRPr lang="en-GB"/>
           </a:p>
@@ -2255,7 +2257,7 @@
           <a:p>
             <a:fld id="{81F9330C-0A3B-E743-8965-F97E7BC157CF}" type="datetimeFigureOut">
               <a:rPr lang="en-GB" smtClean="0"/>
-              <a:t>02/04/2023</a:t>
+              <a:t>16/06/2023</a:t>
             </a:fld>
             <a:endParaRPr lang="en-GB"/>
           </a:p>
@@ -2297,7 +2299,7 @@
           <a:p>
             <a:fld id="{C3E2FF01-B573-E64C-A82C-C2CA19578300}" type="slidenum">
               <a:rPr lang="en-GB" smtClean="0"/>
-              <a:t>‹N›</a:t>
+              <a:t>‹#›</a:t>
             </a:fld>
             <a:endParaRPr lang="en-GB"/>
           </a:p>
@@ -2482,7 +2484,7 @@
           <a:p>
             <a:fld id="{81F9330C-0A3B-E743-8965-F97E7BC157CF}" type="datetimeFigureOut">
               <a:rPr lang="en-GB" smtClean="0"/>
-              <a:t>02/04/2023</a:t>
+              <a:t>16/06/2023</a:t>
             </a:fld>
             <a:endParaRPr lang="en-GB"/>
           </a:p>
@@ -2524,7 +2526,7 @@
           <a:p>
             <a:fld id="{C3E2FF01-B573-E64C-A82C-C2CA19578300}" type="slidenum">
               <a:rPr lang="en-GB" smtClean="0"/>
-              <a:t>‹N›</a:t>
+              <a:t>‹#›</a:t>
             </a:fld>
             <a:endParaRPr lang="en-GB"/>
           </a:p>
@@ -2844,7 +2846,7 @@
           <a:p>
             <a:fld id="{81F9330C-0A3B-E743-8965-F97E7BC157CF}" type="datetimeFigureOut">
               <a:rPr lang="en-GB" smtClean="0"/>
-              <a:t>02/04/2023</a:t>
+              <a:t>16/06/2023</a:t>
             </a:fld>
             <a:endParaRPr lang="en-GB"/>
           </a:p>
@@ -2886,7 +2888,7 @@
           <a:p>
             <a:fld id="{C3E2FF01-B573-E64C-A82C-C2CA19578300}" type="slidenum">
               <a:rPr lang="en-GB" smtClean="0"/>
-              <a:t>‹N›</a:t>
+              <a:t>‹#›</a:t>
             </a:fld>
             <a:endParaRPr lang="en-GB"/>
           </a:p>
@@ -2957,7 +2959,7 @@
           <a:p>
             <a:fld id="{81F9330C-0A3B-E743-8965-F97E7BC157CF}" type="datetimeFigureOut">
               <a:rPr lang="en-GB" smtClean="0"/>
-              <a:t>02/04/2023</a:t>
+              <a:t>16/06/2023</a:t>
             </a:fld>
             <a:endParaRPr lang="en-GB"/>
           </a:p>
@@ -2999,7 +3001,7 @@
           <a:p>
             <a:fld id="{C3E2FF01-B573-E64C-A82C-C2CA19578300}" type="slidenum">
               <a:rPr lang="en-GB" smtClean="0"/>
-              <a:t>‹N›</a:t>
+              <a:t>‹#›</a:t>
             </a:fld>
             <a:endParaRPr lang="en-GB"/>
           </a:p>
@@ -3047,7 +3049,7 @@
           <a:p>
             <a:fld id="{81F9330C-0A3B-E743-8965-F97E7BC157CF}" type="datetimeFigureOut">
               <a:rPr lang="en-GB" smtClean="0"/>
-              <a:t>02/04/2023</a:t>
+              <a:t>16/06/2023</a:t>
             </a:fld>
             <a:endParaRPr lang="en-GB"/>
           </a:p>
@@ -3089,7 +3091,7 @@
           <a:p>
             <a:fld id="{C3E2FF01-B573-E64C-A82C-C2CA19578300}" type="slidenum">
               <a:rPr lang="en-GB" smtClean="0"/>
-              <a:t>‹N›</a:t>
+              <a:t>‹#›</a:t>
             </a:fld>
             <a:endParaRPr lang="en-GB"/>
           </a:p>
@@ -3319,7 +3321,7 @@
           <a:p>
             <a:fld id="{81F9330C-0A3B-E743-8965-F97E7BC157CF}" type="datetimeFigureOut">
               <a:rPr lang="en-GB" smtClean="0"/>
-              <a:t>02/04/2023</a:t>
+              <a:t>16/06/2023</a:t>
             </a:fld>
             <a:endParaRPr lang="en-GB"/>
           </a:p>
@@ -3361,7 +3363,7 @@
           <a:p>
             <a:fld id="{C3E2FF01-B573-E64C-A82C-C2CA19578300}" type="slidenum">
               <a:rPr lang="en-GB" smtClean="0"/>
-              <a:t>‹N›</a:t>
+              <a:t>‹#›</a:t>
             </a:fld>
             <a:endParaRPr lang="en-GB"/>
           </a:p>
@@ -3571,7 +3573,7 @@
           <a:p>
             <a:fld id="{81F9330C-0A3B-E743-8965-F97E7BC157CF}" type="datetimeFigureOut">
               <a:rPr lang="en-GB" smtClean="0"/>
-              <a:t>02/04/2023</a:t>
+              <a:t>16/06/2023</a:t>
             </a:fld>
             <a:endParaRPr lang="en-GB"/>
           </a:p>
@@ -3613,7 +3615,7 @@
           <a:p>
             <a:fld id="{C3E2FF01-B573-E64C-A82C-C2CA19578300}" type="slidenum">
               <a:rPr lang="en-GB" smtClean="0"/>
-              <a:t>‹N›</a:t>
+              <a:t>‹#›</a:t>
             </a:fld>
             <a:endParaRPr lang="en-GB"/>
           </a:p>
@@ -3779,7 +3781,7 @@
           <a:p>
             <a:fld id="{81F9330C-0A3B-E743-8965-F97E7BC157CF}" type="datetimeFigureOut">
               <a:rPr lang="en-GB" smtClean="0"/>
-              <a:t>02/04/2023</a:t>
+              <a:t>16/06/2023</a:t>
             </a:fld>
             <a:endParaRPr lang="en-GB"/>
           </a:p>
@@ -3857,7 +3859,7 @@
           <a:p>
             <a:fld id="{C3E2FF01-B573-E64C-A82C-C2CA19578300}" type="slidenum">
               <a:rPr lang="en-GB" smtClean="0"/>
-              <a:t>‹N›</a:t>
+              <a:t>‹#›</a:t>
             </a:fld>
             <a:endParaRPr lang="en-GB"/>
           </a:p>
@@ -4798,7 +4800,7 @@
                 <a:ea typeface="+mn-ea"/>
                 <a:cs typeface="+mn-cs"/>
               </a:rPr>
-              <a:t>2023, March 31</a:t>
+              <a:t>2023, June 16</a:t>
             </a:r>
             <a:endParaRPr lang="en-IT" sz="2400" b="1" dirty="0"/>
           </a:p>
@@ -4851,6 +4853,1047 @@
 </file>
 
 <file path=ppt/slides/slide10.xml><?xml version="1.0" encoding="utf-8"?>
+<p:sld xmlns:a="http://schemas.openxmlformats.org/drawingml/2006/main" xmlns:r="http://schemas.openxmlformats.org/officeDocument/2006/relationships" xmlns:p="http://schemas.openxmlformats.org/presentationml/2006/main">
+  <p:cSld>
+    <p:bg>
+      <p:bgPr>
+        <a:solidFill>
+          <a:schemeClr val="bg1"/>
+        </a:solidFill>
+        <a:effectLst/>
+      </p:bgPr>
+    </p:bg>
+    <p:spTree>
+      <p:nvGrpSpPr>
+        <p:cNvPr id="1" name=""/>
+        <p:cNvGrpSpPr/>
+        <p:nvPr/>
+      </p:nvGrpSpPr>
+      <p:grpSpPr>
+        <a:xfrm>
+          <a:off x="0" y="0"/>
+          <a:ext cx="0" cy="0"/>
+          <a:chOff x="0" y="0"/>
+          <a:chExt cx="0" cy="0"/>
+        </a:xfrm>
+      </p:grpSpPr>
+      <p:sp useBgFill="1">
+        <p:nvSpPr>
+          <p:cNvPr id="31" name="Rectangle 13">
+            <a:extLst>
+              <a:ext uri="{FF2B5EF4-FFF2-40B4-BE49-F238E27FC236}">
+                <a16:creationId xmlns:a16="http://schemas.microsoft.com/office/drawing/2014/main" id="{45D37F4E-DDB4-456B-97E0-9937730A039F}"/>
+              </a:ext>
+              <a:ext uri="{C183D7F6-B498-43B3-948B-1728B52AA6E4}">
+                <adec:decorative xmlns:adec="http://schemas.microsoft.com/office/drawing/2017/decorative" val="1"/>
+              </a:ext>
+            </a:extLst>
+          </p:cNvPr>
+          <p:cNvSpPr>
+            <a:spLocks noGrp="1" noRot="1" noChangeAspect="1" noMove="1" noResize="1" noEditPoints="1" noAdjustHandles="1" noChangeArrowheads="1" noChangeShapeType="1" noTextEdit="1"/>
+          </p:cNvSpPr>
+          <p:nvPr>
+            <p:extLst>
+              <p:ext uri="{386F3935-93C4-4BCD-93E2-E3B085C9AB24}">
+                <p16:designElem xmlns:p16="http://schemas.microsoft.com/office/powerpoint/2015/main" val="1"/>
+              </p:ext>
+            </p:extLst>
+          </p:nvPr>
+        </p:nvSpPr>
+        <p:spPr>
+          <a:xfrm>
+            <a:off x="0" y="0"/>
+            <a:ext cx="12188952" cy="6858000"/>
+          </a:xfrm>
+          <a:prstGeom prst="rect">
+            <a:avLst/>
+          </a:prstGeom>
+          <a:ln>
+            <a:noFill/>
+          </a:ln>
+        </p:spPr>
+        <p:style>
+          <a:lnRef idx="2">
+            <a:schemeClr val="accent1">
+              <a:shade val="50000"/>
+            </a:schemeClr>
+          </a:lnRef>
+          <a:fillRef idx="1">
+            <a:schemeClr val="accent1"/>
+          </a:fillRef>
+          <a:effectRef idx="0">
+            <a:schemeClr val="accent1"/>
+          </a:effectRef>
+          <a:fontRef idx="minor">
+            <a:schemeClr val="lt1"/>
+          </a:fontRef>
+        </p:style>
+        <p:txBody>
+          <a:bodyPr rtlCol="0" anchor="ctr"/>
+          <a:lstStyle/>
+          <a:p>
+            <a:pPr algn="ctr"/>
+            <a:endParaRPr lang="en-US"/>
+          </a:p>
+        </p:txBody>
+      </p:sp>
+      <p:sp>
+        <p:nvSpPr>
+          <p:cNvPr id="9" name="Title 8">
+            <a:extLst>
+              <a:ext uri="{FF2B5EF4-FFF2-40B4-BE49-F238E27FC236}">
+                <a16:creationId xmlns:a16="http://schemas.microsoft.com/office/drawing/2014/main" id="{35493AF0-80AA-F04C-BE18-12651EE22F56}"/>
+              </a:ext>
+            </a:extLst>
+          </p:cNvPr>
+          <p:cNvSpPr>
+            <a:spLocks noGrp="1"/>
+          </p:cNvSpPr>
+          <p:nvPr>
+            <p:ph type="title"/>
+          </p:nvPr>
+        </p:nvSpPr>
+        <p:spPr>
+          <a:xfrm>
+            <a:off x="572493" y="238539"/>
+            <a:ext cx="11018520" cy="1434415"/>
+          </a:xfrm>
+        </p:spPr>
+        <p:txBody>
+          <a:bodyPr anchor="b">
+            <a:normAutofit/>
+          </a:bodyPr>
+          <a:lstStyle/>
+          <a:p>
+            <a:r>
+              <a:rPr lang="en-GB" sz="5400" dirty="0"/>
+              <a:t>How use it locally</a:t>
+            </a:r>
+            <a:endParaRPr lang="en-IT" sz="5400" dirty="0"/>
+          </a:p>
+        </p:txBody>
+      </p:sp>
+      <p:sp>
+        <p:nvSpPr>
+          <p:cNvPr id="32" name="sketchy line">
+            <a:extLst>
+              <a:ext uri="{FF2B5EF4-FFF2-40B4-BE49-F238E27FC236}">
+                <a16:creationId xmlns:a16="http://schemas.microsoft.com/office/drawing/2014/main" id="{B2DD41CD-8F47-4F56-AD12-4E2FF7696987}"/>
+              </a:ext>
+              <a:ext uri="{C183D7F6-B498-43B3-948B-1728B52AA6E4}">
+                <adec:decorative xmlns:adec="http://schemas.microsoft.com/office/drawing/2017/decorative" val="1"/>
+              </a:ext>
+            </a:extLst>
+          </p:cNvPr>
+          <p:cNvSpPr>
+            <a:spLocks noGrp="1" noRot="1" noChangeAspect="1" noMove="1" noResize="1" noEditPoints="1" noAdjustHandles="1" noChangeArrowheads="1" noChangeShapeType="1" noTextEdit="1"/>
+          </p:cNvSpPr>
+          <p:nvPr>
+            <p:extLst>
+              <p:ext uri="{386F3935-93C4-4BCD-93E2-E3B085C9AB24}">
+                <p16:designElem xmlns:p16="http://schemas.microsoft.com/office/powerpoint/2015/main" val="1"/>
+              </p:ext>
+            </p:extLst>
+          </p:nvPr>
+        </p:nvSpPr>
+        <p:spPr>
+          <a:xfrm>
+            <a:off x="572493" y="1681544"/>
+            <a:ext cx="10972800" cy="18288"/>
+          </a:xfrm>
+          <a:custGeom>
+            <a:avLst/>
+            <a:gdLst>
+              <a:gd name="connsiteX0" fmla="*/ 0 w 10972800"/>
+              <a:gd name="connsiteY0" fmla="*/ 0 h 18288"/>
+              <a:gd name="connsiteX1" fmla="*/ 356616 w 10972800"/>
+              <a:gd name="connsiteY1" fmla="*/ 0 h 18288"/>
+              <a:gd name="connsiteX2" fmla="*/ 1042416 w 10972800"/>
+              <a:gd name="connsiteY2" fmla="*/ 0 h 18288"/>
+              <a:gd name="connsiteX3" fmla="*/ 1947672 w 10972800"/>
+              <a:gd name="connsiteY3" fmla="*/ 0 h 18288"/>
+              <a:gd name="connsiteX4" fmla="*/ 2633472 w 10972800"/>
+              <a:gd name="connsiteY4" fmla="*/ 0 h 18288"/>
+              <a:gd name="connsiteX5" fmla="*/ 2990088 w 10972800"/>
+              <a:gd name="connsiteY5" fmla="*/ 0 h 18288"/>
+              <a:gd name="connsiteX6" fmla="*/ 3456432 w 10972800"/>
+              <a:gd name="connsiteY6" fmla="*/ 0 h 18288"/>
+              <a:gd name="connsiteX7" fmla="*/ 4361688 w 10972800"/>
+              <a:gd name="connsiteY7" fmla="*/ 0 h 18288"/>
+              <a:gd name="connsiteX8" fmla="*/ 5266944 w 10972800"/>
+              <a:gd name="connsiteY8" fmla="*/ 0 h 18288"/>
+              <a:gd name="connsiteX9" fmla="*/ 6172200 w 10972800"/>
+              <a:gd name="connsiteY9" fmla="*/ 0 h 18288"/>
+              <a:gd name="connsiteX10" fmla="*/ 6528816 w 10972800"/>
+              <a:gd name="connsiteY10" fmla="*/ 0 h 18288"/>
+              <a:gd name="connsiteX11" fmla="*/ 7214616 w 10972800"/>
+              <a:gd name="connsiteY11" fmla="*/ 0 h 18288"/>
+              <a:gd name="connsiteX12" fmla="*/ 7790688 w 10972800"/>
+              <a:gd name="connsiteY12" fmla="*/ 0 h 18288"/>
+              <a:gd name="connsiteX13" fmla="*/ 8147304 w 10972800"/>
+              <a:gd name="connsiteY13" fmla="*/ 0 h 18288"/>
+              <a:gd name="connsiteX14" fmla="*/ 9052560 w 10972800"/>
+              <a:gd name="connsiteY14" fmla="*/ 0 h 18288"/>
+              <a:gd name="connsiteX15" fmla="*/ 9409176 w 10972800"/>
+              <a:gd name="connsiteY15" fmla="*/ 0 h 18288"/>
+              <a:gd name="connsiteX16" fmla="*/ 9765792 w 10972800"/>
+              <a:gd name="connsiteY16" fmla="*/ 0 h 18288"/>
+              <a:gd name="connsiteX17" fmla="*/ 10341864 w 10972800"/>
+              <a:gd name="connsiteY17" fmla="*/ 0 h 18288"/>
+              <a:gd name="connsiteX18" fmla="*/ 10972800 w 10972800"/>
+              <a:gd name="connsiteY18" fmla="*/ 0 h 18288"/>
+              <a:gd name="connsiteX19" fmla="*/ 10972800 w 10972800"/>
+              <a:gd name="connsiteY19" fmla="*/ 18288 h 18288"/>
+              <a:gd name="connsiteX20" fmla="*/ 10177272 w 10972800"/>
+              <a:gd name="connsiteY20" fmla="*/ 18288 h 18288"/>
+              <a:gd name="connsiteX21" fmla="*/ 9820656 w 10972800"/>
+              <a:gd name="connsiteY21" fmla="*/ 18288 h 18288"/>
+              <a:gd name="connsiteX22" fmla="*/ 9464040 w 10972800"/>
+              <a:gd name="connsiteY22" fmla="*/ 18288 h 18288"/>
+              <a:gd name="connsiteX23" fmla="*/ 8778240 w 10972800"/>
+              <a:gd name="connsiteY23" fmla="*/ 18288 h 18288"/>
+              <a:gd name="connsiteX24" fmla="*/ 8421624 w 10972800"/>
+              <a:gd name="connsiteY24" fmla="*/ 18288 h 18288"/>
+              <a:gd name="connsiteX25" fmla="*/ 7735824 w 10972800"/>
+              <a:gd name="connsiteY25" fmla="*/ 18288 h 18288"/>
+              <a:gd name="connsiteX26" fmla="*/ 6940296 w 10972800"/>
+              <a:gd name="connsiteY26" fmla="*/ 18288 h 18288"/>
+              <a:gd name="connsiteX27" fmla="*/ 6254496 w 10972800"/>
+              <a:gd name="connsiteY27" fmla="*/ 18288 h 18288"/>
+              <a:gd name="connsiteX28" fmla="*/ 5458968 w 10972800"/>
+              <a:gd name="connsiteY28" fmla="*/ 18288 h 18288"/>
+              <a:gd name="connsiteX29" fmla="*/ 4663440 w 10972800"/>
+              <a:gd name="connsiteY29" fmla="*/ 18288 h 18288"/>
+              <a:gd name="connsiteX30" fmla="*/ 4306824 w 10972800"/>
+              <a:gd name="connsiteY30" fmla="*/ 18288 h 18288"/>
+              <a:gd name="connsiteX31" fmla="*/ 3840480 w 10972800"/>
+              <a:gd name="connsiteY31" fmla="*/ 18288 h 18288"/>
+              <a:gd name="connsiteX32" fmla="*/ 3264408 w 10972800"/>
+              <a:gd name="connsiteY32" fmla="*/ 18288 h 18288"/>
+              <a:gd name="connsiteX33" fmla="*/ 2578608 w 10972800"/>
+              <a:gd name="connsiteY33" fmla="*/ 18288 h 18288"/>
+              <a:gd name="connsiteX34" fmla="*/ 1673352 w 10972800"/>
+              <a:gd name="connsiteY34" fmla="*/ 18288 h 18288"/>
+              <a:gd name="connsiteX35" fmla="*/ 877824 w 10972800"/>
+              <a:gd name="connsiteY35" fmla="*/ 18288 h 18288"/>
+              <a:gd name="connsiteX36" fmla="*/ 0 w 10972800"/>
+              <a:gd name="connsiteY36" fmla="*/ 18288 h 18288"/>
+              <a:gd name="connsiteX37" fmla="*/ 0 w 10972800"/>
+              <a:gd name="connsiteY37" fmla="*/ 0 h 18288"/>
+            </a:gdLst>
+            <a:ahLst/>
+            <a:cxnLst>
+              <a:cxn ang="0">
+                <a:pos x="connsiteX0" y="connsiteY0"/>
+              </a:cxn>
+              <a:cxn ang="0">
+                <a:pos x="connsiteX1" y="connsiteY1"/>
+              </a:cxn>
+              <a:cxn ang="0">
+                <a:pos x="connsiteX2" y="connsiteY2"/>
+              </a:cxn>
+              <a:cxn ang="0">
+                <a:pos x="connsiteX3" y="connsiteY3"/>
+              </a:cxn>
+              <a:cxn ang="0">
+                <a:pos x="connsiteX4" y="connsiteY4"/>
+              </a:cxn>
+              <a:cxn ang="0">
+                <a:pos x="connsiteX5" y="connsiteY5"/>
+              </a:cxn>
+              <a:cxn ang="0">
+                <a:pos x="connsiteX6" y="connsiteY6"/>
+              </a:cxn>
+              <a:cxn ang="0">
+                <a:pos x="connsiteX7" y="connsiteY7"/>
+              </a:cxn>
+              <a:cxn ang="0">
+                <a:pos x="connsiteX8" y="connsiteY8"/>
+              </a:cxn>
+              <a:cxn ang="0">
+                <a:pos x="connsiteX9" y="connsiteY9"/>
+              </a:cxn>
+              <a:cxn ang="0">
+                <a:pos x="connsiteX10" y="connsiteY10"/>
+              </a:cxn>
+              <a:cxn ang="0">
+                <a:pos x="connsiteX11" y="connsiteY11"/>
+              </a:cxn>
+              <a:cxn ang="0">
+                <a:pos x="connsiteX12" y="connsiteY12"/>
+              </a:cxn>
+              <a:cxn ang="0">
+                <a:pos x="connsiteX13" y="connsiteY13"/>
+              </a:cxn>
+              <a:cxn ang="0">
+                <a:pos x="connsiteX14" y="connsiteY14"/>
+              </a:cxn>
+              <a:cxn ang="0">
+                <a:pos x="connsiteX15" y="connsiteY15"/>
+              </a:cxn>
+              <a:cxn ang="0">
+                <a:pos x="connsiteX16" y="connsiteY16"/>
+              </a:cxn>
+              <a:cxn ang="0">
+                <a:pos x="connsiteX17" y="connsiteY17"/>
+              </a:cxn>
+              <a:cxn ang="0">
+                <a:pos x="connsiteX18" y="connsiteY18"/>
+              </a:cxn>
+              <a:cxn ang="0">
+                <a:pos x="connsiteX19" y="connsiteY19"/>
+              </a:cxn>
+              <a:cxn ang="0">
+                <a:pos x="connsiteX20" y="connsiteY20"/>
+              </a:cxn>
+              <a:cxn ang="0">
+                <a:pos x="connsiteX21" y="connsiteY21"/>
+              </a:cxn>
+              <a:cxn ang="0">
+                <a:pos x="connsiteX22" y="connsiteY22"/>
+              </a:cxn>
+              <a:cxn ang="0">
+                <a:pos x="connsiteX23" y="connsiteY23"/>
+              </a:cxn>
+              <a:cxn ang="0">
+                <a:pos x="connsiteX24" y="connsiteY24"/>
+              </a:cxn>
+              <a:cxn ang="0">
+                <a:pos x="connsiteX25" y="connsiteY25"/>
+              </a:cxn>
+              <a:cxn ang="0">
+                <a:pos x="connsiteX26" y="connsiteY26"/>
+              </a:cxn>
+              <a:cxn ang="0">
+                <a:pos x="connsiteX27" y="connsiteY27"/>
+              </a:cxn>
+              <a:cxn ang="0">
+                <a:pos x="connsiteX28" y="connsiteY28"/>
+              </a:cxn>
+              <a:cxn ang="0">
+                <a:pos x="connsiteX29" y="connsiteY29"/>
+              </a:cxn>
+              <a:cxn ang="0">
+                <a:pos x="connsiteX30" y="connsiteY30"/>
+              </a:cxn>
+              <a:cxn ang="0">
+                <a:pos x="connsiteX31" y="connsiteY31"/>
+              </a:cxn>
+              <a:cxn ang="0">
+                <a:pos x="connsiteX32" y="connsiteY32"/>
+              </a:cxn>
+              <a:cxn ang="0">
+                <a:pos x="connsiteX33" y="connsiteY33"/>
+              </a:cxn>
+              <a:cxn ang="0">
+                <a:pos x="connsiteX34" y="connsiteY34"/>
+              </a:cxn>
+              <a:cxn ang="0">
+                <a:pos x="connsiteX35" y="connsiteY35"/>
+              </a:cxn>
+              <a:cxn ang="0">
+                <a:pos x="connsiteX36" y="connsiteY36"/>
+              </a:cxn>
+              <a:cxn ang="0">
+                <a:pos x="connsiteX37" y="connsiteY37"/>
+              </a:cxn>
+            </a:cxnLst>
+            <a:rect l="l" t="t" r="r" b="b"/>
+            <a:pathLst>
+              <a:path w="10972800" h="18288" fill="none" extrusionOk="0">
+                <a:moveTo>
+                  <a:pt x="0" y="0"/>
+                </a:moveTo>
+                <a:cubicBezTo>
+                  <a:pt x="165916" y="-1866"/>
+                  <a:pt x="188720" y="13756"/>
+                  <a:pt x="356616" y="0"/>
+                </a:cubicBezTo>
+                <a:cubicBezTo>
+                  <a:pt x="524512" y="-13756"/>
+                  <a:pt x="734781" y="8922"/>
+                  <a:pt x="1042416" y="0"/>
+                </a:cubicBezTo>
+                <a:cubicBezTo>
+                  <a:pt x="1350051" y="-8922"/>
+                  <a:pt x="1595982" y="-26315"/>
+                  <a:pt x="1947672" y="0"/>
+                </a:cubicBezTo>
+                <a:cubicBezTo>
+                  <a:pt x="2299362" y="26315"/>
+                  <a:pt x="2292691" y="-19526"/>
+                  <a:pt x="2633472" y="0"/>
+                </a:cubicBezTo>
+                <a:cubicBezTo>
+                  <a:pt x="2974253" y="19526"/>
+                  <a:pt x="2857309" y="10773"/>
+                  <a:pt x="2990088" y="0"/>
+                </a:cubicBezTo>
+                <a:cubicBezTo>
+                  <a:pt x="3122867" y="-10773"/>
+                  <a:pt x="3359343" y="7194"/>
+                  <a:pt x="3456432" y="0"/>
+                </a:cubicBezTo>
+                <a:cubicBezTo>
+                  <a:pt x="3553521" y="-7194"/>
+                  <a:pt x="4136258" y="5108"/>
+                  <a:pt x="4361688" y="0"/>
+                </a:cubicBezTo>
+                <a:cubicBezTo>
+                  <a:pt x="4587118" y="-5108"/>
+                  <a:pt x="4992424" y="-42958"/>
+                  <a:pt x="5266944" y="0"/>
+                </a:cubicBezTo>
+                <a:cubicBezTo>
+                  <a:pt x="5541464" y="42958"/>
+                  <a:pt x="5882966" y="-3430"/>
+                  <a:pt x="6172200" y="0"/>
+                </a:cubicBezTo>
+                <a:cubicBezTo>
+                  <a:pt x="6461434" y="3430"/>
+                  <a:pt x="6432127" y="6688"/>
+                  <a:pt x="6528816" y="0"/>
+                </a:cubicBezTo>
+                <a:cubicBezTo>
+                  <a:pt x="6625505" y="-6688"/>
+                  <a:pt x="6916805" y="-436"/>
+                  <a:pt x="7214616" y="0"/>
+                </a:cubicBezTo>
+                <a:cubicBezTo>
+                  <a:pt x="7512427" y="436"/>
+                  <a:pt x="7626159" y="-6909"/>
+                  <a:pt x="7790688" y="0"/>
+                </a:cubicBezTo>
+                <a:cubicBezTo>
+                  <a:pt x="7955217" y="6909"/>
+                  <a:pt x="8048891" y="15307"/>
+                  <a:pt x="8147304" y="0"/>
+                </a:cubicBezTo>
+                <a:cubicBezTo>
+                  <a:pt x="8245717" y="-15307"/>
+                  <a:pt x="8645618" y="-11734"/>
+                  <a:pt x="9052560" y="0"/>
+                </a:cubicBezTo>
+                <a:cubicBezTo>
+                  <a:pt x="9459502" y="11734"/>
+                  <a:pt x="9320584" y="8388"/>
+                  <a:pt x="9409176" y="0"/>
+                </a:cubicBezTo>
+                <a:cubicBezTo>
+                  <a:pt x="9497768" y="-8388"/>
+                  <a:pt x="9644192" y="8379"/>
+                  <a:pt x="9765792" y="0"/>
+                </a:cubicBezTo>
+                <a:cubicBezTo>
+                  <a:pt x="9887392" y="-8379"/>
+                  <a:pt x="10105220" y="-12663"/>
+                  <a:pt x="10341864" y="0"/>
+                </a:cubicBezTo>
+                <a:cubicBezTo>
+                  <a:pt x="10578508" y="12663"/>
+                  <a:pt x="10773103" y="-5786"/>
+                  <a:pt x="10972800" y="0"/>
+                </a:cubicBezTo>
+                <a:cubicBezTo>
+                  <a:pt x="10972146" y="8818"/>
+                  <a:pt x="10972240" y="13823"/>
+                  <a:pt x="10972800" y="18288"/>
+                </a:cubicBezTo>
+                <a:cubicBezTo>
+                  <a:pt x="10588778" y="31598"/>
+                  <a:pt x="10543381" y="-12698"/>
+                  <a:pt x="10177272" y="18288"/>
+                </a:cubicBezTo>
+                <a:cubicBezTo>
+                  <a:pt x="9811163" y="49274"/>
+                  <a:pt x="9996817" y="25662"/>
+                  <a:pt x="9820656" y="18288"/>
+                </a:cubicBezTo>
+                <a:cubicBezTo>
+                  <a:pt x="9644495" y="10914"/>
+                  <a:pt x="9607007" y="31631"/>
+                  <a:pt x="9464040" y="18288"/>
+                </a:cubicBezTo>
+                <a:cubicBezTo>
+                  <a:pt x="9321073" y="4945"/>
+                  <a:pt x="9114189" y="28940"/>
+                  <a:pt x="8778240" y="18288"/>
+                </a:cubicBezTo>
+                <a:cubicBezTo>
+                  <a:pt x="8442291" y="7636"/>
+                  <a:pt x="8594763" y="987"/>
+                  <a:pt x="8421624" y="18288"/>
+                </a:cubicBezTo>
+                <a:cubicBezTo>
+                  <a:pt x="8248485" y="35589"/>
+                  <a:pt x="7929515" y="37573"/>
+                  <a:pt x="7735824" y="18288"/>
+                </a:cubicBezTo>
+                <a:cubicBezTo>
+                  <a:pt x="7542133" y="-997"/>
+                  <a:pt x="7252504" y="33858"/>
+                  <a:pt x="6940296" y="18288"/>
+                </a:cubicBezTo>
+                <a:cubicBezTo>
+                  <a:pt x="6628088" y="2718"/>
+                  <a:pt x="6528503" y="48389"/>
+                  <a:pt x="6254496" y="18288"/>
+                </a:cubicBezTo>
+                <a:cubicBezTo>
+                  <a:pt x="5980489" y="-11813"/>
+                  <a:pt x="5695784" y="-3740"/>
+                  <a:pt x="5458968" y="18288"/>
+                </a:cubicBezTo>
+                <a:cubicBezTo>
+                  <a:pt x="5222152" y="40316"/>
+                  <a:pt x="5010751" y="19095"/>
+                  <a:pt x="4663440" y="18288"/>
+                </a:cubicBezTo>
+                <a:cubicBezTo>
+                  <a:pt x="4316129" y="17481"/>
+                  <a:pt x="4425552" y="1606"/>
+                  <a:pt x="4306824" y="18288"/>
+                </a:cubicBezTo>
+                <a:cubicBezTo>
+                  <a:pt x="4188096" y="34970"/>
+                  <a:pt x="3941535" y="7481"/>
+                  <a:pt x="3840480" y="18288"/>
+                </a:cubicBezTo>
+                <a:cubicBezTo>
+                  <a:pt x="3739425" y="29095"/>
+                  <a:pt x="3402388" y="17641"/>
+                  <a:pt x="3264408" y="18288"/>
+                </a:cubicBezTo>
+                <a:cubicBezTo>
+                  <a:pt x="3126428" y="18935"/>
+                  <a:pt x="2776779" y="9983"/>
+                  <a:pt x="2578608" y="18288"/>
+                </a:cubicBezTo>
+                <a:cubicBezTo>
+                  <a:pt x="2380437" y="26593"/>
+                  <a:pt x="1909468" y="25818"/>
+                  <a:pt x="1673352" y="18288"/>
+                </a:cubicBezTo>
+                <a:cubicBezTo>
+                  <a:pt x="1437236" y="10758"/>
+                  <a:pt x="1131180" y="49884"/>
+                  <a:pt x="877824" y="18288"/>
+                </a:cubicBezTo>
+                <a:cubicBezTo>
+                  <a:pt x="624468" y="-13308"/>
+                  <a:pt x="206753" y="2195"/>
+                  <a:pt x="0" y="18288"/>
+                </a:cubicBezTo>
+                <a:cubicBezTo>
+                  <a:pt x="313" y="10654"/>
+                  <a:pt x="-263" y="4056"/>
+                  <a:pt x="0" y="0"/>
+                </a:cubicBezTo>
+                <a:close/>
+              </a:path>
+              <a:path w="10972800" h="18288" stroke="0" extrusionOk="0">
+                <a:moveTo>
+                  <a:pt x="0" y="0"/>
+                </a:moveTo>
+                <a:cubicBezTo>
+                  <a:pt x="164017" y="-17675"/>
+                  <a:pt x="309425" y="9913"/>
+                  <a:pt x="466344" y="0"/>
+                </a:cubicBezTo>
+                <a:cubicBezTo>
+                  <a:pt x="623263" y="-9913"/>
+                  <a:pt x="659300" y="-14524"/>
+                  <a:pt x="822960" y="0"/>
+                </a:cubicBezTo>
+                <a:cubicBezTo>
+                  <a:pt x="986620" y="14524"/>
+                  <a:pt x="1105222" y="-16481"/>
+                  <a:pt x="1289304" y="0"/>
+                </a:cubicBezTo>
+                <a:cubicBezTo>
+                  <a:pt x="1473386" y="16481"/>
+                  <a:pt x="1693223" y="26161"/>
+                  <a:pt x="1975104" y="0"/>
+                </a:cubicBezTo>
+                <a:cubicBezTo>
+                  <a:pt x="2256985" y="-26161"/>
+                  <a:pt x="2435781" y="23061"/>
+                  <a:pt x="2770632" y="0"/>
+                </a:cubicBezTo>
+                <a:cubicBezTo>
+                  <a:pt x="3105483" y="-23061"/>
+                  <a:pt x="3247479" y="-44011"/>
+                  <a:pt x="3675888" y="0"/>
+                </a:cubicBezTo>
+                <a:cubicBezTo>
+                  <a:pt x="4104297" y="44011"/>
+                  <a:pt x="4280918" y="4017"/>
+                  <a:pt x="4581144" y="0"/>
+                </a:cubicBezTo>
+                <a:cubicBezTo>
+                  <a:pt x="4881370" y="-4017"/>
+                  <a:pt x="5021699" y="-11889"/>
+                  <a:pt x="5157216" y="0"/>
+                </a:cubicBezTo>
+                <a:cubicBezTo>
+                  <a:pt x="5292733" y="11889"/>
+                  <a:pt x="5603398" y="-17698"/>
+                  <a:pt x="5952744" y="0"/>
+                </a:cubicBezTo>
+                <a:cubicBezTo>
+                  <a:pt x="6302090" y="17698"/>
+                  <a:pt x="6353093" y="-11909"/>
+                  <a:pt x="6638544" y="0"/>
+                </a:cubicBezTo>
+                <a:cubicBezTo>
+                  <a:pt x="6923995" y="11909"/>
+                  <a:pt x="7053404" y="21630"/>
+                  <a:pt x="7214616" y="0"/>
+                </a:cubicBezTo>
+                <a:cubicBezTo>
+                  <a:pt x="7375828" y="-21630"/>
+                  <a:pt x="7837963" y="3886"/>
+                  <a:pt x="8010144" y="0"/>
+                </a:cubicBezTo>
+                <a:cubicBezTo>
+                  <a:pt x="8182325" y="-3886"/>
+                  <a:pt x="8224183" y="16009"/>
+                  <a:pt x="8366760" y="0"/>
+                </a:cubicBezTo>
+                <a:cubicBezTo>
+                  <a:pt x="8509337" y="-16009"/>
+                  <a:pt x="8687920" y="-5720"/>
+                  <a:pt x="8942832" y="0"/>
+                </a:cubicBezTo>
+                <a:cubicBezTo>
+                  <a:pt x="9197744" y="5720"/>
+                  <a:pt x="9368437" y="20479"/>
+                  <a:pt x="9628632" y="0"/>
+                </a:cubicBezTo>
+                <a:cubicBezTo>
+                  <a:pt x="9888827" y="-20479"/>
+                  <a:pt x="10560858" y="-20746"/>
+                  <a:pt x="10972800" y="0"/>
+                </a:cubicBezTo>
+                <a:cubicBezTo>
+                  <a:pt x="10972186" y="5722"/>
+                  <a:pt x="10972980" y="12495"/>
+                  <a:pt x="10972800" y="18288"/>
+                </a:cubicBezTo>
+                <a:cubicBezTo>
+                  <a:pt x="10786146" y="12536"/>
+                  <a:pt x="10623717" y="14033"/>
+                  <a:pt x="10506456" y="18288"/>
+                </a:cubicBezTo>
+                <a:cubicBezTo>
+                  <a:pt x="10389195" y="22543"/>
+                  <a:pt x="10296178" y="20107"/>
+                  <a:pt x="10149840" y="18288"/>
+                </a:cubicBezTo>
+                <a:cubicBezTo>
+                  <a:pt x="10003502" y="16469"/>
+                  <a:pt x="9767530" y="28891"/>
+                  <a:pt x="9464040" y="18288"/>
+                </a:cubicBezTo>
+                <a:cubicBezTo>
+                  <a:pt x="9160550" y="7685"/>
+                  <a:pt x="9229050" y="2659"/>
+                  <a:pt x="8997696" y="18288"/>
+                </a:cubicBezTo>
+                <a:cubicBezTo>
+                  <a:pt x="8766342" y="33917"/>
+                  <a:pt x="8340136" y="34864"/>
+                  <a:pt x="8092440" y="18288"/>
+                </a:cubicBezTo>
+                <a:cubicBezTo>
+                  <a:pt x="7844744" y="1712"/>
+                  <a:pt x="7863720" y="27405"/>
+                  <a:pt x="7735824" y="18288"/>
+                </a:cubicBezTo>
+                <a:cubicBezTo>
+                  <a:pt x="7607928" y="9171"/>
+                  <a:pt x="7323619" y="461"/>
+                  <a:pt x="7050024" y="18288"/>
+                </a:cubicBezTo>
+                <a:cubicBezTo>
+                  <a:pt x="6776429" y="36115"/>
+                  <a:pt x="6787899" y="28206"/>
+                  <a:pt x="6693408" y="18288"/>
+                </a:cubicBezTo>
+                <a:cubicBezTo>
+                  <a:pt x="6598917" y="8370"/>
+                  <a:pt x="6395231" y="19114"/>
+                  <a:pt x="6227064" y="18288"/>
+                </a:cubicBezTo>
+                <a:cubicBezTo>
+                  <a:pt x="6058897" y="17462"/>
+                  <a:pt x="5618582" y="1091"/>
+                  <a:pt x="5431536" y="18288"/>
+                </a:cubicBezTo>
+                <a:cubicBezTo>
+                  <a:pt x="5244490" y="35485"/>
+                  <a:pt x="4729797" y="-9650"/>
+                  <a:pt x="4526280" y="18288"/>
+                </a:cubicBezTo>
+                <a:cubicBezTo>
+                  <a:pt x="4322763" y="46226"/>
+                  <a:pt x="4216797" y="756"/>
+                  <a:pt x="4059936" y="18288"/>
+                </a:cubicBezTo>
+                <a:cubicBezTo>
+                  <a:pt x="3903075" y="35820"/>
+                  <a:pt x="3537912" y="42098"/>
+                  <a:pt x="3374136" y="18288"/>
+                </a:cubicBezTo>
+                <a:cubicBezTo>
+                  <a:pt x="3210360" y="-5522"/>
+                  <a:pt x="3126842" y="39135"/>
+                  <a:pt x="2907792" y="18288"/>
+                </a:cubicBezTo>
+                <a:cubicBezTo>
+                  <a:pt x="2688742" y="-2559"/>
+                  <a:pt x="2490436" y="34100"/>
+                  <a:pt x="2112264" y="18288"/>
+                </a:cubicBezTo>
+                <a:cubicBezTo>
+                  <a:pt x="1734092" y="2476"/>
+                  <a:pt x="1744622" y="-7274"/>
+                  <a:pt x="1536192" y="18288"/>
+                </a:cubicBezTo>
+                <a:cubicBezTo>
+                  <a:pt x="1327762" y="43850"/>
+                  <a:pt x="1189025" y="6435"/>
+                  <a:pt x="1069848" y="18288"/>
+                </a:cubicBezTo>
+                <a:cubicBezTo>
+                  <a:pt x="950671" y="30141"/>
+                  <a:pt x="858345" y="33684"/>
+                  <a:pt x="713232" y="18288"/>
+                </a:cubicBezTo>
+                <a:cubicBezTo>
+                  <a:pt x="568119" y="2892"/>
+                  <a:pt x="250292" y="5410"/>
+                  <a:pt x="0" y="18288"/>
+                </a:cubicBezTo>
+                <a:cubicBezTo>
+                  <a:pt x="465" y="13062"/>
+                  <a:pt x="-894" y="9029"/>
+                  <a:pt x="0" y="0"/>
+                </a:cubicBezTo>
+                <a:close/>
+              </a:path>
+            </a:pathLst>
+          </a:custGeom>
+          <a:solidFill>
+            <a:schemeClr val="accent2">
+              <a:alpha val="75000"/>
+            </a:schemeClr>
+          </a:solidFill>
+          <a:ln w="44450" cap="rnd">
+            <a:solidFill>
+              <a:schemeClr val="accent2">
+                <a:alpha val="75000"/>
+              </a:schemeClr>
+            </a:solidFill>
+            <a:round/>
+            <a:extLst>
+              <a:ext uri="{C807C97D-BFC1-408E-A445-0C87EB9F89A2}">
+                <ask:lineSketchStyleProps xmlns:ask="http://schemas.microsoft.com/office/drawing/2018/sketchyshapes" sd="2727557108">
+                  <a:prstGeom prst="rect">
+                    <a:avLst/>
+                  </a:prstGeom>
+                  <ask:type>
+                    <ask:lineSketchFreehand/>
+                  </ask:type>
+                </ask:lineSketchStyleProps>
+              </a:ext>
+            </a:extLst>
+          </a:ln>
+        </p:spPr>
+        <p:style>
+          <a:lnRef idx="2">
+            <a:schemeClr val="accent1">
+              <a:shade val="50000"/>
+            </a:schemeClr>
+          </a:lnRef>
+          <a:fillRef idx="1">
+            <a:schemeClr val="accent1"/>
+          </a:fillRef>
+          <a:effectRef idx="0">
+            <a:schemeClr val="accent1"/>
+          </a:effectRef>
+          <a:fontRef idx="minor">
+            <a:schemeClr val="lt1"/>
+          </a:fontRef>
+        </p:style>
+        <p:txBody>
+          <a:bodyPr rtlCol="0" anchor="ctr"/>
+          <a:lstStyle/>
+          <a:p>
+            <a:pPr algn="ctr"/>
+            <a:endParaRPr lang="en-US"/>
+          </a:p>
+        </p:txBody>
+      </p:sp>
+      <p:sp>
+        <p:nvSpPr>
+          <p:cNvPr id="33" name="Content Placeholder 3">
+            <a:extLst>
+              <a:ext uri="{FF2B5EF4-FFF2-40B4-BE49-F238E27FC236}">
+                <a16:creationId xmlns:a16="http://schemas.microsoft.com/office/drawing/2014/main" id="{77E2D2AC-46B3-4926-CB7E-B3BAAF19E69D}"/>
+              </a:ext>
+            </a:extLst>
+          </p:cNvPr>
+          <p:cNvSpPr>
+            <a:spLocks noGrp="1"/>
+          </p:cNvSpPr>
+          <p:nvPr>
+            <p:ph idx="1"/>
+          </p:nvPr>
+        </p:nvSpPr>
+        <p:spPr>
+          <a:xfrm>
+            <a:off x="572493" y="2071316"/>
+            <a:ext cx="10972800" cy="4119172"/>
+          </a:xfrm>
+        </p:spPr>
+        <p:txBody>
+          <a:bodyPr anchor="t">
+            <a:normAutofit lnSpcReduction="10000"/>
+          </a:bodyPr>
+          <a:lstStyle/>
+          <a:p>
+            <a:pPr marL="0" indent="0">
+              <a:buNone/>
+            </a:pPr>
+            <a:r>
+              <a:rPr lang="en-GB" sz="2000" dirty="0"/>
+              <a:t>To use SonarQube in a local environment you can use simply use </a:t>
+            </a:r>
+            <a:r>
+              <a:rPr lang="en-GB" sz="2000" dirty="0">
+                <a:hlinkClick r:id="rId2"/>
+              </a:rPr>
+              <a:t>docker</a:t>
+            </a:r>
+            <a:r>
+              <a:rPr lang="en-GB" sz="2000" dirty="0"/>
+              <a:t>. </a:t>
+            </a:r>
+          </a:p>
+          <a:p>
+            <a:pPr marL="0" indent="0">
+              <a:buNone/>
+            </a:pPr>
+            <a:r>
+              <a:rPr lang="en-GB" sz="2000" dirty="0"/>
+              <a:t>Once Docker has been installed, you can download and launch a local version of </a:t>
+            </a:r>
+            <a:r>
+              <a:rPr lang="en-GB" sz="2000" dirty="0" err="1"/>
+              <a:t>Sonarquube</a:t>
+            </a:r>
+            <a:r>
+              <a:rPr lang="en-GB" sz="2000" dirty="0"/>
+              <a:t> through the command: </a:t>
+            </a:r>
+          </a:p>
+          <a:p>
+            <a:pPr marL="0" indent="0" algn="ctr">
+              <a:buNone/>
+            </a:pPr>
+            <a:r>
+              <a:rPr lang="en-GB" b="1" i="1" dirty="0"/>
+              <a:t>docker run –d –p 9000:9000 </a:t>
+            </a:r>
+            <a:r>
+              <a:rPr lang="en-GB" b="1" i="1" dirty="0" err="1"/>
+              <a:t>sonarqube</a:t>
+            </a:r>
+            <a:endParaRPr lang="en-GB" b="1" i="1" dirty="0"/>
+          </a:p>
+          <a:p>
+            <a:pPr marL="0" indent="0">
+              <a:buNone/>
+            </a:pPr>
+            <a:endParaRPr lang="en-GB" sz="2000" dirty="0"/>
+          </a:p>
+          <a:p>
+            <a:pPr marL="0" indent="0">
+              <a:buNone/>
+            </a:pPr>
+            <a:r>
+              <a:rPr lang="en-GB" sz="2000" dirty="0"/>
+              <a:t>With this command the SonarQube image will be automatically downloaded and run. The web interface will be available at </a:t>
+            </a:r>
+            <a:r>
+              <a:rPr lang="en-GB" sz="2000" b="1" dirty="0"/>
+              <a:t>localhost:9000</a:t>
+            </a:r>
+            <a:r>
+              <a:rPr lang="en-GB" sz="2000" dirty="0"/>
+              <a:t> with default credentials </a:t>
+            </a:r>
+            <a:r>
+              <a:rPr lang="en-GB" sz="2000" b="1" dirty="0"/>
+              <a:t>admin/admin</a:t>
+            </a:r>
+          </a:p>
+          <a:p>
+            <a:pPr marL="0" indent="0">
+              <a:buNone/>
+            </a:pPr>
+            <a:endParaRPr lang="en-GB" sz="2000" dirty="0"/>
+          </a:p>
+          <a:p>
+            <a:pPr marL="0" indent="0">
+              <a:buNone/>
+            </a:pPr>
+            <a:r>
+              <a:rPr lang="en-GB" sz="2000" b="1" dirty="0"/>
+              <a:t>IMPORTANT</a:t>
+            </a:r>
+            <a:r>
+              <a:rPr lang="en-GB" sz="2000" dirty="0"/>
+              <a:t>: Actually official image of SonarQube is not supported by new silicon processor by Apple. You can run run this command instead of previous one:</a:t>
+            </a:r>
+          </a:p>
+          <a:p>
+            <a:pPr marL="0" indent="0" algn="ctr">
+              <a:buNone/>
+            </a:pPr>
+            <a:r>
+              <a:rPr lang="en-GB" b="1" i="1" dirty="0"/>
+              <a:t>docker run –d –p 9000:9000 </a:t>
+            </a:r>
+            <a:r>
+              <a:rPr lang="en-GB" b="1" i="1" dirty="0" err="1"/>
+              <a:t>mwizner</a:t>
+            </a:r>
+            <a:r>
+              <a:rPr lang="en-GB" b="1" i="1" dirty="0"/>
+              <a:t>/sonarqube</a:t>
+            </a:r>
+            <a:r>
+              <a:rPr lang="en-GB" b="1" i="1"/>
+              <a:t>:8.7.1-community</a:t>
+            </a:r>
+            <a:endParaRPr lang="en-GB" b="1" i="1" dirty="0"/>
+          </a:p>
+          <a:p>
+            <a:pPr marL="0" indent="0">
+              <a:buNone/>
+            </a:pPr>
+            <a:endParaRPr lang="en-GB" sz="2000" dirty="0"/>
+          </a:p>
+          <a:p>
+            <a:pPr marL="0" indent="0">
+              <a:buNone/>
+            </a:pPr>
+            <a:endParaRPr lang="en-GB" sz="2000" dirty="0"/>
+          </a:p>
+          <a:p>
+            <a:pPr marL="0" indent="0">
+              <a:buNone/>
+            </a:pPr>
+            <a:endParaRPr lang="en-GB" sz="2000" dirty="0"/>
+          </a:p>
+        </p:txBody>
+      </p:sp>
+      <p:pic>
+        <p:nvPicPr>
+          <p:cNvPr id="5" name="Picture 4" descr="SonarQube: un valido strumento di analisi statica del codice - Intré">
+            <a:extLst>
+              <a:ext uri="{FF2B5EF4-FFF2-40B4-BE49-F238E27FC236}">
+                <a16:creationId xmlns:a16="http://schemas.microsoft.com/office/drawing/2014/main" id="{F8915CE3-EE40-99EF-6854-3B1406BEC346}"/>
+              </a:ext>
+            </a:extLst>
+          </p:cNvPr>
+          <p:cNvPicPr>
+            <a:picLocks noChangeAspect="1" noChangeArrowheads="1"/>
+          </p:cNvPicPr>
+          <p:nvPr/>
+        </p:nvPicPr>
+        <p:blipFill>
+          <a:blip r:embed="rId3">
+            <a:extLst>
+              <a:ext uri="{28A0092B-C50C-407E-A947-70E740481C1C}">
+                <a14:useLocalDpi xmlns:a14="http://schemas.microsoft.com/office/drawing/2010/main" val="0"/>
+              </a:ext>
+            </a:extLst>
+          </a:blip>
+          <a:srcRect/>
+          <a:stretch>
+            <a:fillRect/>
+          </a:stretch>
+        </p:blipFill>
+        <p:spPr bwMode="auto">
+          <a:xfrm>
+            <a:off x="9559556" y="0"/>
+            <a:ext cx="2632444" cy="813384"/>
+          </a:xfrm>
+          <a:prstGeom prst="rect">
+            <a:avLst/>
+          </a:prstGeom>
+          <a:noFill/>
+          <a:extLst>
+            <a:ext uri="{909E8E84-426E-40DD-AFC4-6F175D3DCCD1}">
+              <a14:hiddenFill xmlns:a14="http://schemas.microsoft.com/office/drawing/2010/main">
+                <a:solidFill>
+                  <a:srgbClr val="FFFFFF"/>
+                </a:solidFill>
+              </a14:hiddenFill>
+            </a:ext>
+          </a:extLst>
+        </p:spPr>
+      </p:pic>
+      <p:pic>
+        <p:nvPicPr>
+          <p:cNvPr id="2" name="Picture 1" descr="Agile Lab">
+            <a:extLst>
+              <a:ext uri="{FF2B5EF4-FFF2-40B4-BE49-F238E27FC236}">
+                <a16:creationId xmlns:a16="http://schemas.microsoft.com/office/drawing/2014/main" id="{09677733-4396-B949-710D-E63A1F68AE1E}"/>
+              </a:ext>
+              <a:ext uri="{C183D7F6-B498-43B3-948B-1728B52AA6E4}">
+                <adec:decorative xmlns:adec="http://schemas.microsoft.com/office/drawing/2017/decorative" val="0"/>
+              </a:ext>
+            </a:extLst>
+          </p:cNvPr>
+          <p:cNvPicPr>
+            <a:picLocks noChangeAspect="1"/>
+          </p:cNvPicPr>
+          <p:nvPr/>
+        </p:nvPicPr>
+        <p:blipFill>
+          <a:blip r:embed="rId4"/>
+          <a:stretch>
+            <a:fillRect/>
+          </a:stretch>
+        </p:blipFill>
+        <p:spPr>
+          <a:xfrm>
+            <a:off x="1" y="0"/>
+            <a:ext cx="2322268" cy="641278"/>
+          </a:xfrm>
+          <a:prstGeom prst="rect">
+            <a:avLst/>
+          </a:prstGeom>
+        </p:spPr>
+      </p:pic>
+    </p:spTree>
+    <p:extLst>
+      <p:ext uri="{BB962C8B-B14F-4D97-AF65-F5344CB8AC3E}">
+        <p14:creationId xmlns:p14="http://schemas.microsoft.com/office/powerpoint/2010/main" val="618177655"/>
+      </p:ext>
+    </p:extLst>
+  </p:cSld>
+  <p:clrMapOvr>
+    <a:masterClrMapping/>
+  </p:clrMapOvr>
+</p:sld>
+</file>
+
+<file path=ppt/slides/slide11.xml><?xml version="1.0" encoding="utf-8"?>
 <p:sld xmlns:a="http://schemas.openxmlformats.org/drawingml/2006/main" xmlns:r="http://schemas.openxmlformats.org/officeDocument/2006/relationships" xmlns:p="http://schemas.openxmlformats.org/presentationml/2006/main">
   <p:cSld>
     <p:bg>
@@ -6186,7 +7229,7 @@
 </p:sld>
 </file>
 
-<file path=ppt/slides/slide11.xml><?xml version="1.0" encoding="utf-8"?>
+<file path=ppt/slides/slide12.xml><?xml version="1.0" encoding="utf-8"?>
 <p:sld xmlns:a="http://schemas.openxmlformats.org/drawingml/2006/main" xmlns:r="http://schemas.openxmlformats.org/officeDocument/2006/relationships" xmlns:p="http://schemas.openxmlformats.org/presentationml/2006/main">
   <p:cSld>
     <p:bg>
@@ -7253,7 +8296,7 @@
 </p:sld>
 </file>
 
-<file path=ppt/slides/slide12.xml><?xml version="1.0" encoding="utf-8"?>
+<file path=ppt/slides/slide13.xml><?xml version="1.0" encoding="utf-8"?>
 <p:sld xmlns:a="http://schemas.openxmlformats.org/drawingml/2006/main" xmlns:r="http://schemas.openxmlformats.org/officeDocument/2006/relationships" xmlns:p="http://schemas.openxmlformats.org/presentationml/2006/main">
   <p:cSld>
     <p:bg>
@@ -8201,7 +9244,946 @@
 </p:sld>
 </file>
 
-<file path=ppt/slides/slide13.xml><?xml version="1.0" encoding="utf-8"?>
+<file path=ppt/slides/slide14.xml><?xml version="1.0" encoding="utf-8"?>
+<p:sld xmlns:a="http://schemas.openxmlformats.org/drawingml/2006/main" xmlns:r="http://schemas.openxmlformats.org/officeDocument/2006/relationships" xmlns:p="http://schemas.openxmlformats.org/presentationml/2006/main">
+  <p:cSld>
+    <p:bg>
+      <p:bgPr>
+        <a:solidFill>
+          <a:schemeClr val="bg1"/>
+        </a:solidFill>
+        <a:effectLst/>
+      </p:bgPr>
+    </p:bg>
+    <p:spTree>
+      <p:nvGrpSpPr>
+        <p:cNvPr id="1" name=""/>
+        <p:cNvGrpSpPr/>
+        <p:nvPr/>
+      </p:nvGrpSpPr>
+      <p:grpSpPr>
+        <a:xfrm>
+          <a:off x="0" y="0"/>
+          <a:ext cx="0" cy="0"/>
+          <a:chOff x="0" y="0"/>
+          <a:chExt cx="0" cy="0"/>
+        </a:xfrm>
+      </p:grpSpPr>
+      <p:sp useBgFill="1">
+        <p:nvSpPr>
+          <p:cNvPr id="31" name="Rectangle 13">
+            <a:extLst>
+              <a:ext uri="{FF2B5EF4-FFF2-40B4-BE49-F238E27FC236}">
+                <a16:creationId xmlns:a16="http://schemas.microsoft.com/office/drawing/2014/main" id="{45D37F4E-DDB4-456B-97E0-9937730A039F}"/>
+              </a:ext>
+              <a:ext uri="{C183D7F6-B498-43B3-948B-1728B52AA6E4}">
+                <adec:decorative xmlns:adec="http://schemas.microsoft.com/office/drawing/2017/decorative" val="1"/>
+              </a:ext>
+            </a:extLst>
+          </p:cNvPr>
+          <p:cNvSpPr>
+            <a:spLocks noGrp="1" noRot="1" noChangeAspect="1" noMove="1" noResize="1" noEditPoints="1" noAdjustHandles="1" noChangeArrowheads="1" noChangeShapeType="1" noTextEdit="1"/>
+          </p:cNvSpPr>
+          <p:nvPr>
+            <p:extLst>
+              <p:ext uri="{386F3935-93C4-4BCD-93E2-E3B085C9AB24}">
+                <p16:designElem xmlns:p16="http://schemas.microsoft.com/office/powerpoint/2015/main" val="1"/>
+              </p:ext>
+            </p:extLst>
+          </p:nvPr>
+        </p:nvSpPr>
+        <p:spPr>
+          <a:xfrm>
+            <a:off x="0" y="0"/>
+            <a:ext cx="12188952" cy="6858000"/>
+          </a:xfrm>
+          <a:prstGeom prst="rect">
+            <a:avLst/>
+          </a:prstGeom>
+          <a:ln>
+            <a:noFill/>
+          </a:ln>
+        </p:spPr>
+        <p:style>
+          <a:lnRef idx="2">
+            <a:schemeClr val="accent1">
+              <a:shade val="50000"/>
+            </a:schemeClr>
+          </a:lnRef>
+          <a:fillRef idx="1">
+            <a:schemeClr val="accent1"/>
+          </a:fillRef>
+          <a:effectRef idx="0">
+            <a:schemeClr val="accent1"/>
+          </a:effectRef>
+          <a:fontRef idx="minor">
+            <a:schemeClr val="lt1"/>
+          </a:fontRef>
+        </p:style>
+        <p:txBody>
+          <a:bodyPr rtlCol="0" anchor="ctr"/>
+          <a:lstStyle/>
+          <a:p>
+            <a:pPr algn="ctr"/>
+            <a:endParaRPr lang="en-US"/>
+          </a:p>
+        </p:txBody>
+      </p:sp>
+      <p:sp>
+        <p:nvSpPr>
+          <p:cNvPr id="9" name="Title 8">
+            <a:extLst>
+              <a:ext uri="{FF2B5EF4-FFF2-40B4-BE49-F238E27FC236}">
+                <a16:creationId xmlns:a16="http://schemas.microsoft.com/office/drawing/2014/main" id="{35493AF0-80AA-F04C-BE18-12651EE22F56}"/>
+              </a:ext>
+            </a:extLst>
+          </p:cNvPr>
+          <p:cNvSpPr>
+            <a:spLocks noGrp="1"/>
+          </p:cNvSpPr>
+          <p:nvPr>
+            <p:ph type="title"/>
+          </p:nvPr>
+        </p:nvSpPr>
+        <p:spPr>
+          <a:xfrm>
+            <a:off x="572493" y="238539"/>
+            <a:ext cx="11018520" cy="1434415"/>
+          </a:xfrm>
+        </p:spPr>
+        <p:txBody>
+          <a:bodyPr anchor="b">
+            <a:normAutofit/>
+          </a:bodyPr>
+          <a:lstStyle/>
+          <a:p>
+            <a:r>
+              <a:rPr lang="en-GB" sz="5400" dirty="0"/>
+              <a:t>DEMO</a:t>
+            </a:r>
+            <a:endParaRPr lang="en-IT" sz="5400" dirty="0"/>
+          </a:p>
+        </p:txBody>
+      </p:sp>
+      <p:sp>
+        <p:nvSpPr>
+          <p:cNvPr id="32" name="sketchy line">
+            <a:extLst>
+              <a:ext uri="{FF2B5EF4-FFF2-40B4-BE49-F238E27FC236}">
+                <a16:creationId xmlns:a16="http://schemas.microsoft.com/office/drawing/2014/main" id="{B2DD41CD-8F47-4F56-AD12-4E2FF7696987}"/>
+              </a:ext>
+              <a:ext uri="{C183D7F6-B498-43B3-948B-1728B52AA6E4}">
+                <adec:decorative xmlns:adec="http://schemas.microsoft.com/office/drawing/2017/decorative" val="1"/>
+              </a:ext>
+            </a:extLst>
+          </p:cNvPr>
+          <p:cNvSpPr>
+            <a:spLocks noGrp="1" noRot="1" noChangeAspect="1" noMove="1" noResize="1" noEditPoints="1" noAdjustHandles="1" noChangeArrowheads="1" noChangeShapeType="1" noTextEdit="1"/>
+          </p:cNvSpPr>
+          <p:nvPr>
+            <p:extLst>
+              <p:ext uri="{386F3935-93C4-4BCD-93E2-E3B085C9AB24}">
+                <p16:designElem xmlns:p16="http://schemas.microsoft.com/office/powerpoint/2015/main" val="1"/>
+              </p:ext>
+            </p:extLst>
+          </p:nvPr>
+        </p:nvSpPr>
+        <p:spPr>
+          <a:xfrm>
+            <a:off x="572493" y="1681544"/>
+            <a:ext cx="10972800" cy="18288"/>
+          </a:xfrm>
+          <a:custGeom>
+            <a:avLst/>
+            <a:gdLst>
+              <a:gd name="connsiteX0" fmla="*/ 0 w 10972800"/>
+              <a:gd name="connsiteY0" fmla="*/ 0 h 18288"/>
+              <a:gd name="connsiteX1" fmla="*/ 356616 w 10972800"/>
+              <a:gd name="connsiteY1" fmla="*/ 0 h 18288"/>
+              <a:gd name="connsiteX2" fmla="*/ 1042416 w 10972800"/>
+              <a:gd name="connsiteY2" fmla="*/ 0 h 18288"/>
+              <a:gd name="connsiteX3" fmla="*/ 1947672 w 10972800"/>
+              <a:gd name="connsiteY3" fmla="*/ 0 h 18288"/>
+              <a:gd name="connsiteX4" fmla="*/ 2633472 w 10972800"/>
+              <a:gd name="connsiteY4" fmla="*/ 0 h 18288"/>
+              <a:gd name="connsiteX5" fmla="*/ 2990088 w 10972800"/>
+              <a:gd name="connsiteY5" fmla="*/ 0 h 18288"/>
+              <a:gd name="connsiteX6" fmla="*/ 3456432 w 10972800"/>
+              <a:gd name="connsiteY6" fmla="*/ 0 h 18288"/>
+              <a:gd name="connsiteX7" fmla="*/ 4361688 w 10972800"/>
+              <a:gd name="connsiteY7" fmla="*/ 0 h 18288"/>
+              <a:gd name="connsiteX8" fmla="*/ 5266944 w 10972800"/>
+              <a:gd name="connsiteY8" fmla="*/ 0 h 18288"/>
+              <a:gd name="connsiteX9" fmla="*/ 6172200 w 10972800"/>
+              <a:gd name="connsiteY9" fmla="*/ 0 h 18288"/>
+              <a:gd name="connsiteX10" fmla="*/ 6528816 w 10972800"/>
+              <a:gd name="connsiteY10" fmla="*/ 0 h 18288"/>
+              <a:gd name="connsiteX11" fmla="*/ 7214616 w 10972800"/>
+              <a:gd name="connsiteY11" fmla="*/ 0 h 18288"/>
+              <a:gd name="connsiteX12" fmla="*/ 7790688 w 10972800"/>
+              <a:gd name="connsiteY12" fmla="*/ 0 h 18288"/>
+              <a:gd name="connsiteX13" fmla="*/ 8147304 w 10972800"/>
+              <a:gd name="connsiteY13" fmla="*/ 0 h 18288"/>
+              <a:gd name="connsiteX14" fmla="*/ 9052560 w 10972800"/>
+              <a:gd name="connsiteY14" fmla="*/ 0 h 18288"/>
+              <a:gd name="connsiteX15" fmla="*/ 9409176 w 10972800"/>
+              <a:gd name="connsiteY15" fmla="*/ 0 h 18288"/>
+              <a:gd name="connsiteX16" fmla="*/ 9765792 w 10972800"/>
+              <a:gd name="connsiteY16" fmla="*/ 0 h 18288"/>
+              <a:gd name="connsiteX17" fmla="*/ 10341864 w 10972800"/>
+              <a:gd name="connsiteY17" fmla="*/ 0 h 18288"/>
+              <a:gd name="connsiteX18" fmla="*/ 10972800 w 10972800"/>
+              <a:gd name="connsiteY18" fmla="*/ 0 h 18288"/>
+              <a:gd name="connsiteX19" fmla="*/ 10972800 w 10972800"/>
+              <a:gd name="connsiteY19" fmla="*/ 18288 h 18288"/>
+              <a:gd name="connsiteX20" fmla="*/ 10177272 w 10972800"/>
+              <a:gd name="connsiteY20" fmla="*/ 18288 h 18288"/>
+              <a:gd name="connsiteX21" fmla="*/ 9820656 w 10972800"/>
+              <a:gd name="connsiteY21" fmla="*/ 18288 h 18288"/>
+              <a:gd name="connsiteX22" fmla="*/ 9464040 w 10972800"/>
+              <a:gd name="connsiteY22" fmla="*/ 18288 h 18288"/>
+              <a:gd name="connsiteX23" fmla="*/ 8778240 w 10972800"/>
+              <a:gd name="connsiteY23" fmla="*/ 18288 h 18288"/>
+              <a:gd name="connsiteX24" fmla="*/ 8421624 w 10972800"/>
+              <a:gd name="connsiteY24" fmla="*/ 18288 h 18288"/>
+              <a:gd name="connsiteX25" fmla="*/ 7735824 w 10972800"/>
+              <a:gd name="connsiteY25" fmla="*/ 18288 h 18288"/>
+              <a:gd name="connsiteX26" fmla="*/ 6940296 w 10972800"/>
+              <a:gd name="connsiteY26" fmla="*/ 18288 h 18288"/>
+              <a:gd name="connsiteX27" fmla="*/ 6254496 w 10972800"/>
+              <a:gd name="connsiteY27" fmla="*/ 18288 h 18288"/>
+              <a:gd name="connsiteX28" fmla="*/ 5458968 w 10972800"/>
+              <a:gd name="connsiteY28" fmla="*/ 18288 h 18288"/>
+              <a:gd name="connsiteX29" fmla="*/ 4663440 w 10972800"/>
+              <a:gd name="connsiteY29" fmla="*/ 18288 h 18288"/>
+              <a:gd name="connsiteX30" fmla="*/ 4306824 w 10972800"/>
+              <a:gd name="connsiteY30" fmla="*/ 18288 h 18288"/>
+              <a:gd name="connsiteX31" fmla="*/ 3840480 w 10972800"/>
+              <a:gd name="connsiteY31" fmla="*/ 18288 h 18288"/>
+              <a:gd name="connsiteX32" fmla="*/ 3264408 w 10972800"/>
+              <a:gd name="connsiteY32" fmla="*/ 18288 h 18288"/>
+              <a:gd name="connsiteX33" fmla="*/ 2578608 w 10972800"/>
+              <a:gd name="connsiteY33" fmla="*/ 18288 h 18288"/>
+              <a:gd name="connsiteX34" fmla="*/ 1673352 w 10972800"/>
+              <a:gd name="connsiteY34" fmla="*/ 18288 h 18288"/>
+              <a:gd name="connsiteX35" fmla="*/ 877824 w 10972800"/>
+              <a:gd name="connsiteY35" fmla="*/ 18288 h 18288"/>
+              <a:gd name="connsiteX36" fmla="*/ 0 w 10972800"/>
+              <a:gd name="connsiteY36" fmla="*/ 18288 h 18288"/>
+              <a:gd name="connsiteX37" fmla="*/ 0 w 10972800"/>
+              <a:gd name="connsiteY37" fmla="*/ 0 h 18288"/>
+            </a:gdLst>
+            <a:ahLst/>
+            <a:cxnLst>
+              <a:cxn ang="0">
+                <a:pos x="connsiteX0" y="connsiteY0"/>
+              </a:cxn>
+              <a:cxn ang="0">
+                <a:pos x="connsiteX1" y="connsiteY1"/>
+              </a:cxn>
+              <a:cxn ang="0">
+                <a:pos x="connsiteX2" y="connsiteY2"/>
+              </a:cxn>
+              <a:cxn ang="0">
+                <a:pos x="connsiteX3" y="connsiteY3"/>
+              </a:cxn>
+              <a:cxn ang="0">
+                <a:pos x="connsiteX4" y="connsiteY4"/>
+              </a:cxn>
+              <a:cxn ang="0">
+                <a:pos x="connsiteX5" y="connsiteY5"/>
+              </a:cxn>
+              <a:cxn ang="0">
+                <a:pos x="connsiteX6" y="connsiteY6"/>
+              </a:cxn>
+              <a:cxn ang="0">
+                <a:pos x="connsiteX7" y="connsiteY7"/>
+              </a:cxn>
+              <a:cxn ang="0">
+                <a:pos x="connsiteX8" y="connsiteY8"/>
+              </a:cxn>
+              <a:cxn ang="0">
+                <a:pos x="connsiteX9" y="connsiteY9"/>
+              </a:cxn>
+              <a:cxn ang="0">
+                <a:pos x="connsiteX10" y="connsiteY10"/>
+              </a:cxn>
+              <a:cxn ang="0">
+                <a:pos x="connsiteX11" y="connsiteY11"/>
+              </a:cxn>
+              <a:cxn ang="0">
+                <a:pos x="connsiteX12" y="connsiteY12"/>
+              </a:cxn>
+              <a:cxn ang="0">
+                <a:pos x="connsiteX13" y="connsiteY13"/>
+              </a:cxn>
+              <a:cxn ang="0">
+                <a:pos x="connsiteX14" y="connsiteY14"/>
+              </a:cxn>
+              <a:cxn ang="0">
+                <a:pos x="connsiteX15" y="connsiteY15"/>
+              </a:cxn>
+              <a:cxn ang="0">
+                <a:pos x="connsiteX16" y="connsiteY16"/>
+              </a:cxn>
+              <a:cxn ang="0">
+                <a:pos x="connsiteX17" y="connsiteY17"/>
+              </a:cxn>
+              <a:cxn ang="0">
+                <a:pos x="connsiteX18" y="connsiteY18"/>
+              </a:cxn>
+              <a:cxn ang="0">
+                <a:pos x="connsiteX19" y="connsiteY19"/>
+              </a:cxn>
+              <a:cxn ang="0">
+                <a:pos x="connsiteX20" y="connsiteY20"/>
+              </a:cxn>
+              <a:cxn ang="0">
+                <a:pos x="connsiteX21" y="connsiteY21"/>
+              </a:cxn>
+              <a:cxn ang="0">
+                <a:pos x="connsiteX22" y="connsiteY22"/>
+              </a:cxn>
+              <a:cxn ang="0">
+                <a:pos x="connsiteX23" y="connsiteY23"/>
+              </a:cxn>
+              <a:cxn ang="0">
+                <a:pos x="connsiteX24" y="connsiteY24"/>
+              </a:cxn>
+              <a:cxn ang="0">
+                <a:pos x="connsiteX25" y="connsiteY25"/>
+              </a:cxn>
+              <a:cxn ang="0">
+                <a:pos x="connsiteX26" y="connsiteY26"/>
+              </a:cxn>
+              <a:cxn ang="0">
+                <a:pos x="connsiteX27" y="connsiteY27"/>
+              </a:cxn>
+              <a:cxn ang="0">
+                <a:pos x="connsiteX28" y="connsiteY28"/>
+              </a:cxn>
+              <a:cxn ang="0">
+                <a:pos x="connsiteX29" y="connsiteY29"/>
+              </a:cxn>
+              <a:cxn ang="0">
+                <a:pos x="connsiteX30" y="connsiteY30"/>
+              </a:cxn>
+              <a:cxn ang="0">
+                <a:pos x="connsiteX31" y="connsiteY31"/>
+              </a:cxn>
+              <a:cxn ang="0">
+                <a:pos x="connsiteX32" y="connsiteY32"/>
+              </a:cxn>
+              <a:cxn ang="0">
+                <a:pos x="connsiteX33" y="connsiteY33"/>
+              </a:cxn>
+              <a:cxn ang="0">
+                <a:pos x="connsiteX34" y="connsiteY34"/>
+              </a:cxn>
+              <a:cxn ang="0">
+                <a:pos x="connsiteX35" y="connsiteY35"/>
+              </a:cxn>
+              <a:cxn ang="0">
+                <a:pos x="connsiteX36" y="connsiteY36"/>
+              </a:cxn>
+              <a:cxn ang="0">
+                <a:pos x="connsiteX37" y="connsiteY37"/>
+              </a:cxn>
+            </a:cxnLst>
+            <a:rect l="l" t="t" r="r" b="b"/>
+            <a:pathLst>
+              <a:path w="10972800" h="18288" fill="none" extrusionOk="0">
+                <a:moveTo>
+                  <a:pt x="0" y="0"/>
+                </a:moveTo>
+                <a:cubicBezTo>
+                  <a:pt x="165916" y="-1866"/>
+                  <a:pt x="188720" y="13756"/>
+                  <a:pt x="356616" y="0"/>
+                </a:cubicBezTo>
+                <a:cubicBezTo>
+                  <a:pt x="524512" y="-13756"/>
+                  <a:pt x="734781" y="8922"/>
+                  <a:pt x="1042416" y="0"/>
+                </a:cubicBezTo>
+                <a:cubicBezTo>
+                  <a:pt x="1350051" y="-8922"/>
+                  <a:pt x="1595982" y="-26315"/>
+                  <a:pt x="1947672" y="0"/>
+                </a:cubicBezTo>
+                <a:cubicBezTo>
+                  <a:pt x="2299362" y="26315"/>
+                  <a:pt x="2292691" y="-19526"/>
+                  <a:pt x="2633472" y="0"/>
+                </a:cubicBezTo>
+                <a:cubicBezTo>
+                  <a:pt x="2974253" y="19526"/>
+                  <a:pt x="2857309" y="10773"/>
+                  <a:pt x="2990088" y="0"/>
+                </a:cubicBezTo>
+                <a:cubicBezTo>
+                  <a:pt x="3122867" y="-10773"/>
+                  <a:pt x="3359343" y="7194"/>
+                  <a:pt x="3456432" y="0"/>
+                </a:cubicBezTo>
+                <a:cubicBezTo>
+                  <a:pt x="3553521" y="-7194"/>
+                  <a:pt x="4136258" y="5108"/>
+                  <a:pt x="4361688" y="0"/>
+                </a:cubicBezTo>
+                <a:cubicBezTo>
+                  <a:pt x="4587118" y="-5108"/>
+                  <a:pt x="4992424" y="-42958"/>
+                  <a:pt x="5266944" y="0"/>
+                </a:cubicBezTo>
+                <a:cubicBezTo>
+                  <a:pt x="5541464" y="42958"/>
+                  <a:pt x="5882966" y="-3430"/>
+                  <a:pt x="6172200" y="0"/>
+                </a:cubicBezTo>
+                <a:cubicBezTo>
+                  <a:pt x="6461434" y="3430"/>
+                  <a:pt x="6432127" y="6688"/>
+                  <a:pt x="6528816" y="0"/>
+                </a:cubicBezTo>
+                <a:cubicBezTo>
+                  <a:pt x="6625505" y="-6688"/>
+                  <a:pt x="6916805" y="-436"/>
+                  <a:pt x="7214616" y="0"/>
+                </a:cubicBezTo>
+                <a:cubicBezTo>
+                  <a:pt x="7512427" y="436"/>
+                  <a:pt x="7626159" y="-6909"/>
+                  <a:pt x="7790688" y="0"/>
+                </a:cubicBezTo>
+                <a:cubicBezTo>
+                  <a:pt x="7955217" y="6909"/>
+                  <a:pt x="8048891" y="15307"/>
+                  <a:pt x="8147304" y="0"/>
+                </a:cubicBezTo>
+                <a:cubicBezTo>
+                  <a:pt x="8245717" y="-15307"/>
+                  <a:pt x="8645618" y="-11734"/>
+                  <a:pt x="9052560" y="0"/>
+                </a:cubicBezTo>
+                <a:cubicBezTo>
+                  <a:pt x="9459502" y="11734"/>
+                  <a:pt x="9320584" y="8388"/>
+                  <a:pt x="9409176" y="0"/>
+                </a:cubicBezTo>
+                <a:cubicBezTo>
+                  <a:pt x="9497768" y="-8388"/>
+                  <a:pt x="9644192" y="8379"/>
+                  <a:pt x="9765792" y="0"/>
+                </a:cubicBezTo>
+                <a:cubicBezTo>
+                  <a:pt x="9887392" y="-8379"/>
+                  <a:pt x="10105220" y="-12663"/>
+                  <a:pt x="10341864" y="0"/>
+                </a:cubicBezTo>
+                <a:cubicBezTo>
+                  <a:pt x="10578508" y="12663"/>
+                  <a:pt x="10773103" y="-5786"/>
+                  <a:pt x="10972800" y="0"/>
+                </a:cubicBezTo>
+                <a:cubicBezTo>
+                  <a:pt x="10972146" y="8818"/>
+                  <a:pt x="10972240" y="13823"/>
+                  <a:pt x="10972800" y="18288"/>
+                </a:cubicBezTo>
+                <a:cubicBezTo>
+                  <a:pt x="10588778" y="31598"/>
+                  <a:pt x="10543381" y="-12698"/>
+                  <a:pt x="10177272" y="18288"/>
+                </a:cubicBezTo>
+                <a:cubicBezTo>
+                  <a:pt x="9811163" y="49274"/>
+                  <a:pt x="9996817" y="25662"/>
+                  <a:pt x="9820656" y="18288"/>
+                </a:cubicBezTo>
+                <a:cubicBezTo>
+                  <a:pt x="9644495" y="10914"/>
+                  <a:pt x="9607007" y="31631"/>
+                  <a:pt x="9464040" y="18288"/>
+                </a:cubicBezTo>
+                <a:cubicBezTo>
+                  <a:pt x="9321073" y="4945"/>
+                  <a:pt x="9114189" y="28940"/>
+                  <a:pt x="8778240" y="18288"/>
+                </a:cubicBezTo>
+                <a:cubicBezTo>
+                  <a:pt x="8442291" y="7636"/>
+                  <a:pt x="8594763" y="987"/>
+                  <a:pt x="8421624" y="18288"/>
+                </a:cubicBezTo>
+                <a:cubicBezTo>
+                  <a:pt x="8248485" y="35589"/>
+                  <a:pt x="7929515" y="37573"/>
+                  <a:pt x="7735824" y="18288"/>
+                </a:cubicBezTo>
+                <a:cubicBezTo>
+                  <a:pt x="7542133" y="-997"/>
+                  <a:pt x="7252504" y="33858"/>
+                  <a:pt x="6940296" y="18288"/>
+                </a:cubicBezTo>
+                <a:cubicBezTo>
+                  <a:pt x="6628088" y="2718"/>
+                  <a:pt x="6528503" y="48389"/>
+                  <a:pt x="6254496" y="18288"/>
+                </a:cubicBezTo>
+                <a:cubicBezTo>
+                  <a:pt x="5980489" y="-11813"/>
+                  <a:pt x="5695784" y="-3740"/>
+                  <a:pt x="5458968" y="18288"/>
+                </a:cubicBezTo>
+                <a:cubicBezTo>
+                  <a:pt x="5222152" y="40316"/>
+                  <a:pt x="5010751" y="19095"/>
+                  <a:pt x="4663440" y="18288"/>
+                </a:cubicBezTo>
+                <a:cubicBezTo>
+                  <a:pt x="4316129" y="17481"/>
+                  <a:pt x="4425552" y="1606"/>
+                  <a:pt x="4306824" y="18288"/>
+                </a:cubicBezTo>
+                <a:cubicBezTo>
+                  <a:pt x="4188096" y="34970"/>
+                  <a:pt x="3941535" y="7481"/>
+                  <a:pt x="3840480" y="18288"/>
+                </a:cubicBezTo>
+                <a:cubicBezTo>
+                  <a:pt x="3739425" y="29095"/>
+                  <a:pt x="3402388" y="17641"/>
+                  <a:pt x="3264408" y="18288"/>
+                </a:cubicBezTo>
+                <a:cubicBezTo>
+                  <a:pt x="3126428" y="18935"/>
+                  <a:pt x="2776779" y="9983"/>
+                  <a:pt x="2578608" y="18288"/>
+                </a:cubicBezTo>
+                <a:cubicBezTo>
+                  <a:pt x="2380437" y="26593"/>
+                  <a:pt x="1909468" y="25818"/>
+                  <a:pt x="1673352" y="18288"/>
+                </a:cubicBezTo>
+                <a:cubicBezTo>
+                  <a:pt x="1437236" y="10758"/>
+                  <a:pt x="1131180" y="49884"/>
+                  <a:pt x="877824" y="18288"/>
+                </a:cubicBezTo>
+                <a:cubicBezTo>
+                  <a:pt x="624468" y="-13308"/>
+                  <a:pt x="206753" y="2195"/>
+                  <a:pt x="0" y="18288"/>
+                </a:cubicBezTo>
+                <a:cubicBezTo>
+                  <a:pt x="313" y="10654"/>
+                  <a:pt x="-263" y="4056"/>
+                  <a:pt x="0" y="0"/>
+                </a:cubicBezTo>
+                <a:close/>
+              </a:path>
+              <a:path w="10972800" h="18288" stroke="0" extrusionOk="0">
+                <a:moveTo>
+                  <a:pt x="0" y="0"/>
+                </a:moveTo>
+                <a:cubicBezTo>
+                  <a:pt x="164017" y="-17675"/>
+                  <a:pt x="309425" y="9913"/>
+                  <a:pt x="466344" y="0"/>
+                </a:cubicBezTo>
+                <a:cubicBezTo>
+                  <a:pt x="623263" y="-9913"/>
+                  <a:pt x="659300" y="-14524"/>
+                  <a:pt x="822960" y="0"/>
+                </a:cubicBezTo>
+                <a:cubicBezTo>
+                  <a:pt x="986620" y="14524"/>
+                  <a:pt x="1105222" y="-16481"/>
+                  <a:pt x="1289304" y="0"/>
+                </a:cubicBezTo>
+                <a:cubicBezTo>
+                  <a:pt x="1473386" y="16481"/>
+                  <a:pt x="1693223" y="26161"/>
+                  <a:pt x="1975104" y="0"/>
+                </a:cubicBezTo>
+                <a:cubicBezTo>
+                  <a:pt x="2256985" y="-26161"/>
+                  <a:pt x="2435781" y="23061"/>
+                  <a:pt x="2770632" y="0"/>
+                </a:cubicBezTo>
+                <a:cubicBezTo>
+                  <a:pt x="3105483" y="-23061"/>
+                  <a:pt x="3247479" y="-44011"/>
+                  <a:pt x="3675888" y="0"/>
+                </a:cubicBezTo>
+                <a:cubicBezTo>
+                  <a:pt x="4104297" y="44011"/>
+                  <a:pt x="4280918" y="4017"/>
+                  <a:pt x="4581144" y="0"/>
+                </a:cubicBezTo>
+                <a:cubicBezTo>
+                  <a:pt x="4881370" y="-4017"/>
+                  <a:pt x="5021699" y="-11889"/>
+                  <a:pt x="5157216" y="0"/>
+                </a:cubicBezTo>
+                <a:cubicBezTo>
+                  <a:pt x="5292733" y="11889"/>
+                  <a:pt x="5603398" y="-17698"/>
+                  <a:pt x="5952744" y="0"/>
+                </a:cubicBezTo>
+                <a:cubicBezTo>
+                  <a:pt x="6302090" y="17698"/>
+                  <a:pt x="6353093" y="-11909"/>
+                  <a:pt x="6638544" y="0"/>
+                </a:cubicBezTo>
+                <a:cubicBezTo>
+                  <a:pt x="6923995" y="11909"/>
+                  <a:pt x="7053404" y="21630"/>
+                  <a:pt x="7214616" y="0"/>
+                </a:cubicBezTo>
+                <a:cubicBezTo>
+                  <a:pt x="7375828" y="-21630"/>
+                  <a:pt x="7837963" y="3886"/>
+                  <a:pt x="8010144" y="0"/>
+                </a:cubicBezTo>
+                <a:cubicBezTo>
+                  <a:pt x="8182325" y="-3886"/>
+                  <a:pt x="8224183" y="16009"/>
+                  <a:pt x="8366760" y="0"/>
+                </a:cubicBezTo>
+                <a:cubicBezTo>
+                  <a:pt x="8509337" y="-16009"/>
+                  <a:pt x="8687920" y="-5720"/>
+                  <a:pt x="8942832" y="0"/>
+                </a:cubicBezTo>
+                <a:cubicBezTo>
+                  <a:pt x="9197744" y="5720"/>
+                  <a:pt x="9368437" y="20479"/>
+                  <a:pt x="9628632" y="0"/>
+                </a:cubicBezTo>
+                <a:cubicBezTo>
+                  <a:pt x="9888827" y="-20479"/>
+                  <a:pt x="10560858" y="-20746"/>
+                  <a:pt x="10972800" y="0"/>
+                </a:cubicBezTo>
+                <a:cubicBezTo>
+                  <a:pt x="10972186" y="5722"/>
+                  <a:pt x="10972980" y="12495"/>
+                  <a:pt x="10972800" y="18288"/>
+                </a:cubicBezTo>
+                <a:cubicBezTo>
+                  <a:pt x="10786146" y="12536"/>
+                  <a:pt x="10623717" y="14033"/>
+                  <a:pt x="10506456" y="18288"/>
+                </a:cubicBezTo>
+                <a:cubicBezTo>
+                  <a:pt x="10389195" y="22543"/>
+                  <a:pt x="10296178" y="20107"/>
+                  <a:pt x="10149840" y="18288"/>
+                </a:cubicBezTo>
+                <a:cubicBezTo>
+                  <a:pt x="10003502" y="16469"/>
+                  <a:pt x="9767530" y="28891"/>
+                  <a:pt x="9464040" y="18288"/>
+                </a:cubicBezTo>
+                <a:cubicBezTo>
+                  <a:pt x="9160550" y="7685"/>
+                  <a:pt x="9229050" y="2659"/>
+                  <a:pt x="8997696" y="18288"/>
+                </a:cubicBezTo>
+                <a:cubicBezTo>
+                  <a:pt x="8766342" y="33917"/>
+                  <a:pt x="8340136" y="34864"/>
+                  <a:pt x="8092440" y="18288"/>
+                </a:cubicBezTo>
+                <a:cubicBezTo>
+                  <a:pt x="7844744" y="1712"/>
+                  <a:pt x="7863720" y="27405"/>
+                  <a:pt x="7735824" y="18288"/>
+                </a:cubicBezTo>
+                <a:cubicBezTo>
+                  <a:pt x="7607928" y="9171"/>
+                  <a:pt x="7323619" y="461"/>
+                  <a:pt x="7050024" y="18288"/>
+                </a:cubicBezTo>
+                <a:cubicBezTo>
+                  <a:pt x="6776429" y="36115"/>
+                  <a:pt x="6787899" y="28206"/>
+                  <a:pt x="6693408" y="18288"/>
+                </a:cubicBezTo>
+                <a:cubicBezTo>
+                  <a:pt x="6598917" y="8370"/>
+                  <a:pt x="6395231" y="19114"/>
+                  <a:pt x="6227064" y="18288"/>
+                </a:cubicBezTo>
+                <a:cubicBezTo>
+                  <a:pt x="6058897" y="17462"/>
+                  <a:pt x="5618582" y="1091"/>
+                  <a:pt x="5431536" y="18288"/>
+                </a:cubicBezTo>
+                <a:cubicBezTo>
+                  <a:pt x="5244490" y="35485"/>
+                  <a:pt x="4729797" y="-9650"/>
+                  <a:pt x="4526280" y="18288"/>
+                </a:cubicBezTo>
+                <a:cubicBezTo>
+                  <a:pt x="4322763" y="46226"/>
+                  <a:pt x="4216797" y="756"/>
+                  <a:pt x="4059936" y="18288"/>
+                </a:cubicBezTo>
+                <a:cubicBezTo>
+                  <a:pt x="3903075" y="35820"/>
+                  <a:pt x="3537912" y="42098"/>
+                  <a:pt x="3374136" y="18288"/>
+                </a:cubicBezTo>
+                <a:cubicBezTo>
+                  <a:pt x="3210360" y="-5522"/>
+                  <a:pt x="3126842" y="39135"/>
+                  <a:pt x="2907792" y="18288"/>
+                </a:cubicBezTo>
+                <a:cubicBezTo>
+                  <a:pt x="2688742" y="-2559"/>
+                  <a:pt x="2490436" y="34100"/>
+                  <a:pt x="2112264" y="18288"/>
+                </a:cubicBezTo>
+                <a:cubicBezTo>
+                  <a:pt x="1734092" y="2476"/>
+                  <a:pt x="1744622" y="-7274"/>
+                  <a:pt x="1536192" y="18288"/>
+                </a:cubicBezTo>
+                <a:cubicBezTo>
+                  <a:pt x="1327762" y="43850"/>
+                  <a:pt x="1189025" y="6435"/>
+                  <a:pt x="1069848" y="18288"/>
+                </a:cubicBezTo>
+                <a:cubicBezTo>
+                  <a:pt x="950671" y="30141"/>
+                  <a:pt x="858345" y="33684"/>
+                  <a:pt x="713232" y="18288"/>
+                </a:cubicBezTo>
+                <a:cubicBezTo>
+                  <a:pt x="568119" y="2892"/>
+                  <a:pt x="250292" y="5410"/>
+                  <a:pt x="0" y="18288"/>
+                </a:cubicBezTo>
+                <a:cubicBezTo>
+                  <a:pt x="465" y="13062"/>
+                  <a:pt x="-894" y="9029"/>
+                  <a:pt x="0" y="0"/>
+                </a:cubicBezTo>
+                <a:close/>
+              </a:path>
+            </a:pathLst>
+          </a:custGeom>
+          <a:solidFill>
+            <a:schemeClr val="accent2">
+              <a:alpha val="75000"/>
+            </a:schemeClr>
+          </a:solidFill>
+          <a:ln w="44450" cap="rnd">
+            <a:solidFill>
+              <a:schemeClr val="accent2">
+                <a:alpha val="75000"/>
+              </a:schemeClr>
+            </a:solidFill>
+            <a:round/>
+            <a:extLst>
+              <a:ext uri="{C807C97D-BFC1-408E-A445-0C87EB9F89A2}">
+                <ask:lineSketchStyleProps xmlns:ask="http://schemas.microsoft.com/office/drawing/2018/sketchyshapes" sd="2727557108">
+                  <a:prstGeom prst="rect">
+                    <a:avLst/>
+                  </a:prstGeom>
+                  <ask:type>
+                    <ask:lineSketchFreehand/>
+                  </ask:type>
+                </ask:lineSketchStyleProps>
+              </a:ext>
+            </a:extLst>
+          </a:ln>
+        </p:spPr>
+        <p:style>
+          <a:lnRef idx="2">
+            <a:schemeClr val="accent1">
+              <a:shade val="50000"/>
+            </a:schemeClr>
+          </a:lnRef>
+          <a:fillRef idx="1">
+            <a:schemeClr val="accent1"/>
+          </a:fillRef>
+          <a:effectRef idx="0">
+            <a:schemeClr val="accent1"/>
+          </a:effectRef>
+          <a:fontRef idx="minor">
+            <a:schemeClr val="lt1"/>
+          </a:fontRef>
+        </p:style>
+        <p:txBody>
+          <a:bodyPr rtlCol="0" anchor="ctr"/>
+          <a:lstStyle/>
+          <a:p>
+            <a:pPr algn="ctr"/>
+            <a:endParaRPr lang="en-US"/>
+          </a:p>
+        </p:txBody>
+      </p:sp>
+      <p:sp>
+        <p:nvSpPr>
+          <p:cNvPr id="33" name="Content Placeholder 3">
+            <a:extLst>
+              <a:ext uri="{FF2B5EF4-FFF2-40B4-BE49-F238E27FC236}">
+                <a16:creationId xmlns:a16="http://schemas.microsoft.com/office/drawing/2014/main" id="{77E2D2AC-46B3-4926-CB7E-B3BAAF19E69D}"/>
+              </a:ext>
+            </a:extLst>
+          </p:cNvPr>
+          <p:cNvSpPr>
+            <a:spLocks noGrp="1"/>
+          </p:cNvSpPr>
+          <p:nvPr>
+            <p:ph idx="1"/>
+          </p:nvPr>
+        </p:nvSpPr>
+        <p:spPr>
+          <a:xfrm>
+            <a:off x="572493" y="2071316"/>
+            <a:ext cx="10972800" cy="4672286"/>
+          </a:xfrm>
+        </p:spPr>
+        <p:txBody>
+          <a:bodyPr anchor="t">
+            <a:normAutofit/>
+          </a:bodyPr>
+          <a:lstStyle/>
+          <a:p>
+            <a:pPr marL="0" indent="0">
+              <a:buNone/>
+            </a:pPr>
+            <a:r>
+              <a:rPr lang="en-GB" sz="2000" dirty="0"/>
+              <a:t>Scala Project: </a:t>
+            </a:r>
+            <a:r>
+              <a:rPr lang="en-GB" sz="2000" dirty="0">
+                <a:hlinkClick r:id="rId2"/>
+              </a:rPr>
+              <a:t>https://</a:t>
+            </a:r>
+            <a:r>
+              <a:rPr lang="en-GB" sz="2000" dirty="0" err="1">
+                <a:hlinkClick r:id="rId2"/>
+              </a:rPr>
+              <a:t>github.com</a:t>
+            </a:r>
+            <a:r>
+              <a:rPr lang="en-GB" sz="2000" dirty="0">
+                <a:hlinkClick r:id="rId2"/>
+              </a:rPr>
+              <a:t>/GB1609/</a:t>
+            </a:r>
+            <a:r>
+              <a:rPr lang="en-GB" sz="2000" dirty="0" err="1">
+                <a:hlinkClick r:id="rId2"/>
+              </a:rPr>
+              <a:t>SonarQubeDemo</a:t>
+            </a:r>
+            <a:endParaRPr lang="en-GB" sz="2000" dirty="0"/>
+          </a:p>
+        </p:txBody>
+      </p:sp>
+      <p:pic>
+        <p:nvPicPr>
+          <p:cNvPr id="5" name="Picture 4" descr="SonarQube: un valido strumento di analisi statica del codice - Intré">
+            <a:extLst>
+              <a:ext uri="{FF2B5EF4-FFF2-40B4-BE49-F238E27FC236}">
+                <a16:creationId xmlns:a16="http://schemas.microsoft.com/office/drawing/2014/main" id="{F8915CE3-EE40-99EF-6854-3B1406BEC346}"/>
+              </a:ext>
+            </a:extLst>
+          </p:cNvPr>
+          <p:cNvPicPr>
+            <a:picLocks noChangeAspect="1" noChangeArrowheads="1"/>
+          </p:cNvPicPr>
+          <p:nvPr/>
+        </p:nvPicPr>
+        <p:blipFill>
+          <a:blip r:embed="rId3">
+            <a:extLst>
+              <a:ext uri="{28A0092B-C50C-407E-A947-70E740481C1C}">
+                <a14:useLocalDpi xmlns:a14="http://schemas.microsoft.com/office/drawing/2010/main" val="0"/>
+              </a:ext>
+            </a:extLst>
+          </a:blip>
+          <a:srcRect/>
+          <a:stretch>
+            <a:fillRect/>
+          </a:stretch>
+        </p:blipFill>
+        <p:spPr bwMode="auto">
+          <a:xfrm>
+            <a:off x="9559556" y="0"/>
+            <a:ext cx="2632444" cy="813384"/>
+          </a:xfrm>
+          <a:prstGeom prst="rect">
+            <a:avLst/>
+          </a:prstGeom>
+          <a:noFill/>
+          <a:extLst>
+            <a:ext uri="{909E8E84-426E-40DD-AFC4-6F175D3DCCD1}">
+              <a14:hiddenFill xmlns:a14="http://schemas.microsoft.com/office/drawing/2010/main">
+                <a:solidFill>
+                  <a:srgbClr val="FFFFFF"/>
+                </a:solidFill>
+              </a14:hiddenFill>
+            </a:ext>
+          </a:extLst>
+        </p:spPr>
+      </p:pic>
+      <p:pic>
+        <p:nvPicPr>
+          <p:cNvPr id="2" name="Picture 1" descr="Agile Lab">
+            <a:extLst>
+              <a:ext uri="{FF2B5EF4-FFF2-40B4-BE49-F238E27FC236}">
+                <a16:creationId xmlns:a16="http://schemas.microsoft.com/office/drawing/2014/main" id="{B1ED74C4-4D91-194D-F6E3-291C41254FCF}"/>
+              </a:ext>
+              <a:ext uri="{C183D7F6-B498-43B3-948B-1728B52AA6E4}">
+                <adec:decorative xmlns:adec="http://schemas.microsoft.com/office/drawing/2017/decorative" val="0"/>
+              </a:ext>
+            </a:extLst>
+          </p:cNvPr>
+          <p:cNvPicPr>
+            <a:picLocks noChangeAspect="1"/>
+          </p:cNvPicPr>
+          <p:nvPr/>
+        </p:nvPicPr>
+        <p:blipFill>
+          <a:blip r:embed="rId4"/>
+          <a:stretch>
+            <a:fillRect/>
+          </a:stretch>
+        </p:blipFill>
+        <p:spPr>
+          <a:xfrm>
+            <a:off x="1" y="0"/>
+            <a:ext cx="2322268" cy="641278"/>
+          </a:xfrm>
+          <a:prstGeom prst="rect">
+            <a:avLst/>
+          </a:prstGeom>
+        </p:spPr>
+      </p:pic>
+    </p:spTree>
+    <p:extLst>
+      <p:ext uri="{BB962C8B-B14F-4D97-AF65-F5344CB8AC3E}">
+        <p14:creationId xmlns:p14="http://schemas.microsoft.com/office/powerpoint/2010/main" val="1162280790"/>
+      </p:ext>
+    </p:extLst>
+  </p:cSld>
+  <p:clrMapOvr>
+    <a:masterClrMapping/>
+  </p:clrMapOvr>
+</p:sld>
+</file>
+
+<file path=ppt/slides/slide15.xml><?xml version="1.0" encoding="utf-8"?>
 <p:sld xmlns:a="http://schemas.openxmlformats.org/drawingml/2006/main" xmlns:r="http://schemas.openxmlformats.org/officeDocument/2006/relationships" xmlns:p="http://schemas.openxmlformats.org/presentationml/2006/main">
   <p:cSld>
     <p:bg>
@@ -9038,16 +11020,12 @@
           <a:p>
             <a:r>
               <a:rPr lang="en-US" sz="2000" dirty="0"/>
-              <a:t>Token creation, password change, email notifications</a:t>
+              <a:t>Token creation, password change, </a:t>
             </a:r>
-          </a:p>
-          <a:p>
             <a:r>
-              <a:rPr lang="en-US" sz="2000" dirty="0"/>
-              <a:t>Integration with Jenkins</a:t>
+              <a:rPr lang="en-US" sz="2000"/>
+              <a:t>email notifications</a:t>
             </a:r>
-          </a:p>
-          <a:p>
             <a:endParaRPr lang="en-US" sz="2000" dirty="0"/>
           </a:p>
           <a:p>
@@ -9148,7 +11126,7 @@
 </p:sld>
 </file>
 
-<file path=ppt/slides/slide14.xml><?xml version="1.0" encoding="utf-8"?>
+<file path=ppt/slides/slide16.xml><?xml version="1.0" encoding="utf-8"?>
 <p:sld xmlns:a="http://schemas.openxmlformats.org/drawingml/2006/main" xmlns:r="http://schemas.openxmlformats.org/officeDocument/2006/relationships" xmlns:p="http://schemas.openxmlformats.org/presentationml/2006/main">
   <p:cSld>
     <p:bg>
@@ -9961,15 +11939,15 @@
           <a:p>
             <a:r>
               <a:rPr lang="en-GB" sz="2000" dirty="0"/>
-              <a:t>SonarQube performs static analysis of the code to evaluate the quality of it in terms of maintenance, reliability, efficiency and safety. The analysis of the quality code instead is performed in real time </a:t>
+              <a:t>SonarQube performs </a:t>
             </a:r>
             <a:r>
-              <a:rPr lang="en-GB" sz="2000"/>
-              <a:t>and it </a:t>
+              <a:rPr lang="en-GB" sz="2000" b="1" dirty="0"/>
+              <a:t>static</a:t>
             </a:r>
             <a:r>
               <a:rPr lang="en-GB" sz="2000" dirty="0"/>
-              <a:t>provides detailed feedback on the code, suggestions to improve it and report on the progress of the project. </a:t>
+              <a:t> analysis of the code to evaluate the quality of it in terms of maintenance, reliability, efficiency and safety. The analysis of the quality code instead is performed in real time and it provides detailed feedback on the code, suggestions to improve it and report on the progress of the project. </a:t>
             </a:r>
           </a:p>
           <a:p>
@@ -10343,7 +12321,7 @@
           <a:p>
             <a:r>
               <a:rPr lang="en-GB" sz="5400" dirty="0"/>
-              <a:t>What is SonarQube? What is it for?</a:t>
+              <a:t>What is SonarQube?</a:t>
             </a:r>
             <a:endParaRPr lang="en-IT" sz="5400" dirty="0"/>
           </a:p>
@@ -11041,31 +13019,19 @@
           <a:p>
             <a:pPr lvl="0"/>
             <a:r>
-              <a:rPr lang="en-GB" sz="2400" dirty="0"/>
-              <a:t>It is an open-source tool developed by </a:t>
+              <a:rPr lang="en-GB" dirty="0"/>
+              <a:t>SonarQube is an open-source tool developed by </a:t>
             </a:r>
             <a:r>
-              <a:rPr lang="en-GB" sz="2400" dirty="0" err="1">
+              <a:rPr lang="en-GB" dirty="0">
                 <a:hlinkClick r:id="rId2"/>
               </a:rPr>
               <a:t>SonarSource</a:t>
             </a:r>
             <a:r>
-              <a:rPr lang="en-GB" sz="2400" dirty="0"/>
-              <a:t> for continuous inspection of code quality, performing automatic detection of static analysis of code to detect bugs, code smells, and security vulnerabilities on 25+ programming languages. </a:t>
+              <a:rPr lang="en-GB" dirty="0"/>
+              <a:t> that helps programmers analyze and improve the quality of their code. It is a continuous integration tool used for detect and prevent defects, vulnerabilities and code smells in a code base.</a:t>
             </a:r>
-          </a:p>
-          <a:p>
-            <a:pPr lvl="0"/>
-            <a:endParaRPr lang="en-US" sz="2400" dirty="0"/>
-          </a:p>
-          <a:p>
-            <a:pPr lvl="0"/>
-            <a:r>
-              <a:rPr lang="en-GB" sz="2400" dirty="0"/>
-              <a:t>SonarQube offers reports on duplicated code, coding standards, unit tests, code coverage, code complexity, comments, bugs, and security vulnerabilities.</a:t>
-            </a:r>
-            <a:endParaRPr lang="en-US" sz="2400" dirty="0"/>
           </a:p>
         </p:txBody>
       </p:sp>
@@ -11228,67 +13194,6 @@
                       </p:childTnLst>
                     </p:cTn>
                   </p:par>
-                  <p:par>
-                    <p:cTn id="8" fill="hold">
-                      <p:stCondLst>
-                        <p:cond delay="indefinite"/>
-                      </p:stCondLst>
-                      <p:childTnLst>
-                        <p:par>
-                          <p:cTn id="9" fill="hold">
-                            <p:stCondLst>
-                              <p:cond delay="0"/>
-                            </p:stCondLst>
-                            <p:childTnLst>
-                              <p:par>
-                                <p:cTn id="10" presetID="9" presetClass="entr" presetSubtype="0" fill="hold" nodeType="clickEffect">
-                                  <p:stCondLst>
-                                    <p:cond delay="0"/>
-                                  </p:stCondLst>
-                                  <p:childTnLst>
-                                    <p:set>
-                                      <p:cBhvr>
-                                        <p:cTn id="11" dur="1" fill="hold">
-                                          <p:stCondLst>
-                                            <p:cond delay="0"/>
-                                          </p:stCondLst>
-                                        </p:cTn>
-                                        <p:tgtEl>
-                                          <p:spTgt spid="33">
-                                            <p:txEl>
-                                              <p:pRg st="2" end="2"/>
-                                            </p:txEl>
-                                          </p:spTgt>
-                                        </p:tgtEl>
-                                        <p:attrNameLst>
-                                          <p:attrName>style.visibility</p:attrName>
-                                        </p:attrNameLst>
-                                      </p:cBhvr>
-                                      <p:to>
-                                        <p:strVal val="visible"/>
-                                      </p:to>
-                                    </p:set>
-                                    <p:animEffect transition="in" filter="dissolve">
-                                      <p:cBhvr>
-                                        <p:cTn id="12" dur="500"/>
-                                        <p:tgtEl>
-                                          <p:spTgt spid="33">
-                                            <p:txEl>
-                                              <p:pRg st="2" end="2"/>
-                                            </p:txEl>
-                                          </p:spTgt>
-                                        </p:tgtEl>
-                                      </p:cBhvr>
-                                    </p:animEffect>
-                                  </p:childTnLst>
-                                </p:cTn>
-                              </p:par>
-                            </p:childTnLst>
-                          </p:cTn>
-                        </p:par>
-                      </p:childTnLst>
-                    </p:cTn>
-                  </p:par>
                 </p:childTnLst>
               </p:cTn>
               <p:prevCondLst>
@@ -11428,7 +13333,7 @@
           <a:lstStyle/>
           <a:p>
             <a:r>
-              <a:rPr lang="en-GB" sz="5400"/>
+              <a:rPr lang="en-GB" sz="5400" dirty="0"/>
               <a:t>How it works</a:t>
             </a:r>
             <a:endParaRPr lang="en-IT" sz="5400" dirty="0"/>
@@ -12130,7 +14035,22 @@
             </a:pPr>
             <a:r>
               <a:rPr lang="en-GB" sz="2400" dirty="0"/>
-              <a:t>SonarQube uses several code analysis techniques to identify potential problems in the source code, including:</a:t>
+              <a:t>SonarQube offers reports on duplicated code, coding standards, unit tests, code coverage, code complexity, comments, bugs, and security vulnerabilities. It supports over 20 programming languages making it a highly versatile tool.</a:t>
+            </a:r>
+          </a:p>
+          <a:p>
+            <a:pPr marL="0" indent="0">
+              <a:buNone/>
+            </a:pPr>
+            <a:endParaRPr lang="en-GB" sz="2400" dirty="0"/>
+          </a:p>
+          <a:p>
+            <a:pPr marL="0" indent="0">
+              <a:buNone/>
+            </a:pPr>
+            <a:r>
+              <a:rPr lang="en-GB" sz="2400" dirty="0"/>
+              <a:t>It uses several code analysis techniques to identify potential problems in the source code, including:</a:t>
             </a:r>
           </a:p>
           <a:p>
@@ -12279,7 +14199,7 @@
                                         <p:tgtEl>
                                           <p:spTgt spid="33">
                                             <p:txEl>
-                                              <p:pRg st="1" end="1"/>
+                                              <p:pRg st="3" end="3"/>
                                             </p:txEl>
                                           </p:spTgt>
                                         </p:tgtEl>
@@ -12297,7 +14217,7 @@
                                         <p:tgtEl>
                                           <p:spTgt spid="33">
                                             <p:txEl>
-                                              <p:pRg st="1" end="1"/>
+                                              <p:pRg st="3" end="3"/>
                                             </p:txEl>
                                           </p:spTgt>
                                         </p:tgtEl>
@@ -12340,7 +14260,7 @@
                                         <p:tgtEl>
                                           <p:spTgt spid="33">
                                             <p:txEl>
-                                              <p:pRg st="2" end="2"/>
+                                              <p:pRg st="4" end="4"/>
                                             </p:txEl>
                                           </p:spTgt>
                                         </p:tgtEl>
@@ -12358,7 +14278,7 @@
                                         <p:tgtEl>
                                           <p:spTgt spid="33">
                                             <p:txEl>
-                                              <p:pRg st="2" end="2"/>
+                                              <p:pRg st="4" end="4"/>
                                             </p:txEl>
                                           </p:spTgt>
                                         </p:tgtEl>
@@ -12401,7 +14321,7 @@
                                         <p:tgtEl>
                                           <p:spTgt spid="33">
                                             <p:txEl>
-                                              <p:pRg st="3" end="3"/>
+                                              <p:pRg st="5" end="5"/>
                                             </p:txEl>
                                           </p:spTgt>
                                         </p:tgtEl>
@@ -12419,7 +14339,7 @@
                                         <p:tgtEl>
                                           <p:spTgt spid="33">
                                             <p:txEl>
-                                              <p:pRg st="3" end="3"/>
+                                              <p:pRg st="5" end="5"/>
                                             </p:txEl>
                                           </p:spTgt>
                                         </p:tgtEl>
@@ -14147,6 +16067,1392 @@
           <a:p>
             <a:r>
               <a:rPr lang="en-GB" sz="5400" dirty="0"/>
+              <a:t>When and Why use it</a:t>
+            </a:r>
+            <a:endParaRPr lang="en-IT" sz="5400" dirty="0"/>
+          </a:p>
+        </p:txBody>
+      </p:sp>
+      <p:sp>
+        <p:nvSpPr>
+          <p:cNvPr id="32" name="sketchy line">
+            <a:extLst>
+              <a:ext uri="{FF2B5EF4-FFF2-40B4-BE49-F238E27FC236}">
+                <a16:creationId xmlns:a16="http://schemas.microsoft.com/office/drawing/2014/main" id="{B2DD41CD-8F47-4F56-AD12-4E2FF7696987}"/>
+              </a:ext>
+              <a:ext uri="{C183D7F6-B498-43B3-948B-1728B52AA6E4}">
+                <adec:decorative xmlns:adec="http://schemas.microsoft.com/office/drawing/2017/decorative" val="1"/>
+              </a:ext>
+            </a:extLst>
+          </p:cNvPr>
+          <p:cNvSpPr>
+            <a:spLocks noGrp="1" noRot="1" noChangeAspect="1" noMove="1" noResize="1" noEditPoints="1" noAdjustHandles="1" noChangeArrowheads="1" noChangeShapeType="1" noTextEdit="1"/>
+          </p:cNvSpPr>
+          <p:nvPr>
+            <p:extLst>
+              <p:ext uri="{386F3935-93C4-4BCD-93E2-E3B085C9AB24}">
+                <p16:designElem xmlns:p16="http://schemas.microsoft.com/office/powerpoint/2015/main" val="1"/>
+              </p:ext>
+            </p:extLst>
+          </p:nvPr>
+        </p:nvSpPr>
+        <p:spPr>
+          <a:xfrm>
+            <a:off x="572493" y="1681544"/>
+            <a:ext cx="10972800" cy="18288"/>
+          </a:xfrm>
+          <a:custGeom>
+            <a:avLst/>
+            <a:gdLst>
+              <a:gd name="connsiteX0" fmla="*/ 0 w 10972800"/>
+              <a:gd name="connsiteY0" fmla="*/ 0 h 18288"/>
+              <a:gd name="connsiteX1" fmla="*/ 356616 w 10972800"/>
+              <a:gd name="connsiteY1" fmla="*/ 0 h 18288"/>
+              <a:gd name="connsiteX2" fmla="*/ 1042416 w 10972800"/>
+              <a:gd name="connsiteY2" fmla="*/ 0 h 18288"/>
+              <a:gd name="connsiteX3" fmla="*/ 1947672 w 10972800"/>
+              <a:gd name="connsiteY3" fmla="*/ 0 h 18288"/>
+              <a:gd name="connsiteX4" fmla="*/ 2633472 w 10972800"/>
+              <a:gd name="connsiteY4" fmla="*/ 0 h 18288"/>
+              <a:gd name="connsiteX5" fmla="*/ 2990088 w 10972800"/>
+              <a:gd name="connsiteY5" fmla="*/ 0 h 18288"/>
+              <a:gd name="connsiteX6" fmla="*/ 3456432 w 10972800"/>
+              <a:gd name="connsiteY6" fmla="*/ 0 h 18288"/>
+              <a:gd name="connsiteX7" fmla="*/ 4361688 w 10972800"/>
+              <a:gd name="connsiteY7" fmla="*/ 0 h 18288"/>
+              <a:gd name="connsiteX8" fmla="*/ 5266944 w 10972800"/>
+              <a:gd name="connsiteY8" fmla="*/ 0 h 18288"/>
+              <a:gd name="connsiteX9" fmla="*/ 6172200 w 10972800"/>
+              <a:gd name="connsiteY9" fmla="*/ 0 h 18288"/>
+              <a:gd name="connsiteX10" fmla="*/ 6528816 w 10972800"/>
+              <a:gd name="connsiteY10" fmla="*/ 0 h 18288"/>
+              <a:gd name="connsiteX11" fmla="*/ 7214616 w 10972800"/>
+              <a:gd name="connsiteY11" fmla="*/ 0 h 18288"/>
+              <a:gd name="connsiteX12" fmla="*/ 7790688 w 10972800"/>
+              <a:gd name="connsiteY12" fmla="*/ 0 h 18288"/>
+              <a:gd name="connsiteX13" fmla="*/ 8147304 w 10972800"/>
+              <a:gd name="connsiteY13" fmla="*/ 0 h 18288"/>
+              <a:gd name="connsiteX14" fmla="*/ 9052560 w 10972800"/>
+              <a:gd name="connsiteY14" fmla="*/ 0 h 18288"/>
+              <a:gd name="connsiteX15" fmla="*/ 9409176 w 10972800"/>
+              <a:gd name="connsiteY15" fmla="*/ 0 h 18288"/>
+              <a:gd name="connsiteX16" fmla="*/ 9765792 w 10972800"/>
+              <a:gd name="connsiteY16" fmla="*/ 0 h 18288"/>
+              <a:gd name="connsiteX17" fmla="*/ 10341864 w 10972800"/>
+              <a:gd name="connsiteY17" fmla="*/ 0 h 18288"/>
+              <a:gd name="connsiteX18" fmla="*/ 10972800 w 10972800"/>
+              <a:gd name="connsiteY18" fmla="*/ 0 h 18288"/>
+              <a:gd name="connsiteX19" fmla="*/ 10972800 w 10972800"/>
+              <a:gd name="connsiteY19" fmla="*/ 18288 h 18288"/>
+              <a:gd name="connsiteX20" fmla="*/ 10177272 w 10972800"/>
+              <a:gd name="connsiteY20" fmla="*/ 18288 h 18288"/>
+              <a:gd name="connsiteX21" fmla="*/ 9820656 w 10972800"/>
+              <a:gd name="connsiteY21" fmla="*/ 18288 h 18288"/>
+              <a:gd name="connsiteX22" fmla="*/ 9464040 w 10972800"/>
+              <a:gd name="connsiteY22" fmla="*/ 18288 h 18288"/>
+              <a:gd name="connsiteX23" fmla="*/ 8778240 w 10972800"/>
+              <a:gd name="connsiteY23" fmla="*/ 18288 h 18288"/>
+              <a:gd name="connsiteX24" fmla="*/ 8421624 w 10972800"/>
+              <a:gd name="connsiteY24" fmla="*/ 18288 h 18288"/>
+              <a:gd name="connsiteX25" fmla="*/ 7735824 w 10972800"/>
+              <a:gd name="connsiteY25" fmla="*/ 18288 h 18288"/>
+              <a:gd name="connsiteX26" fmla="*/ 6940296 w 10972800"/>
+              <a:gd name="connsiteY26" fmla="*/ 18288 h 18288"/>
+              <a:gd name="connsiteX27" fmla="*/ 6254496 w 10972800"/>
+              <a:gd name="connsiteY27" fmla="*/ 18288 h 18288"/>
+              <a:gd name="connsiteX28" fmla="*/ 5458968 w 10972800"/>
+              <a:gd name="connsiteY28" fmla="*/ 18288 h 18288"/>
+              <a:gd name="connsiteX29" fmla="*/ 4663440 w 10972800"/>
+              <a:gd name="connsiteY29" fmla="*/ 18288 h 18288"/>
+              <a:gd name="connsiteX30" fmla="*/ 4306824 w 10972800"/>
+              <a:gd name="connsiteY30" fmla="*/ 18288 h 18288"/>
+              <a:gd name="connsiteX31" fmla="*/ 3840480 w 10972800"/>
+              <a:gd name="connsiteY31" fmla="*/ 18288 h 18288"/>
+              <a:gd name="connsiteX32" fmla="*/ 3264408 w 10972800"/>
+              <a:gd name="connsiteY32" fmla="*/ 18288 h 18288"/>
+              <a:gd name="connsiteX33" fmla="*/ 2578608 w 10972800"/>
+              <a:gd name="connsiteY33" fmla="*/ 18288 h 18288"/>
+              <a:gd name="connsiteX34" fmla="*/ 1673352 w 10972800"/>
+              <a:gd name="connsiteY34" fmla="*/ 18288 h 18288"/>
+              <a:gd name="connsiteX35" fmla="*/ 877824 w 10972800"/>
+              <a:gd name="connsiteY35" fmla="*/ 18288 h 18288"/>
+              <a:gd name="connsiteX36" fmla="*/ 0 w 10972800"/>
+              <a:gd name="connsiteY36" fmla="*/ 18288 h 18288"/>
+              <a:gd name="connsiteX37" fmla="*/ 0 w 10972800"/>
+              <a:gd name="connsiteY37" fmla="*/ 0 h 18288"/>
+            </a:gdLst>
+            <a:ahLst/>
+            <a:cxnLst>
+              <a:cxn ang="0">
+                <a:pos x="connsiteX0" y="connsiteY0"/>
+              </a:cxn>
+              <a:cxn ang="0">
+                <a:pos x="connsiteX1" y="connsiteY1"/>
+              </a:cxn>
+              <a:cxn ang="0">
+                <a:pos x="connsiteX2" y="connsiteY2"/>
+              </a:cxn>
+              <a:cxn ang="0">
+                <a:pos x="connsiteX3" y="connsiteY3"/>
+              </a:cxn>
+              <a:cxn ang="0">
+                <a:pos x="connsiteX4" y="connsiteY4"/>
+              </a:cxn>
+              <a:cxn ang="0">
+                <a:pos x="connsiteX5" y="connsiteY5"/>
+              </a:cxn>
+              <a:cxn ang="0">
+                <a:pos x="connsiteX6" y="connsiteY6"/>
+              </a:cxn>
+              <a:cxn ang="0">
+                <a:pos x="connsiteX7" y="connsiteY7"/>
+              </a:cxn>
+              <a:cxn ang="0">
+                <a:pos x="connsiteX8" y="connsiteY8"/>
+              </a:cxn>
+              <a:cxn ang="0">
+                <a:pos x="connsiteX9" y="connsiteY9"/>
+              </a:cxn>
+              <a:cxn ang="0">
+                <a:pos x="connsiteX10" y="connsiteY10"/>
+              </a:cxn>
+              <a:cxn ang="0">
+                <a:pos x="connsiteX11" y="connsiteY11"/>
+              </a:cxn>
+              <a:cxn ang="0">
+                <a:pos x="connsiteX12" y="connsiteY12"/>
+              </a:cxn>
+              <a:cxn ang="0">
+                <a:pos x="connsiteX13" y="connsiteY13"/>
+              </a:cxn>
+              <a:cxn ang="0">
+                <a:pos x="connsiteX14" y="connsiteY14"/>
+              </a:cxn>
+              <a:cxn ang="0">
+                <a:pos x="connsiteX15" y="connsiteY15"/>
+              </a:cxn>
+              <a:cxn ang="0">
+                <a:pos x="connsiteX16" y="connsiteY16"/>
+              </a:cxn>
+              <a:cxn ang="0">
+                <a:pos x="connsiteX17" y="connsiteY17"/>
+              </a:cxn>
+              <a:cxn ang="0">
+                <a:pos x="connsiteX18" y="connsiteY18"/>
+              </a:cxn>
+              <a:cxn ang="0">
+                <a:pos x="connsiteX19" y="connsiteY19"/>
+              </a:cxn>
+              <a:cxn ang="0">
+                <a:pos x="connsiteX20" y="connsiteY20"/>
+              </a:cxn>
+              <a:cxn ang="0">
+                <a:pos x="connsiteX21" y="connsiteY21"/>
+              </a:cxn>
+              <a:cxn ang="0">
+                <a:pos x="connsiteX22" y="connsiteY22"/>
+              </a:cxn>
+              <a:cxn ang="0">
+                <a:pos x="connsiteX23" y="connsiteY23"/>
+              </a:cxn>
+              <a:cxn ang="0">
+                <a:pos x="connsiteX24" y="connsiteY24"/>
+              </a:cxn>
+              <a:cxn ang="0">
+                <a:pos x="connsiteX25" y="connsiteY25"/>
+              </a:cxn>
+              <a:cxn ang="0">
+                <a:pos x="connsiteX26" y="connsiteY26"/>
+              </a:cxn>
+              <a:cxn ang="0">
+                <a:pos x="connsiteX27" y="connsiteY27"/>
+              </a:cxn>
+              <a:cxn ang="0">
+                <a:pos x="connsiteX28" y="connsiteY28"/>
+              </a:cxn>
+              <a:cxn ang="0">
+                <a:pos x="connsiteX29" y="connsiteY29"/>
+              </a:cxn>
+              <a:cxn ang="0">
+                <a:pos x="connsiteX30" y="connsiteY30"/>
+              </a:cxn>
+              <a:cxn ang="0">
+                <a:pos x="connsiteX31" y="connsiteY31"/>
+              </a:cxn>
+              <a:cxn ang="0">
+                <a:pos x="connsiteX32" y="connsiteY32"/>
+              </a:cxn>
+              <a:cxn ang="0">
+                <a:pos x="connsiteX33" y="connsiteY33"/>
+              </a:cxn>
+              <a:cxn ang="0">
+                <a:pos x="connsiteX34" y="connsiteY34"/>
+              </a:cxn>
+              <a:cxn ang="0">
+                <a:pos x="connsiteX35" y="connsiteY35"/>
+              </a:cxn>
+              <a:cxn ang="0">
+                <a:pos x="connsiteX36" y="connsiteY36"/>
+              </a:cxn>
+              <a:cxn ang="0">
+                <a:pos x="connsiteX37" y="connsiteY37"/>
+              </a:cxn>
+            </a:cxnLst>
+            <a:rect l="l" t="t" r="r" b="b"/>
+            <a:pathLst>
+              <a:path w="10972800" h="18288" fill="none" extrusionOk="0">
+                <a:moveTo>
+                  <a:pt x="0" y="0"/>
+                </a:moveTo>
+                <a:cubicBezTo>
+                  <a:pt x="165916" y="-1866"/>
+                  <a:pt x="188720" y="13756"/>
+                  <a:pt x="356616" y="0"/>
+                </a:cubicBezTo>
+                <a:cubicBezTo>
+                  <a:pt x="524512" y="-13756"/>
+                  <a:pt x="734781" y="8922"/>
+                  <a:pt x="1042416" y="0"/>
+                </a:cubicBezTo>
+                <a:cubicBezTo>
+                  <a:pt x="1350051" y="-8922"/>
+                  <a:pt x="1595982" y="-26315"/>
+                  <a:pt x="1947672" y="0"/>
+                </a:cubicBezTo>
+                <a:cubicBezTo>
+                  <a:pt x="2299362" y="26315"/>
+                  <a:pt x="2292691" y="-19526"/>
+                  <a:pt x="2633472" y="0"/>
+                </a:cubicBezTo>
+                <a:cubicBezTo>
+                  <a:pt x="2974253" y="19526"/>
+                  <a:pt x="2857309" y="10773"/>
+                  <a:pt x="2990088" y="0"/>
+                </a:cubicBezTo>
+                <a:cubicBezTo>
+                  <a:pt x="3122867" y="-10773"/>
+                  <a:pt x="3359343" y="7194"/>
+                  <a:pt x="3456432" y="0"/>
+                </a:cubicBezTo>
+                <a:cubicBezTo>
+                  <a:pt x="3553521" y="-7194"/>
+                  <a:pt x="4136258" y="5108"/>
+                  <a:pt x="4361688" y="0"/>
+                </a:cubicBezTo>
+                <a:cubicBezTo>
+                  <a:pt x="4587118" y="-5108"/>
+                  <a:pt x="4992424" y="-42958"/>
+                  <a:pt x="5266944" y="0"/>
+                </a:cubicBezTo>
+                <a:cubicBezTo>
+                  <a:pt x="5541464" y="42958"/>
+                  <a:pt x="5882966" y="-3430"/>
+                  <a:pt x="6172200" y="0"/>
+                </a:cubicBezTo>
+                <a:cubicBezTo>
+                  <a:pt x="6461434" y="3430"/>
+                  <a:pt x="6432127" y="6688"/>
+                  <a:pt x="6528816" y="0"/>
+                </a:cubicBezTo>
+                <a:cubicBezTo>
+                  <a:pt x="6625505" y="-6688"/>
+                  <a:pt x="6916805" y="-436"/>
+                  <a:pt x="7214616" y="0"/>
+                </a:cubicBezTo>
+                <a:cubicBezTo>
+                  <a:pt x="7512427" y="436"/>
+                  <a:pt x="7626159" y="-6909"/>
+                  <a:pt x="7790688" y="0"/>
+                </a:cubicBezTo>
+                <a:cubicBezTo>
+                  <a:pt x="7955217" y="6909"/>
+                  <a:pt x="8048891" y="15307"/>
+                  <a:pt x="8147304" y="0"/>
+                </a:cubicBezTo>
+                <a:cubicBezTo>
+                  <a:pt x="8245717" y="-15307"/>
+                  <a:pt x="8645618" y="-11734"/>
+                  <a:pt x="9052560" y="0"/>
+                </a:cubicBezTo>
+                <a:cubicBezTo>
+                  <a:pt x="9459502" y="11734"/>
+                  <a:pt x="9320584" y="8388"/>
+                  <a:pt x="9409176" y="0"/>
+                </a:cubicBezTo>
+                <a:cubicBezTo>
+                  <a:pt x="9497768" y="-8388"/>
+                  <a:pt x="9644192" y="8379"/>
+                  <a:pt x="9765792" y="0"/>
+                </a:cubicBezTo>
+                <a:cubicBezTo>
+                  <a:pt x="9887392" y="-8379"/>
+                  <a:pt x="10105220" y="-12663"/>
+                  <a:pt x="10341864" y="0"/>
+                </a:cubicBezTo>
+                <a:cubicBezTo>
+                  <a:pt x="10578508" y="12663"/>
+                  <a:pt x="10773103" y="-5786"/>
+                  <a:pt x="10972800" y="0"/>
+                </a:cubicBezTo>
+                <a:cubicBezTo>
+                  <a:pt x="10972146" y="8818"/>
+                  <a:pt x="10972240" y="13823"/>
+                  <a:pt x="10972800" y="18288"/>
+                </a:cubicBezTo>
+                <a:cubicBezTo>
+                  <a:pt x="10588778" y="31598"/>
+                  <a:pt x="10543381" y="-12698"/>
+                  <a:pt x="10177272" y="18288"/>
+                </a:cubicBezTo>
+                <a:cubicBezTo>
+                  <a:pt x="9811163" y="49274"/>
+                  <a:pt x="9996817" y="25662"/>
+                  <a:pt x="9820656" y="18288"/>
+                </a:cubicBezTo>
+                <a:cubicBezTo>
+                  <a:pt x="9644495" y="10914"/>
+                  <a:pt x="9607007" y="31631"/>
+                  <a:pt x="9464040" y="18288"/>
+                </a:cubicBezTo>
+                <a:cubicBezTo>
+                  <a:pt x="9321073" y="4945"/>
+                  <a:pt x="9114189" y="28940"/>
+                  <a:pt x="8778240" y="18288"/>
+                </a:cubicBezTo>
+                <a:cubicBezTo>
+                  <a:pt x="8442291" y="7636"/>
+                  <a:pt x="8594763" y="987"/>
+                  <a:pt x="8421624" y="18288"/>
+                </a:cubicBezTo>
+                <a:cubicBezTo>
+                  <a:pt x="8248485" y="35589"/>
+                  <a:pt x="7929515" y="37573"/>
+                  <a:pt x="7735824" y="18288"/>
+                </a:cubicBezTo>
+                <a:cubicBezTo>
+                  <a:pt x="7542133" y="-997"/>
+                  <a:pt x="7252504" y="33858"/>
+                  <a:pt x="6940296" y="18288"/>
+                </a:cubicBezTo>
+                <a:cubicBezTo>
+                  <a:pt x="6628088" y="2718"/>
+                  <a:pt x="6528503" y="48389"/>
+                  <a:pt x="6254496" y="18288"/>
+                </a:cubicBezTo>
+                <a:cubicBezTo>
+                  <a:pt x="5980489" y="-11813"/>
+                  <a:pt x="5695784" y="-3740"/>
+                  <a:pt x="5458968" y="18288"/>
+                </a:cubicBezTo>
+                <a:cubicBezTo>
+                  <a:pt x="5222152" y="40316"/>
+                  <a:pt x="5010751" y="19095"/>
+                  <a:pt x="4663440" y="18288"/>
+                </a:cubicBezTo>
+                <a:cubicBezTo>
+                  <a:pt x="4316129" y="17481"/>
+                  <a:pt x="4425552" y="1606"/>
+                  <a:pt x="4306824" y="18288"/>
+                </a:cubicBezTo>
+                <a:cubicBezTo>
+                  <a:pt x="4188096" y="34970"/>
+                  <a:pt x="3941535" y="7481"/>
+                  <a:pt x="3840480" y="18288"/>
+                </a:cubicBezTo>
+                <a:cubicBezTo>
+                  <a:pt x="3739425" y="29095"/>
+                  <a:pt x="3402388" y="17641"/>
+                  <a:pt x="3264408" y="18288"/>
+                </a:cubicBezTo>
+                <a:cubicBezTo>
+                  <a:pt x="3126428" y="18935"/>
+                  <a:pt x="2776779" y="9983"/>
+                  <a:pt x="2578608" y="18288"/>
+                </a:cubicBezTo>
+                <a:cubicBezTo>
+                  <a:pt x="2380437" y="26593"/>
+                  <a:pt x="1909468" y="25818"/>
+                  <a:pt x="1673352" y="18288"/>
+                </a:cubicBezTo>
+                <a:cubicBezTo>
+                  <a:pt x="1437236" y="10758"/>
+                  <a:pt x="1131180" y="49884"/>
+                  <a:pt x="877824" y="18288"/>
+                </a:cubicBezTo>
+                <a:cubicBezTo>
+                  <a:pt x="624468" y="-13308"/>
+                  <a:pt x="206753" y="2195"/>
+                  <a:pt x="0" y="18288"/>
+                </a:cubicBezTo>
+                <a:cubicBezTo>
+                  <a:pt x="313" y="10654"/>
+                  <a:pt x="-263" y="4056"/>
+                  <a:pt x="0" y="0"/>
+                </a:cubicBezTo>
+                <a:close/>
+              </a:path>
+              <a:path w="10972800" h="18288" stroke="0" extrusionOk="0">
+                <a:moveTo>
+                  <a:pt x="0" y="0"/>
+                </a:moveTo>
+                <a:cubicBezTo>
+                  <a:pt x="164017" y="-17675"/>
+                  <a:pt x="309425" y="9913"/>
+                  <a:pt x="466344" y="0"/>
+                </a:cubicBezTo>
+                <a:cubicBezTo>
+                  <a:pt x="623263" y="-9913"/>
+                  <a:pt x="659300" y="-14524"/>
+                  <a:pt x="822960" y="0"/>
+                </a:cubicBezTo>
+                <a:cubicBezTo>
+                  <a:pt x="986620" y="14524"/>
+                  <a:pt x="1105222" y="-16481"/>
+                  <a:pt x="1289304" y="0"/>
+                </a:cubicBezTo>
+                <a:cubicBezTo>
+                  <a:pt x="1473386" y="16481"/>
+                  <a:pt x="1693223" y="26161"/>
+                  <a:pt x="1975104" y="0"/>
+                </a:cubicBezTo>
+                <a:cubicBezTo>
+                  <a:pt x="2256985" y="-26161"/>
+                  <a:pt x="2435781" y="23061"/>
+                  <a:pt x="2770632" y="0"/>
+                </a:cubicBezTo>
+                <a:cubicBezTo>
+                  <a:pt x="3105483" y="-23061"/>
+                  <a:pt x="3247479" y="-44011"/>
+                  <a:pt x="3675888" y="0"/>
+                </a:cubicBezTo>
+                <a:cubicBezTo>
+                  <a:pt x="4104297" y="44011"/>
+                  <a:pt x="4280918" y="4017"/>
+                  <a:pt x="4581144" y="0"/>
+                </a:cubicBezTo>
+                <a:cubicBezTo>
+                  <a:pt x="4881370" y="-4017"/>
+                  <a:pt x="5021699" y="-11889"/>
+                  <a:pt x="5157216" y="0"/>
+                </a:cubicBezTo>
+                <a:cubicBezTo>
+                  <a:pt x="5292733" y="11889"/>
+                  <a:pt x="5603398" y="-17698"/>
+                  <a:pt x="5952744" y="0"/>
+                </a:cubicBezTo>
+                <a:cubicBezTo>
+                  <a:pt x="6302090" y="17698"/>
+                  <a:pt x="6353093" y="-11909"/>
+                  <a:pt x="6638544" y="0"/>
+                </a:cubicBezTo>
+                <a:cubicBezTo>
+                  <a:pt x="6923995" y="11909"/>
+                  <a:pt x="7053404" y="21630"/>
+                  <a:pt x="7214616" y="0"/>
+                </a:cubicBezTo>
+                <a:cubicBezTo>
+                  <a:pt x="7375828" y="-21630"/>
+                  <a:pt x="7837963" y="3886"/>
+                  <a:pt x="8010144" y="0"/>
+                </a:cubicBezTo>
+                <a:cubicBezTo>
+                  <a:pt x="8182325" y="-3886"/>
+                  <a:pt x="8224183" y="16009"/>
+                  <a:pt x="8366760" y="0"/>
+                </a:cubicBezTo>
+                <a:cubicBezTo>
+                  <a:pt x="8509337" y="-16009"/>
+                  <a:pt x="8687920" y="-5720"/>
+                  <a:pt x="8942832" y="0"/>
+                </a:cubicBezTo>
+                <a:cubicBezTo>
+                  <a:pt x="9197744" y="5720"/>
+                  <a:pt x="9368437" y="20479"/>
+                  <a:pt x="9628632" y="0"/>
+                </a:cubicBezTo>
+                <a:cubicBezTo>
+                  <a:pt x="9888827" y="-20479"/>
+                  <a:pt x="10560858" y="-20746"/>
+                  <a:pt x="10972800" y="0"/>
+                </a:cubicBezTo>
+                <a:cubicBezTo>
+                  <a:pt x="10972186" y="5722"/>
+                  <a:pt x="10972980" y="12495"/>
+                  <a:pt x="10972800" y="18288"/>
+                </a:cubicBezTo>
+                <a:cubicBezTo>
+                  <a:pt x="10786146" y="12536"/>
+                  <a:pt x="10623717" y="14033"/>
+                  <a:pt x="10506456" y="18288"/>
+                </a:cubicBezTo>
+                <a:cubicBezTo>
+                  <a:pt x="10389195" y="22543"/>
+                  <a:pt x="10296178" y="20107"/>
+                  <a:pt x="10149840" y="18288"/>
+                </a:cubicBezTo>
+                <a:cubicBezTo>
+                  <a:pt x="10003502" y="16469"/>
+                  <a:pt x="9767530" y="28891"/>
+                  <a:pt x="9464040" y="18288"/>
+                </a:cubicBezTo>
+                <a:cubicBezTo>
+                  <a:pt x="9160550" y="7685"/>
+                  <a:pt x="9229050" y="2659"/>
+                  <a:pt x="8997696" y="18288"/>
+                </a:cubicBezTo>
+                <a:cubicBezTo>
+                  <a:pt x="8766342" y="33917"/>
+                  <a:pt x="8340136" y="34864"/>
+                  <a:pt x="8092440" y="18288"/>
+                </a:cubicBezTo>
+                <a:cubicBezTo>
+                  <a:pt x="7844744" y="1712"/>
+                  <a:pt x="7863720" y="27405"/>
+                  <a:pt x="7735824" y="18288"/>
+                </a:cubicBezTo>
+                <a:cubicBezTo>
+                  <a:pt x="7607928" y="9171"/>
+                  <a:pt x="7323619" y="461"/>
+                  <a:pt x="7050024" y="18288"/>
+                </a:cubicBezTo>
+                <a:cubicBezTo>
+                  <a:pt x="6776429" y="36115"/>
+                  <a:pt x="6787899" y="28206"/>
+                  <a:pt x="6693408" y="18288"/>
+                </a:cubicBezTo>
+                <a:cubicBezTo>
+                  <a:pt x="6598917" y="8370"/>
+                  <a:pt x="6395231" y="19114"/>
+                  <a:pt x="6227064" y="18288"/>
+                </a:cubicBezTo>
+                <a:cubicBezTo>
+                  <a:pt x="6058897" y="17462"/>
+                  <a:pt x="5618582" y="1091"/>
+                  <a:pt x="5431536" y="18288"/>
+                </a:cubicBezTo>
+                <a:cubicBezTo>
+                  <a:pt x="5244490" y="35485"/>
+                  <a:pt x="4729797" y="-9650"/>
+                  <a:pt x="4526280" y="18288"/>
+                </a:cubicBezTo>
+                <a:cubicBezTo>
+                  <a:pt x="4322763" y="46226"/>
+                  <a:pt x="4216797" y="756"/>
+                  <a:pt x="4059936" y="18288"/>
+                </a:cubicBezTo>
+                <a:cubicBezTo>
+                  <a:pt x="3903075" y="35820"/>
+                  <a:pt x="3537912" y="42098"/>
+                  <a:pt x="3374136" y="18288"/>
+                </a:cubicBezTo>
+                <a:cubicBezTo>
+                  <a:pt x="3210360" y="-5522"/>
+                  <a:pt x="3126842" y="39135"/>
+                  <a:pt x="2907792" y="18288"/>
+                </a:cubicBezTo>
+                <a:cubicBezTo>
+                  <a:pt x="2688742" y="-2559"/>
+                  <a:pt x="2490436" y="34100"/>
+                  <a:pt x="2112264" y="18288"/>
+                </a:cubicBezTo>
+                <a:cubicBezTo>
+                  <a:pt x="1734092" y="2476"/>
+                  <a:pt x="1744622" y="-7274"/>
+                  <a:pt x="1536192" y="18288"/>
+                </a:cubicBezTo>
+                <a:cubicBezTo>
+                  <a:pt x="1327762" y="43850"/>
+                  <a:pt x="1189025" y="6435"/>
+                  <a:pt x="1069848" y="18288"/>
+                </a:cubicBezTo>
+                <a:cubicBezTo>
+                  <a:pt x="950671" y="30141"/>
+                  <a:pt x="858345" y="33684"/>
+                  <a:pt x="713232" y="18288"/>
+                </a:cubicBezTo>
+                <a:cubicBezTo>
+                  <a:pt x="568119" y="2892"/>
+                  <a:pt x="250292" y="5410"/>
+                  <a:pt x="0" y="18288"/>
+                </a:cubicBezTo>
+                <a:cubicBezTo>
+                  <a:pt x="465" y="13062"/>
+                  <a:pt x="-894" y="9029"/>
+                  <a:pt x="0" y="0"/>
+                </a:cubicBezTo>
+                <a:close/>
+              </a:path>
+            </a:pathLst>
+          </a:custGeom>
+          <a:solidFill>
+            <a:schemeClr val="accent2">
+              <a:alpha val="75000"/>
+            </a:schemeClr>
+          </a:solidFill>
+          <a:ln w="44450" cap="rnd">
+            <a:solidFill>
+              <a:schemeClr val="accent2">
+                <a:alpha val="75000"/>
+              </a:schemeClr>
+            </a:solidFill>
+            <a:round/>
+            <a:extLst>
+              <a:ext uri="{C807C97D-BFC1-408E-A445-0C87EB9F89A2}">
+                <ask:lineSketchStyleProps xmlns:ask="http://schemas.microsoft.com/office/drawing/2018/sketchyshapes" sd="2727557108">
+                  <a:prstGeom prst="rect">
+                    <a:avLst/>
+                  </a:prstGeom>
+                  <ask:type>
+                    <ask:lineSketchFreehand/>
+                  </ask:type>
+                </ask:lineSketchStyleProps>
+              </a:ext>
+            </a:extLst>
+          </a:ln>
+        </p:spPr>
+        <p:style>
+          <a:lnRef idx="2">
+            <a:schemeClr val="accent1">
+              <a:shade val="50000"/>
+            </a:schemeClr>
+          </a:lnRef>
+          <a:fillRef idx="1">
+            <a:schemeClr val="accent1"/>
+          </a:fillRef>
+          <a:effectRef idx="0">
+            <a:schemeClr val="accent1"/>
+          </a:effectRef>
+          <a:fontRef idx="minor">
+            <a:schemeClr val="lt1"/>
+          </a:fontRef>
+        </p:style>
+        <p:txBody>
+          <a:bodyPr rtlCol="0" anchor="ctr"/>
+          <a:lstStyle/>
+          <a:p>
+            <a:pPr algn="ctr"/>
+            <a:endParaRPr lang="en-US"/>
+          </a:p>
+        </p:txBody>
+      </p:sp>
+      <p:sp>
+        <p:nvSpPr>
+          <p:cNvPr id="33" name="Content Placeholder 3">
+            <a:extLst>
+              <a:ext uri="{FF2B5EF4-FFF2-40B4-BE49-F238E27FC236}">
+                <a16:creationId xmlns:a16="http://schemas.microsoft.com/office/drawing/2014/main" id="{77E2D2AC-46B3-4926-CB7E-B3BAAF19E69D}"/>
+              </a:ext>
+            </a:extLst>
+          </p:cNvPr>
+          <p:cNvSpPr>
+            <a:spLocks noGrp="1"/>
+          </p:cNvSpPr>
+          <p:nvPr>
+            <p:ph idx="1"/>
+          </p:nvPr>
+        </p:nvSpPr>
+        <p:spPr>
+          <a:xfrm>
+            <a:off x="572493" y="2071316"/>
+            <a:ext cx="10972800" cy="4119172"/>
+          </a:xfrm>
+        </p:spPr>
+        <p:txBody>
+          <a:bodyPr anchor="t">
+            <a:normAutofit/>
+          </a:bodyPr>
+          <a:lstStyle/>
+          <a:p>
+            <a:r>
+              <a:rPr lang="en-GB" sz="2000" dirty="0"/>
+              <a:t>In the development phase</a:t>
+            </a:r>
+          </a:p>
+          <a:p>
+            <a:pPr lvl="1"/>
+            <a:r>
+              <a:rPr lang="en-GB" sz="1600" dirty="0"/>
+              <a:t>Improve code quality</a:t>
+            </a:r>
+          </a:p>
+          <a:p>
+            <a:pPr lvl="1"/>
+            <a:r>
+              <a:rPr lang="en-GB" sz="1600" dirty="0"/>
+              <a:t>Verify that all use cases are tested</a:t>
+            </a:r>
+          </a:p>
+          <a:p>
+            <a:r>
+              <a:rPr lang="en-GB" sz="2000" dirty="0"/>
+              <a:t>Before acquiring ownership on a project:</a:t>
+            </a:r>
+          </a:p>
+          <a:p>
+            <a:pPr lvl="1"/>
+            <a:r>
+              <a:rPr lang="en-GB" sz="1600" dirty="0"/>
+              <a:t>Is project tested?</a:t>
+            </a:r>
+          </a:p>
+          <a:p>
+            <a:pPr lvl="1"/>
+            <a:r>
+              <a:rPr lang="en-GB" sz="1600" dirty="0"/>
+              <a:t>Does it respect language conventions?</a:t>
+            </a:r>
+          </a:p>
+          <a:p>
+            <a:r>
+              <a:rPr lang="en-GB" sz="2000" dirty="0"/>
+              <a:t>In the Release phase</a:t>
+            </a:r>
+          </a:p>
+          <a:p>
+            <a:pPr lvl="1"/>
+            <a:r>
+              <a:rPr lang="en-GB" sz="1600" dirty="0"/>
+              <a:t>Ensures that every program you put out is high quality and meets desired standards</a:t>
+            </a:r>
+          </a:p>
+        </p:txBody>
+      </p:sp>
+      <p:pic>
+        <p:nvPicPr>
+          <p:cNvPr id="5" name="Picture 4" descr="SonarQube: un valido strumento di analisi statica del codice - Intré">
+            <a:extLst>
+              <a:ext uri="{FF2B5EF4-FFF2-40B4-BE49-F238E27FC236}">
+                <a16:creationId xmlns:a16="http://schemas.microsoft.com/office/drawing/2014/main" id="{F8915CE3-EE40-99EF-6854-3B1406BEC346}"/>
+              </a:ext>
+            </a:extLst>
+          </p:cNvPr>
+          <p:cNvPicPr>
+            <a:picLocks noChangeAspect="1" noChangeArrowheads="1"/>
+          </p:cNvPicPr>
+          <p:nvPr/>
+        </p:nvPicPr>
+        <p:blipFill>
+          <a:blip r:embed="rId2">
+            <a:extLst>
+              <a:ext uri="{28A0092B-C50C-407E-A947-70E740481C1C}">
+                <a14:useLocalDpi xmlns:a14="http://schemas.microsoft.com/office/drawing/2010/main" val="0"/>
+              </a:ext>
+            </a:extLst>
+          </a:blip>
+          <a:srcRect/>
+          <a:stretch>
+            <a:fillRect/>
+          </a:stretch>
+        </p:blipFill>
+        <p:spPr bwMode="auto">
+          <a:xfrm>
+            <a:off x="9559556" y="0"/>
+            <a:ext cx="2632444" cy="813384"/>
+          </a:xfrm>
+          <a:prstGeom prst="rect">
+            <a:avLst/>
+          </a:prstGeom>
+          <a:noFill/>
+          <a:extLst>
+            <a:ext uri="{909E8E84-426E-40DD-AFC4-6F175D3DCCD1}">
+              <a14:hiddenFill xmlns:a14="http://schemas.microsoft.com/office/drawing/2010/main">
+                <a:solidFill>
+                  <a:srgbClr val="FFFFFF"/>
+                </a:solidFill>
+              </a14:hiddenFill>
+            </a:ext>
+          </a:extLst>
+        </p:spPr>
+      </p:pic>
+      <p:pic>
+        <p:nvPicPr>
+          <p:cNvPr id="2" name="Picture 1" descr="Agile Lab">
+            <a:extLst>
+              <a:ext uri="{FF2B5EF4-FFF2-40B4-BE49-F238E27FC236}">
+                <a16:creationId xmlns:a16="http://schemas.microsoft.com/office/drawing/2014/main" id="{B2D5D8BF-4DA3-A238-0307-85D218E98F5E}"/>
+              </a:ext>
+              <a:ext uri="{C183D7F6-B498-43B3-948B-1728B52AA6E4}">
+                <adec:decorative xmlns:adec="http://schemas.microsoft.com/office/drawing/2017/decorative" val="0"/>
+              </a:ext>
+            </a:extLst>
+          </p:cNvPr>
+          <p:cNvPicPr>
+            <a:picLocks noChangeAspect="1"/>
+          </p:cNvPicPr>
+          <p:nvPr/>
+        </p:nvPicPr>
+        <p:blipFill>
+          <a:blip r:embed="rId3"/>
+          <a:stretch>
+            <a:fillRect/>
+          </a:stretch>
+        </p:blipFill>
+        <p:spPr>
+          <a:xfrm>
+            <a:off x="1" y="0"/>
+            <a:ext cx="2322268" cy="641278"/>
+          </a:xfrm>
+          <a:prstGeom prst="rect">
+            <a:avLst/>
+          </a:prstGeom>
+        </p:spPr>
+      </p:pic>
+    </p:spTree>
+    <p:extLst>
+      <p:ext uri="{BB962C8B-B14F-4D97-AF65-F5344CB8AC3E}">
+        <p14:creationId xmlns:p14="http://schemas.microsoft.com/office/powerpoint/2010/main" val="1070805632"/>
+      </p:ext>
+    </p:extLst>
+  </p:cSld>
+  <p:clrMapOvr>
+    <a:masterClrMapping/>
+  </p:clrMapOvr>
+  <p:timing>
+    <p:tnLst>
+      <p:par>
+        <p:cTn id="1" dur="indefinite" restart="never" nodeType="tmRoot">
+          <p:childTnLst>
+            <p:seq concurrent="1" nextAc="seek">
+              <p:cTn id="2" dur="indefinite" nodeType="mainSeq">
+                <p:childTnLst>
+                  <p:par>
+                    <p:cTn id="3" fill="hold">
+                      <p:stCondLst>
+                        <p:cond delay="indefinite"/>
+                      </p:stCondLst>
+                      <p:childTnLst>
+                        <p:par>
+                          <p:cTn id="4" fill="hold">
+                            <p:stCondLst>
+                              <p:cond delay="0"/>
+                            </p:stCondLst>
+                            <p:childTnLst>
+                              <p:par>
+                                <p:cTn id="5" presetID="3" presetClass="entr" presetSubtype="10" fill="hold" nodeType="clickEffect">
+                                  <p:stCondLst>
+                                    <p:cond delay="0"/>
+                                  </p:stCondLst>
+                                  <p:childTnLst>
+                                    <p:set>
+                                      <p:cBhvr>
+                                        <p:cTn id="6" dur="1" fill="hold">
+                                          <p:stCondLst>
+                                            <p:cond delay="0"/>
+                                          </p:stCondLst>
+                                        </p:cTn>
+                                        <p:tgtEl>
+                                          <p:spTgt spid="33">
+                                            <p:txEl>
+                                              <p:pRg st="0" end="0"/>
+                                            </p:txEl>
+                                          </p:spTgt>
+                                        </p:tgtEl>
+                                        <p:attrNameLst>
+                                          <p:attrName>style.visibility</p:attrName>
+                                        </p:attrNameLst>
+                                      </p:cBhvr>
+                                      <p:to>
+                                        <p:strVal val="visible"/>
+                                      </p:to>
+                                    </p:set>
+                                    <p:animEffect transition="in" filter="blinds(horizontal)">
+                                      <p:cBhvr>
+                                        <p:cTn id="7" dur="500"/>
+                                        <p:tgtEl>
+                                          <p:spTgt spid="33">
+                                            <p:txEl>
+                                              <p:pRg st="0" end="0"/>
+                                            </p:txEl>
+                                          </p:spTgt>
+                                        </p:tgtEl>
+                                      </p:cBhvr>
+                                    </p:animEffect>
+                                  </p:childTnLst>
+                                </p:cTn>
+                              </p:par>
+                              <p:par>
+                                <p:cTn id="8" presetID="3" presetClass="entr" presetSubtype="10" fill="hold" nodeType="withEffect">
+                                  <p:stCondLst>
+                                    <p:cond delay="0"/>
+                                  </p:stCondLst>
+                                  <p:childTnLst>
+                                    <p:set>
+                                      <p:cBhvr>
+                                        <p:cTn id="9" dur="1" fill="hold">
+                                          <p:stCondLst>
+                                            <p:cond delay="0"/>
+                                          </p:stCondLst>
+                                        </p:cTn>
+                                        <p:tgtEl>
+                                          <p:spTgt spid="33">
+                                            <p:txEl>
+                                              <p:pRg st="1" end="1"/>
+                                            </p:txEl>
+                                          </p:spTgt>
+                                        </p:tgtEl>
+                                        <p:attrNameLst>
+                                          <p:attrName>style.visibility</p:attrName>
+                                        </p:attrNameLst>
+                                      </p:cBhvr>
+                                      <p:to>
+                                        <p:strVal val="visible"/>
+                                      </p:to>
+                                    </p:set>
+                                    <p:animEffect transition="in" filter="blinds(horizontal)">
+                                      <p:cBhvr>
+                                        <p:cTn id="10" dur="500"/>
+                                        <p:tgtEl>
+                                          <p:spTgt spid="33">
+                                            <p:txEl>
+                                              <p:pRg st="1" end="1"/>
+                                            </p:txEl>
+                                          </p:spTgt>
+                                        </p:tgtEl>
+                                      </p:cBhvr>
+                                    </p:animEffect>
+                                  </p:childTnLst>
+                                </p:cTn>
+                              </p:par>
+                              <p:par>
+                                <p:cTn id="11" presetID="3" presetClass="entr" presetSubtype="10" fill="hold" nodeType="withEffect">
+                                  <p:stCondLst>
+                                    <p:cond delay="0"/>
+                                  </p:stCondLst>
+                                  <p:childTnLst>
+                                    <p:set>
+                                      <p:cBhvr>
+                                        <p:cTn id="12" dur="1" fill="hold">
+                                          <p:stCondLst>
+                                            <p:cond delay="0"/>
+                                          </p:stCondLst>
+                                        </p:cTn>
+                                        <p:tgtEl>
+                                          <p:spTgt spid="33">
+                                            <p:txEl>
+                                              <p:pRg st="2" end="2"/>
+                                            </p:txEl>
+                                          </p:spTgt>
+                                        </p:tgtEl>
+                                        <p:attrNameLst>
+                                          <p:attrName>style.visibility</p:attrName>
+                                        </p:attrNameLst>
+                                      </p:cBhvr>
+                                      <p:to>
+                                        <p:strVal val="visible"/>
+                                      </p:to>
+                                    </p:set>
+                                    <p:animEffect transition="in" filter="blinds(horizontal)">
+                                      <p:cBhvr>
+                                        <p:cTn id="13" dur="500"/>
+                                        <p:tgtEl>
+                                          <p:spTgt spid="33">
+                                            <p:txEl>
+                                              <p:pRg st="2" end="2"/>
+                                            </p:txEl>
+                                          </p:spTgt>
+                                        </p:tgtEl>
+                                      </p:cBhvr>
+                                    </p:animEffect>
+                                  </p:childTnLst>
+                                </p:cTn>
+                              </p:par>
+                            </p:childTnLst>
+                          </p:cTn>
+                        </p:par>
+                      </p:childTnLst>
+                    </p:cTn>
+                  </p:par>
+                  <p:par>
+                    <p:cTn id="14" fill="hold">
+                      <p:stCondLst>
+                        <p:cond delay="indefinite"/>
+                      </p:stCondLst>
+                      <p:childTnLst>
+                        <p:par>
+                          <p:cTn id="15" fill="hold">
+                            <p:stCondLst>
+                              <p:cond delay="0"/>
+                            </p:stCondLst>
+                            <p:childTnLst>
+                              <p:par>
+                                <p:cTn id="16" presetID="3" presetClass="entr" presetSubtype="10" fill="hold" nodeType="clickEffect">
+                                  <p:stCondLst>
+                                    <p:cond delay="0"/>
+                                  </p:stCondLst>
+                                  <p:childTnLst>
+                                    <p:set>
+                                      <p:cBhvr>
+                                        <p:cTn id="17" dur="1" fill="hold">
+                                          <p:stCondLst>
+                                            <p:cond delay="0"/>
+                                          </p:stCondLst>
+                                        </p:cTn>
+                                        <p:tgtEl>
+                                          <p:spTgt spid="33">
+                                            <p:txEl>
+                                              <p:pRg st="3" end="3"/>
+                                            </p:txEl>
+                                          </p:spTgt>
+                                        </p:tgtEl>
+                                        <p:attrNameLst>
+                                          <p:attrName>style.visibility</p:attrName>
+                                        </p:attrNameLst>
+                                      </p:cBhvr>
+                                      <p:to>
+                                        <p:strVal val="visible"/>
+                                      </p:to>
+                                    </p:set>
+                                    <p:animEffect transition="in" filter="blinds(horizontal)">
+                                      <p:cBhvr>
+                                        <p:cTn id="18" dur="500"/>
+                                        <p:tgtEl>
+                                          <p:spTgt spid="33">
+                                            <p:txEl>
+                                              <p:pRg st="3" end="3"/>
+                                            </p:txEl>
+                                          </p:spTgt>
+                                        </p:tgtEl>
+                                      </p:cBhvr>
+                                    </p:animEffect>
+                                  </p:childTnLst>
+                                </p:cTn>
+                              </p:par>
+                              <p:par>
+                                <p:cTn id="19" presetID="3" presetClass="entr" presetSubtype="10" fill="hold" nodeType="withEffect">
+                                  <p:stCondLst>
+                                    <p:cond delay="0"/>
+                                  </p:stCondLst>
+                                  <p:childTnLst>
+                                    <p:set>
+                                      <p:cBhvr>
+                                        <p:cTn id="20" dur="1" fill="hold">
+                                          <p:stCondLst>
+                                            <p:cond delay="0"/>
+                                          </p:stCondLst>
+                                        </p:cTn>
+                                        <p:tgtEl>
+                                          <p:spTgt spid="33">
+                                            <p:txEl>
+                                              <p:pRg st="4" end="4"/>
+                                            </p:txEl>
+                                          </p:spTgt>
+                                        </p:tgtEl>
+                                        <p:attrNameLst>
+                                          <p:attrName>style.visibility</p:attrName>
+                                        </p:attrNameLst>
+                                      </p:cBhvr>
+                                      <p:to>
+                                        <p:strVal val="visible"/>
+                                      </p:to>
+                                    </p:set>
+                                    <p:animEffect transition="in" filter="blinds(horizontal)">
+                                      <p:cBhvr>
+                                        <p:cTn id="21" dur="500"/>
+                                        <p:tgtEl>
+                                          <p:spTgt spid="33">
+                                            <p:txEl>
+                                              <p:pRg st="4" end="4"/>
+                                            </p:txEl>
+                                          </p:spTgt>
+                                        </p:tgtEl>
+                                      </p:cBhvr>
+                                    </p:animEffect>
+                                  </p:childTnLst>
+                                </p:cTn>
+                              </p:par>
+                              <p:par>
+                                <p:cTn id="22" presetID="3" presetClass="entr" presetSubtype="10" fill="hold" nodeType="withEffect">
+                                  <p:stCondLst>
+                                    <p:cond delay="0"/>
+                                  </p:stCondLst>
+                                  <p:childTnLst>
+                                    <p:set>
+                                      <p:cBhvr>
+                                        <p:cTn id="23" dur="1" fill="hold">
+                                          <p:stCondLst>
+                                            <p:cond delay="0"/>
+                                          </p:stCondLst>
+                                        </p:cTn>
+                                        <p:tgtEl>
+                                          <p:spTgt spid="33">
+                                            <p:txEl>
+                                              <p:pRg st="5" end="5"/>
+                                            </p:txEl>
+                                          </p:spTgt>
+                                        </p:tgtEl>
+                                        <p:attrNameLst>
+                                          <p:attrName>style.visibility</p:attrName>
+                                        </p:attrNameLst>
+                                      </p:cBhvr>
+                                      <p:to>
+                                        <p:strVal val="visible"/>
+                                      </p:to>
+                                    </p:set>
+                                    <p:animEffect transition="in" filter="blinds(horizontal)">
+                                      <p:cBhvr>
+                                        <p:cTn id="24" dur="500"/>
+                                        <p:tgtEl>
+                                          <p:spTgt spid="33">
+                                            <p:txEl>
+                                              <p:pRg st="5" end="5"/>
+                                            </p:txEl>
+                                          </p:spTgt>
+                                        </p:tgtEl>
+                                      </p:cBhvr>
+                                    </p:animEffect>
+                                  </p:childTnLst>
+                                </p:cTn>
+                              </p:par>
+                            </p:childTnLst>
+                          </p:cTn>
+                        </p:par>
+                      </p:childTnLst>
+                    </p:cTn>
+                  </p:par>
+                  <p:par>
+                    <p:cTn id="25" fill="hold">
+                      <p:stCondLst>
+                        <p:cond delay="indefinite"/>
+                      </p:stCondLst>
+                      <p:childTnLst>
+                        <p:par>
+                          <p:cTn id="26" fill="hold">
+                            <p:stCondLst>
+                              <p:cond delay="0"/>
+                            </p:stCondLst>
+                            <p:childTnLst>
+                              <p:par>
+                                <p:cTn id="27" presetID="3" presetClass="entr" presetSubtype="10" fill="hold" nodeType="clickEffect">
+                                  <p:stCondLst>
+                                    <p:cond delay="0"/>
+                                  </p:stCondLst>
+                                  <p:childTnLst>
+                                    <p:set>
+                                      <p:cBhvr>
+                                        <p:cTn id="28" dur="1" fill="hold">
+                                          <p:stCondLst>
+                                            <p:cond delay="0"/>
+                                          </p:stCondLst>
+                                        </p:cTn>
+                                        <p:tgtEl>
+                                          <p:spTgt spid="33">
+                                            <p:txEl>
+                                              <p:pRg st="6" end="6"/>
+                                            </p:txEl>
+                                          </p:spTgt>
+                                        </p:tgtEl>
+                                        <p:attrNameLst>
+                                          <p:attrName>style.visibility</p:attrName>
+                                        </p:attrNameLst>
+                                      </p:cBhvr>
+                                      <p:to>
+                                        <p:strVal val="visible"/>
+                                      </p:to>
+                                    </p:set>
+                                    <p:animEffect transition="in" filter="blinds(horizontal)">
+                                      <p:cBhvr>
+                                        <p:cTn id="29" dur="500"/>
+                                        <p:tgtEl>
+                                          <p:spTgt spid="33">
+                                            <p:txEl>
+                                              <p:pRg st="6" end="6"/>
+                                            </p:txEl>
+                                          </p:spTgt>
+                                        </p:tgtEl>
+                                      </p:cBhvr>
+                                    </p:animEffect>
+                                  </p:childTnLst>
+                                </p:cTn>
+                              </p:par>
+                              <p:par>
+                                <p:cTn id="30" presetID="3" presetClass="entr" presetSubtype="10" fill="hold" nodeType="withEffect">
+                                  <p:stCondLst>
+                                    <p:cond delay="0"/>
+                                  </p:stCondLst>
+                                  <p:childTnLst>
+                                    <p:set>
+                                      <p:cBhvr>
+                                        <p:cTn id="31" dur="1" fill="hold">
+                                          <p:stCondLst>
+                                            <p:cond delay="0"/>
+                                          </p:stCondLst>
+                                        </p:cTn>
+                                        <p:tgtEl>
+                                          <p:spTgt spid="33">
+                                            <p:txEl>
+                                              <p:pRg st="7" end="7"/>
+                                            </p:txEl>
+                                          </p:spTgt>
+                                        </p:tgtEl>
+                                        <p:attrNameLst>
+                                          <p:attrName>style.visibility</p:attrName>
+                                        </p:attrNameLst>
+                                      </p:cBhvr>
+                                      <p:to>
+                                        <p:strVal val="visible"/>
+                                      </p:to>
+                                    </p:set>
+                                    <p:animEffect transition="in" filter="blinds(horizontal)">
+                                      <p:cBhvr>
+                                        <p:cTn id="32" dur="500"/>
+                                        <p:tgtEl>
+                                          <p:spTgt spid="33">
+                                            <p:txEl>
+                                              <p:pRg st="7" end="7"/>
+                                            </p:txEl>
+                                          </p:spTgt>
+                                        </p:tgtEl>
+                                      </p:cBhvr>
+                                    </p:animEffect>
+                                  </p:childTnLst>
+                                </p:cTn>
+                              </p:par>
+                            </p:childTnLst>
+                          </p:cTn>
+                        </p:par>
+                      </p:childTnLst>
+                    </p:cTn>
+                  </p:par>
+                </p:childTnLst>
+              </p:cTn>
+              <p:prevCondLst>
+                <p:cond evt="onPrev" delay="0">
+                  <p:tgtEl>
+                    <p:sldTgt/>
+                  </p:tgtEl>
+                </p:cond>
+              </p:prevCondLst>
+              <p:nextCondLst>
+                <p:cond evt="onNext" delay="0">
+                  <p:tgtEl>
+                    <p:sldTgt/>
+                  </p:tgtEl>
+                </p:cond>
+              </p:nextCondLst>
+            </p:seq>
+          </p:childTnLst>
+        </p:cTn>
+      </p:par>
+    </p:tnLst>
+  </p:timing>
+</p:sld>
+</file>
+
+<file path=ppt/slides/slide6.xml><?xml version="1.0" encoding="utf-8"?>
+<p:sld xmlns:a="http://schemas.openxmlformats.org/drawingml/2006/main" xmlns:r="http://schemas.openxmlformats.org/officeDocument/2006/relationships" xmlns:p="http://schemas.openxmlformats.org/presentationml/2006/main">
+  <p:cSld>
+    <p:bg>
+      <p:bgPr>
+        <a:solidFill>
+          <a:schemeClr val="bg1"/>
+        </a:solidFill>
+        <a:effectLst/>
+      </p:bgPr>
+    </p:bg>
+    <p:spTree>
+      <p:nvGrpSpPr>
+        <p:cNvPr id="1" name=""/>
+        <p:cNvGrpSpPr/>
+        <p:nvPr/>
+      </p:nvGrpSpPr>
+      <p:grpSpPr>
+        <a:xfrm>
+          <a:off x="0" y="0"/>
+          <a:ext cx="0" cy="0"/>
+          <a:chOff x="0" y="0"/>
+          <a:chExt cx="0" cy="0"/>
+        </a:xfrm>
+      </p:grpSpPr>
+      <p:sp useBgFill="1">
+        <p:nvSpPr>
+          <p:cNvPr id="31" name="Rectangle 13">
+            <a:extLst>
+              <a:ext uri="{FF2B5EF4-FFF2-40B4-BE49-F238E27FC236}">
+                <a16:creationId xmlns:a16="http://schemas.microsoft.com/office/drawing/2014/main" id="{45D37F4E-DDB4-456B-97E0-9937730A039F}"/>
+              </a:ext>
+              <a:ext uri="{C183D7F6-B498-43B3-948B-1728B52AA6E4}">
+                <adec:decorative xmlns:adec="http://schemas.microsoft.com/office/drawing/2017/decorative" val="1"/>
+              </a:ext>
+            </a:extLst>
+          </p:cNvPr>
+          <p:cNvSpPr>
+            <a:spLocks noGrp="1" noRot="1" noChangeAspect="1" noMove="1" noResize="1" noEditPoints="1" noAdjustHandles="1" noChangeArrowheads="1" noChangeShapeType="1" noTextEdit="1"/>
+          </p:cNvSpPr>
+          <p:nvPr>
+            <p:extLst>
+              <p:ext uri="{386F3935-93C4-4BCD-93E2-E3B085C9AB24}">
+                <p16:designElem xmlns:p16="http://schemas.microsoft.com/office/powerpoint/2015/main" val="1"/>
+              </p:ext>
+            </p:extLst>
+          </p:nvPr>
+        </p:nvSpPr>
+        <p:spPr>
+          <a:xfrm>
+            <a:off x="0" y="0"/>
+            <a:ext cx="12188952" cy="6858000"/>
+          </a:xfrm>
+          <a:prstGeom prst="rect">
+            <a:avLst/>
+          </a:prstGeom>
+          <a:ln>
+            <a:noFill/>
+          </a:ln>
+        </p:spPr>
+        <p:style>
+          <a:lnRef idx="2">
+            <a:schemeClr val="accent1">
+              <a:shade val="50000"/>
+            </a:schemeClr>
+          </a:lnRef>
+          <a:fillRef idx="1">
+            <a:schemeClr val="accent1"/>
+          </a:fillRef>
+          <a:effectRef idx="0">
+            <a:schemeClr val="accent1"/>
+          </a:effectRef>
+          <a:fontRef idx="minor">
+            <a:schemeClr val="lt1"/>
+          </a:fontRef>
+        </p:style>
+        <p:txBody>
+          <a:bodyPr rtlCol="0" anchor="ctr"/>
+          <a:lstStyle/>
+          <a:p>
+            <a:pPr algn="ctr"/>
+            <a:endParaRPr lang="en-US"/>
+          </a:p>
+        </p:txBody>
+      </p:sp>
+      <p:sp>
+        <p:nvSpPr>
+          <p:cNvPr id="9" name="Title 8">
+            <a:extLst>
+              <a:ext uri="{FF2B5EF4-FFF2-40B4-BE49-F238E27FC236}">
+                <a16:creationId xmlns:a16="http://schemas.microsoft.com/office/drawing/2014/main" id="{35493AF0-80AA-F04C-BE18-12651EE22F56}"/>
+              </a:ext>
+            </a:extLst>
+          </p:cNvPr>
+          <p:cNvSpPr>
+            <a:spLocks noGrp="1"/>
+          </p:cNvSpPr>
+          <p:nvPr>
+            <p:ph type="title"/>
+          </p:nvPr>
+        </p:nvSpPr>
+        <p:spPr>
+          <a:xfrm>
+            <a:off x="572493" y="238539"/>
+            <a:ext cx="11018520" cy="1434415"/>
+          </a:xfrm>
+        </p:spPr>
+        <p:txBody>
+          <a:bodyPr anchor="b">
+            <a:normAutofit/>
+          </a:bodyPr>
+          <a:lstStyle/>
+          <a:p>
+            <a:r>
+              <a:rPr lang="en-GB" sz="5400" dirty="0"/>
               <a:t>Sonar Dashboard - General</a:t>
             </a:r>
             <a:endParaRPr lang="en-IT" sz="5400" dirty="0"/>
@@ -14940,7 +18246,7 @@
 </p:sld>
 </file>
 
-<file path=ppt/slides/slide6.xml><?xml version="1.0" encoding="utf-8"?>
+<file path=ppt/slides/slide7.xml><?xml version="1.0" encoding="utf-8"?>
 <p:sld xmlns:a="http://schemas.openxmlformats.org/drawingml/2006/main" xmlns:r="http://schemas.openxmlformats.org/officeDocument/2006/relationships" xmlns:p="http://schemas.openxmlformats.org/presentationml/2006/main">
   <p:cSld>
     <p:bg>
@@ -16168,7 +19474,7 @@
 </p:sld>
 </file>
 
-<file path=ppt/slides/slide7.xml><?xml version="1.0" encoding="utf-8"?>
+<file path=ppt/slides/slide8.xml><?xml version="1.0" encoding="utf-8"?>
 <p:sld xmlns:a="http://schemas.openxmlformats.org/drawingml/2006/main" xmlns:r="http://schemas.openxmlformats.org/officeDocument/2006/relationships" xmlns:p="http://schemas.openxmlformats.org/presentationml/2006/main">
   <p:cSld>
     <p:bg>
@@ -17076,7 +20382,7 @@
 </p:sld>
 </file>
 
-<file path=ppt/slides/slide8.xml><?xml version="1.0" encoding="utf-8"?>
+<file path=ppt/slides/slide9.xml><?xml version="1.0" encoding="utf-8"?>
 <p:sld xmlns:a="http://schemas.openxmlformats.org/drawingml/2006/main" xmlns:r="http://schemas.openxmlformats.org/officeDocument/2006/relationships" xmlns:p="http://schemas.openxmlformats.org/presentationml/2006/main">
   <p:cSld>
     <p:bg>
@@ -18143,1047 +21449,6 @@
 </p:sld>
 </file>
 
-<file path=ppt/slides/slide9.xml><?xml version="1.0" encoding="utf-8"?>
-<p:sld xmlns:a="http://schemas.openxmlformats.org/drawingml/2006/main" xmlns:r="http://schemas.openxmlformats.org/officeDocument/2006/relationships" xmlns:p="http://schemas.openxmlformats.org/presentationml/2006/main">
-  <p:cSld>
-    <p:bg>
-      <p:bgPr>
-        <a:solidFill>
-          <a:schemeClr val="bg1"/>
-        </a:solidFill>
-        <a:effectLst/>
-      </p:bgPr>
-    </p:bg>
-    <p:spTree>
-      <p:nvGrpSpPr>
-        <p:cNvPr id="1" name=""/>
-        <p:cNvGrpSpPr/>
-        <p:nvPr/>
-      </p:nvGrpSpPr>
-      <p:grpSpPr>
-        <a:xfrm>
-          <a:off x="0" y="0"/>
-          <a:ext cx="0" cy="0"/>
-          <a:chOff x="0" y="0"/>
-          <a:chExt cx="0" cy="0"/>
-        </a:xfrm>
-      </p:grpSpPr>
-      <p:sp useBgFill="1">
-        <p:nvSpPr>
-          <p:cNvPr id="31" name="Rectangle 13">
-            <a:extLst>
-              <a:ext uri="{FF2B5EF4-FFF2-40B4-BE49-F238E27FC236}">
-                <a16:creationId xmlns:a16="http://schemas.microsoft.com/office/drawing/2014/main" id="{45D37F4E-DDB4-456B-97E0-9937730A039F}"/>
-              </a:ext>
-              <a:ext uri="{C183D7F6-B498-43B3-948B-1728B52AA6E4}">
-                <adec:decorative xmlns:adec="http://schemas.microsoft.com/office/drawing/2017/decorative" val="1"/>
-              </a:ext>
-            </a:extLst>
-          </p:cNvPr>
-          <p:cNvSpPr>
-            <a:spLocks noGrp="1" noRot="1" noChangeAspect="1" noMove="1" noResize="1" noEditPoints="1" noAdjustHandles="1" noChangeArrowheads="1" noChangeShapeType="1" noTextEdit="1"/>
-          </p:cNvSpPr>
-          <p:nvPr>
-            <p:extLst>
-              <p:ext uri="{386F3935-93C4-4BCD-93E2-E3B085C9AB24}">
-                <p16:designElem xmlns:p16="http://schemas.microsoft.com/office/powerpoint/2015/main" val="1"/>
-              </p:ext>
-            </p:extLst>
-          </p:nvPr>
-        </p:nvSpPr>
-        <p:spPr>
-          <a:xfrm>
-            <a:off x="0" y="0"/>
-            <a:ext cx="12188952" cy="6858000"/>
-          </a:xfrm>
-          <a:prstGeom prst="rect">
-            <a:avLst/>
-          </a:prstGeom>
-          <a:ln>
-            <a:noFill/>
-          </a:ln>
-        </p:spPr>
-        <p:style>
-          <a:lnRef idx="2">
-            <a:schemeClr val="accent1">
-              <a:shade val="50000"/>
-            </a:schemeClr>
-          </a:lnRef>
-          <a:fillRef idx="1">
-            <a:schemeClr val="accent1"/>
-          </a:fillRef>
-          <a:effectRef idx="0">
-            <a:schemeClr val="accent1"/>
-          </a:effectRef>
-          <a:fontRef idx="minor">
-            <a:schemeClr val="lt1"/>
-          </a:fontRef>
-        </p:style>
-        <p:txBody>
-          <a:bodyPr rtlCol="0" anchor="ctr"/>
-          <a:lstStyle/>
-          <a:p>
-            <a:pPr algn="ctr"/>
-            <a:endParaRPr lang="en-US"/>
-          </a:p>
-        </p:txBody>
-      </p:sp>
-      <p:sp>
-        <p:nvSpPr>
-          <p:cNvPr id="9" name="Title 8">
-            <a:extLst>
-              <a:ext uri="{FF2B5EF4-FFF2-40B4-BE49-F238E27FC236}">
-                <a16:creationId xmlns:a16="http://schemas.microsoft.com/office/drawing/2014/main" id="{35493AF0-80AA-F04C-BE18-12651EE22F56}"/>
-              </a:ext>
-            </a:extLst>
-          </p:cNvPr>
-          <p:cNvSpPr>
-            <a:spLocks noGrp="1"/>
-          </p:cNvSpPr>
-          <p:nvPr>
-            <p:ph type="title"/>
-          </p:nvPr>
-        </p:nvSpPr>
-        <p:spPr>
-          <a:xfrm>
-            <a:off x="572493" y="238539"/>
-            <a:ext cx="11018520" cy="1434415"/>
-          </a:xfrm>
-        </p:spPr>
-        <p:txBody>
-          <a:bodyPr anchor="b">
-            <a:normAutofit/>
-          </a:bodyPr>
-          <a:lstStyle/>
-          <a:p>
-            <a:r>
-              <a:rPr lang="en-GB" sz="5400" dirty="0"/>
-              <a:t>How use it locally</a:t>
-            </a:r>
-            <a:endParaRPr lang="en-IT" sz="5400" dirty="0"/>
-          </a:p>
-        </p:txBody>
-      </p:sp>
-      <p:sp>
-        <p:nvSpPr>
-          <p:cNvPr id="32" name="sketchy line">
-            <a:extLst>
-              <a:ext uri="{FF2B5EF4-FFF2-40B4-BE49-F238E27FC236}">
-                <a16:creationId xmlns:a16="http://schemas.microsoft.com/office/drawing/2014/main" id="{B2DD41CD-8F47-4F56-AD12-4E2FF7696987}"/>
-              </a:ext>
-              <a:ext uri="{C183D7F6-B498-43B3-948B-1728B52AA6E4}">
-                <adec:decorative xmlns:adec="http://schemas.microsoft.com/office/drawing/2017/decorative" val="1"/>
-              </a:ext>
-            </a:extLst>
-          </p:cNvPr>
-          <p:cNvSpPr>
-            <a:spLocks noGrp="1" noRot="1" noChangeAspect="1" noMove="1" noResize="1" noEditPoints="1" noAdjustHandles="1" noChangeArrowheads="1" noChangeShapeType="1" noTextEdit="1"/>
-          </p:cNvSpPr>
-          <p:nvPr>
-            <p:extLst>
-              <p:ext uri="{386F3935-93C4-4BCD-93E2-E3B085C9AB24}">
-                <p16:designElem xmlns:p16="http://schemas.microsoft.com/office/powerpoint/2015/main" val="1"/>
-              </p:ext>
-            </p:extLst>
-          </p:nvPr>
-        </p:nvSpPr>
-        <p:spPr>
-          <a:xfrm>
-            <a:off x="572493" y="1681544"/>
-            <a:ext cx="10972800" cy="18288"/>
-          </a:xfrm>
-          <a:custGeom>
-            <a:avLst/>
-            <a:gdLst>
-              <a:gd name="connsiteX0" fmla="*/ 0 w 10972800"/>
-              <a:gd name="connsiteY0" fmla="*/ 0 h 18288"/>
-              <a:gd name="connsiteX1" fmla="*/ 356616 w 10972800"/>
-              <a:gd name="connsiteY1" fmla="*/ 0 h 18288"/>
-              <a:gd name="connsiteX2" fmla="*/ 1042416 w 10972800"/>
-              <a:gd name="connsiteY2" fmla="*/ 0 h 18288"/>
-              <a:gd name="connsiteX3" fmla="*/ 1947672 w 10972800"/>
-              <a:gd name="connsiteY3" fmla="*/ 0 h 18288"/>
-              <a:gd name="connsiteX4" fmla="*/ 2633472 w 10972800"/>
-              <a:gd name="connsiteY4" fmla="*/ 0 h 18288"/>
-              <a:gd name="connsiteX5" fmla="*/ 2990088 w 10972800"/>
-              <a:gd name="connsiteY5" fmla="*/ 0 h 18288"/>
-              <a:gd name="connsiteX6" fmla="*/ 3456432 w 10972800"/>
-              <a:gd name="connsiteY6" fmla="*/ 0 h 18288"/>
-              <a:gd name="connsiteX7" fmla="*/ 4361688 w 10972800"/>
-              <a:gd name="connsiteY7" fmla="*/ 0 h 18288"/>
-              <a:gd name="connsiteX8" fmla="*/ 5266944 w 10972800"/>
-              <a:gd name="connsiteY8" fmla="*/ 0 h 18288"/>
-              <a:gd name="connsiteX9" fmla="*/ 6172200 w 10972800"/>
-              <a:gd name="connsiteY9" fmla="*/ 0 h 18288"/>
-              <a:gd name="connsiteX10" fmla="*/ 6528816 w 10972800"/>
-              <a:gd name="connsiteY10" fmla="*/ 0 h 18288"/>
-              <a:gd name="connsiteX11" fmla="*/ 7214616 w 10972800"/>
-              <a:gd name="connsiteY11" fmla="*/ 0 h 18288"/>
-              <a:gd name="connsiteX12" fmla="*/ 7790688 w 10972800"/>
-              <a:gd name="connsiteY12" fmla="*/ 0 h 18288"/>
-              <a:gd name="connsiteX13" fmla="*/ 8147304 w 10972800"/>
-              <a:gd name="connsiteY13" fmla="*/ 0 h 18288"/>
-              <a:gd name="connsiteX14" fmla="*/ 9052560 w 10972800"/>
-              <a:gd name="connsiteY14" fmla="*/ 0 h 18288"/>
-              <a:gd name="connsiteX15" fmla="*/ 9409176 w 10972800"/>
-              <a:gd name="connsiteY15" fmla="*/ 0 h 18288"/>
-              <a:gd name="connsiteX16" fmla="*/ 9765792 w 10972800"/>
-              <a:gd name="connsiteY16" fmla="*/ 0 h 18288"/>
-              <a:gd name="connsiteX17" fmla="*/ 10341864 w 10972800"/>
-              <a:gd name="connsiteY17" fmla="*/ 0 h 18288"/>
-              <a:gd name="connsiteX18" fmla="*/ 10972800 w 10972800"/>
-              <a:gd name="connsiteY18" fmla="*/ 0 h 18288"/>
-              <a:gd name="connsiteX19" fmla="*/ 10972800 w 10972800"/>
-              <a:gd name="connsiteY19" fmla="*/ 18288 h 18288"/>
-              <a:gd name="connsiteX20" fmla="*/ 10177272 w 10972800"/>
-              <a:gd name="connsiteY20" fmla="*/ 18288 h 18288"/>
-              <a:gd name="connsiteX21" fmla="*/ 9820656 w 10972800"/>
-              <a:gd name="connsiteY21" fmla="*/ 18288 h 18288"/>
-              <a:gd name="connsiteX22" fmla="*/ 9464040 w 10972800"/>
-              <a:gd name="connsiteY22" fmla="*/ 18288 h 18288"/>
-              <a:gd name="connsiteX23" fmla="*/ 8778240 w 10972800"/>
-              <a:gd name="connsiteY23" fmla="*/ 18288 h 18288"/>
-              <a:gd name="connsiteX24" fmla="*/ 8421624 w 10972800"/>
-              <a:gd name="connsiteY24" fmla="*/ 18288 h 18288"/>
-              <a:gd name="connsiteX25" fmla="*/ 7735824 w 10972800"/>
-              <a:gd name="connsiteY25" fmla="*/ 18288 h 18288"/>
-              <a:gd name="connsiteX26" fmla="*/ 6940296 w 10972800"/>
-              <a:gd name="connsiteY26" fmla="*/ 18288 h 18288"/>
-              <a:gd name="connsiteX27" fmla="*/ 6254496 w 10972800"/>
-              <a:gd name="connsiteY27" fmla="*/ 18288 h 18288"/>
-              <a:gd name="connsiteX28" fmla="*/ 5458968 w 10972800"/>
-              <a:gd name="connsiteY28" fmla="*/ 18288 h 18288"/>
-              <a:gd name="connsiteX29" fmla="*/ 4663440 w 10972800"/>
-              <a:gd name="connsiteY29" fmla="*/ 18288 h 18288"/>
-              <a:gd name="connsiteX30" fmla="*/ 4306824 w 10972800"/>
-              <a:gd name="connsiteY30" fmla="*/ 18288 h 18288"/>
-              <a:gd name="connsiteX31" fmla="*/ 3840480 w 10972800"/>
-              <a:gd name="connsiteY31" fmla="*/ 18288 h 18288"/>
-              <a:gd name="connsiteX32" fmla="*/ 3264408 w 10972800"/>
-              <a:gd name="connsiteY32" fmla="*/ 18288 h 18288"/>
-              <a:gd name="connsiteX33" fmla="*/ 2578608 w 10972800"/>
-              <a:gd name="connsiteY33" fmla="*/ 18288 h 18288"/>
-              <a:gd name="connsiteX34" fmla="*/ 1673352 w 10972800"/>
-              <a:gd name="connsiteY34" fmla="*/ 18288 h 18288"/>
-              <a:gd name="connsiteX35" fmla="*/ 877824 w 10972800"/>
-              <a:gd name="connsiteY35" fmla="*/ 18288 h 18288"/>
-              <a:gd name="connsiteX36" fmla="*/ 0 w 10972800"/>
-              <a:gd name="connsiteY36" fmla="*/ 18288 h 18288"/>
-              <a:gd name="connsiteX37" fmla="*/ 0 w 10972800"/>
-              <a:gd name="connsiteY37" fmla="*/ 0 h 18288"/>
-            </a:gdLst>
-            <a:ahLst/>
-            <a:cxnLst>
-              <a:cxn ang="0">
-                <a:pos x="connsiteX0" y="connsiteY0"/>
-              </a:cxn>
-              <a:cxn ang="0">
-                <a:pos x="connsiteX1" y="connsiteY1"/>
-              </a:cxn>
-              <a:cxn ang="0">
-                <a:pos x="connsiteX2" y="connsiteY2"/>
-              </a:cxn>
-              <a:cxn ang="0">
-                <a:pos x="connsiteX3" y="connsiteY3"/>
-              </a:cxn>
-              <a:cxn ang="0">
-                <a:pos x="connsiteX4" y="connsiteY4"/>
-              </a:cxn>
-              <a:cxn ang="0">
-                <a:pos x="connsiteX5" y="connsiteY5"/>
-              </a:cxn>
-              <a:cxn ang="0">
-                <a:pos x="connsiteX6" y="connsiteY6"/>
-              </a:cxn>
-              <a:cxn ang="0">
-                <a:pos x="connsiteX7" y="connsiteY7"/>
-              </a:cxn>
-              <a:cxn ang="0">
-                <a:pos x="connsiteX8" y="connsiteY8"/>
-              </a:cxn>
-              <a:cxn ang="0">
-                <a:pos x="connsiteX9" y="connsiteY9"/>
-              </a:cxn>
-              <a:cxn ang="0">
-                <a:pos x="connsiteX10" y="connsiteY10"/>
-              </a:cxn>
-              <a:cxn ang="0">
-                <a:pos x="connsiteX11" y="connsiteY11"/>
-              </a:cxn>
-              <a:cxn ang="0">
-                <a:pos x="connsiteX12" y="connsiteY12"/>
-              </a:cxn>
-              <a:cxn ang="0">
-                <a:pos x="connsiteX13" y="connsiteY13"/>
-              </a:cxn>
-              <a:cxn ang="0">
-                <a:pos x="connsiteX14" y="connsiteY14"/>
-              </a:cxn>
-              <a:cxn ang="0">
-                <a:pos x="connsiteX15" y="connsiteY15"/>
-              </a:cxn>
-              <a:cxn ang="0">
-                <a:pos x="connsiteX16" y="connsiteY16"/>
-              </a:cxn>
-              <a:cxn ang="0">
-                <a:pos x="connsiteX17" y="connsiteY17"/>
-              </a:cxn>
-              <a:cxn ang="0">
-                <a:pos x="connsiteX18" y="connsiteY18"/>
-              </a:cxn>
-              <a:cxn ang="0">
-                <a:pos x="connsiteX19" y="connsiteY19"/>
-              </a:cxn>
-              <a:cxn ang="0">
-                <a:pos x="connsiteX20" y="connsiteY20"/>
-              </a:cxn>
-              <a:cxn ang="0">
-                <a:pos x="connsiteX21" y="connsiteY21"/>
-              </a:cxn>
-              <a:cxn ang="0">
-                <a:pos x="connsiteX22" y="connsiteY22"/>
-              </a:cxn>
-              <a:cxn ang="0">
-                <a:pos x="connsiteX23" y="connsiteY23"/>
-              </a:cxn>
-              <a:cxn ang="0">
-                <a:pos x="connsiteX24" y="connsiteY24"/>
-              </a:cxn>
-              <a:cxn ang="0">
-                <a:pos x="connsiteX25" y="connsiteY25"/>
-              </a:cxn>
-              <a:cxn ang="0">
-                <a:pos x="connsiteX26" y="connsiteY26"/>
-              </a:cxn>
-              <a:cxn ang="0">
-                <a:pos x="connsiteX27" y="connsiteY27"/>
-              </a:cxn>
-              <a:cxn ang="0">
-                <a:pos x="connsiteX28" y="connsiteY28"/>
-              </a:cxn>
-              <a:cxn ang="0">
-                <a:pos x="connsiteX29" y="connsiteY29"/>
-              </a:cxn>
-              <a:cxn ang="0">
-                <a:pos x="connsiteX30" y="connsiteY30"/>
-              </a:cxn>
-              <a:cxn ang="0">
-                <a:pos x="connsiteX31" y="connsiteY31"/>
-              </a:cxn>
-              <a:cxn ang="0">
-                <a:pos x="connsiteX32" y="connsiteY32"/>
-              </a:cxn>
-              <a:cxn ang="0">
-                <a:pos x="connsiteX33" y="connsiteY33"/>
-              </a:cxn>
-              <a:cxn ang="0">
-                <a:pos x="connsiteX34" y="connsiteY34"/>
-              </a:cxn>
-              <a:cxn ang="0">
-                <a:pos x="connsiteX35" y="connsiteY35"/>
-              </a:cxn>
-              <a:cxn ang="0">
-                <a:pos x="connsiteX36" y="connsiteY36"/>
-              </a:cxn>
-              <a:cxn ang="0">
-                <a:pos x="connsiteX37" y="connsiteY37"/>
-              </a:cxn>
-            </a:cxnLst>
-            <a:rect l="l" t="t" r="r" b="b"/>
-            <a:pathLst>
-              <a:path w="10972800" h="18288" fill="none" extrusionOk="0">
-                <a:moveTo>
-                  <a:pt x="0" y="0"/>
-                </a:moveTo>
-                <a:cubicBezTo>
-                  <a:pt x="165916" y="-1866"/>
-                  <a:pt x="188720" y="13756"/>
-                  <a:pt x="356616" y="0"/>
-                </a:cubicBezTo>
-                <a:cubicBezTo>
-                  <a:pt x="524512" y="-13756"/>
-                  <a:pt x="734781" y="8922"/>
-                  <a:pt x="1042416" y="0"/>
-                </a:cubicBezTo>
-                <a:cubicBezTo>
-                  <a:pt x="1350051" y="-8922"/>
-                  <a:pt x="1595982" y="-26315"/>
-                  <a:pt x="1947672" y="0"/>
-                </a:cubicBezTo>
-                <a:cubicBezTo>
-                  <a:pt x="2299362" y="26315"/>
-                  <a:pt x="2292691" y="-19526"/>
-                  <a:pt x="2633472" y="0"/>
-                </a:cubicBezTo>
-                <a:cubicBezTo>
-                  <a:pt x="2974253" y="19526"/>
-                  <a:pt x="2857309" y="10773"/>
-                  <a:pt x="2990088" y="0"/>
-                </a:cubicBezTo>
-                <a:cubicBezTo>
-                  <a:pt x="3122867" y="-10773"/>
-                  <a:pt x="3359343" y="7194"/>
-                  <a:pt x="3456432" y="0"/>
-                </a:cubicBezTo>
-                <a:cubicBezTo>
-                  <a:pt x="3553521" y="-7194"/>
-                  <a:pt x="4136258" y="5108"/>
-                  <a:pt x="4361688" y="0"/>
-                </a:cubicBezTo>
-                <a:cubicBezTo>
-                  <a:pt x="4587118" y="-5108"/>
-                  <a:pt x="4992424" y="-42958"/>
-                  <a:pt x="5266944" y="0"/>
-                </a:cubicBezTo>
-                <a:cubicBezTo>
-                  <a:pt x="5541464" y="42958"/>
-                  <a:pt x="5882966" y="-3430"/>
-                  <a:pt x="6172200" y="0"/>
-                </a:cubicBezTo>
-                <a:cubicBezTo>
-                  <a:pt x="6461434" y="3430"/>
-                  <a:pt x="6432127" y="6688"/>
-                  <a:pt x="6528816" y="0"/>
-                </a:cubicBezTo>
-                <a:cubicBezTo>
-                  <a:pt x="6625505" y="-6688"/>
-                  <a:pt x="6916805" y="-436"/>
-                  <a:pt x="7214616" y="0"/>
-                </a:cubicBezTo>
-                <a:cubicBezTo>
-                  <a:pt x="7512427" y="436"/>
-                  <a:pt x="7626159" y="-6909"/>
-                  <a:pt x="7790688" y="0"/>
-                </a:cubicBezTo>
-                <a:cubicBezTo>
-                  <a:pt x="7955217" y="6909"/>
-                  <a:pt x="8048891" y="15307"/>
-                  <a:pt x="8147304" y="0"/>
-                </a:cubicBezTo>
-                <a:cubicBezTo>
-                  <a:pt x="8245717" y="-15307"/>
-                  <a:pt x="8645618" y="-11734"/>
-                  <a:pt x="9052560" y="0"/>
-                </a:cubicBezTo>
-                <a:cubicBezTo>
-                  <a:pt x="9459502" y="11734"/>
-                  <a:pt x="9320584" y="8388"/>
-                  <a:pt x="9409176" y="0"/>
-                </a:cubicBezTo>
-                <a:cubicBezTo>
-                  <a:pt x="9497768" y="-8388"/>
-                  <a:pt x="9644192" y="8379"/>
-                  <a:pt x="9765792" y="0"/>
-                </a:cubicBezTo>
-                <a:cubicBezTo>
-                  <a:pt x="9887392" y="-8379"/>
-                  <a:pt x="10105220" y="-12663"/>
-                  <a:pt x="10341864" y="0"/>
-                </a:cubicBezTo>
-                <a:cubicBezTo>
-                  <a:pt x="10578508" y="12663"/>
-                  <a:pt x="10773103" y="-5786"/>
-                  <a:pt x="10972800" y="0"/>
-                </a:cubicBezTo>
-                <a:cubicBezTo>
-                  <a:pt x="10972146" y="8818"/>
-                  <a:pt x="10972240" y="13823"/>
-                  <a:pt x="10972800" y="18288"/>
-                </a:cubicBezTo>
-                <a:cubicBezTo>
-                  <a:pt x="10588778" y="31598"/>
-                  <a:pt x="10543381" y="-12698"/>
-                  <a:pt x="10177272" y="18288"/>
-                </a:cubicBezTo>
-                <a:cubicBezTo>
-                  <a:pt x="9811163" y="49274"/>
-                  <a:pt x="9996817" y="25662"/>
-                  <a:pt x="9820656" y="18288"/>
-                </a:cubicBezTo>
-                <a:cubicBezTo>
-                  <a:pt x="9644495" y="10914"/>
-                  <a:pt x="9607007" y="31631"/>
-                  <a:pt x="9464040" y="18288"/>
-                </a:cubicBezTo>
-                <a:cubicBezTo>
-                  <a:pt x="9321073" y="4945"/>
-                  <a:pt x="9114189" y="28940"/>
-                  <a:pt x="8778240" y="18288"/>
-                </a:cubicBezTo>
-                <a:cubicBezTo>
-                  <a:pt x="8442291" y="7636"/>
-                  <a:pt x="8594763" y="987"/>
-                  <a:pt x="8421624" y="18288"/>
-                </a:cubicBezTo>
-                <a:cubicBezTo>
-                  <a:pt x="8248485" y="35589"/>
-                  <a:pt x="7929515" y="37573"/>
-                  <a:pt x="7735824" y="18288"/>
-                </a:cubicBezTo>
-                <a:cubicBezTo>
-                  <a:pt x="7542133" y="-997"/>
-                  <a:pt x="7252504" y="33858"/>
-                  <a:pt x="6940296" y="18288"/>
-                </a:cubicBezTo>
-                <a:cubicBezTo>
-                  <a:pt x="6628088" y="2718"/>
-                  <a:pt x="6528503" y="48389"/>
-                  <a:pt x="6254496" y="18288"/>
-                </a:cubicBezTo>
-                <a:cubicBezTo>
-                  <a:pt x="5980489" y="-11813"/>
-                  <a:pt x="5695784" y="-3740"/>
-                  <a:pt x="5458968" y="18288"/>
-                </a:cubicBezTo>
-                <a:cubicBezTo>
-                  <a:pt x="5222152" y="40316"/>
-                  <a:pt x="5010751" y="19095"/>
-                  <a:pt x="4663440" y="18288"/>
-                </a:cubicBezTo>
-                <a:cubicBezTo>
-                  <a:pt x="4316129" y="17481"/>
-                  <a:pt x="4425552" y="1606"/>
-                  <a:pt x="4306824" y="18288"/>
-                </a:cubicBezTo>
-                <a:cubicBezTo>
-                  <a:pt x="4188096" y="34970"/>
-                  <a:pt x="3941535" y="7481"/>
-                  <a:pt x="3840480" y="18288"/>
-                </a:cubicBezTo>
-                <a:cubicBezTo>
-                  <a:pt x="3739425" y="29095"/>
-                  <a:pt x="3402388" y="17641"/>
-                  <a:pt x="3264408" y="18288"/>
-                </a:cubicBezTo>
-                <a:cubicBezTo>
-                  <a:pt x="3126428" y="18935"/>
-                  <a:pt x="2776779" y="9983"/>
-                  <a:pt x="2578608" y="18288"/>
-                </a:cubicBezTo>
-                <a:cubicBezTo>
-                  <a:pt x="2380437" y="26593"/>
-                  <a:pt x="1909468" y="25818"/>
-                  <a:pt x="1673352" y="18288"/>
-                </a:cubicBezTo>
-                <a:cubicBezTo>
-                  <a:pt x="1437236" y="10758"/>
-                  <a:pt x="1131180" y="49884"/>
-                  <a:pt x="877824" y="18288"/>
-                </a:cubicBezTo>
-                <a:cubicBezTo>
-                  <a:pt x="624468" y="-13308"/>
-                  <a:pt x="206753" y="2195"/>
-                  <a:pt x="0" y="18288"/>
-                </a:cubicBezTo>
-                <a:cubicBezTo>
-                  <a:pt x="313" y="10654"/>
-                  <a:pt x="-263" y="4056"/>
-                  <a:pt x="0" y="0"/>
-                </a:cubicBezTo>
-                <a:close/>
-              </a:path>
-              <a:path w="10972800" h="18288" stroke="0" extrusionOk="0">
-                <a:moveTo>
-                  <a:pt x="0" y="0"/>
-                </a:moveTo>
-                <a:cubicBezTo>
-                  <a:pt x="164017" y="-17675"/>
-                  <a:pt x="309425" y="9913"/>
-                  <a:pt x="466344" y="0"/>
-                </a:cubicBezTo>
-                <a:cubicBezTo>
-                  <a:pt x="623263" y="-9913"/>
-                  <a:pt x="659300" y="-14524"/>
-                  <a:pt x="822960" y="0"/>
-                </a:cubicBezTo>
-                <a:cubicBezTo>
-                  <a:pt x="986620" y="14524"/>
-                  <a:pt x="1105222" y="-16481"/>
-                  <a:pt x="1289304" y="0"/>
-                </a:cubicBezTo>
-                <a:cubicBezTo>
-                  <a:pt x="1473386" y="16481"/>
-                  <a:pt x="1693223" y="26161"/>
-                  <a:pt x="1975104" y="0"/>
-                </a:cubicBezTo>
-                <a:cubicBezTo>
-                  <a:pt x="2256985" y="-26161"/>
-                  <a:pt x="2435781" y="23061"/>
-                  <a:pt x="2770632" y="0"/>
-                </a:cubicBezTo>
-                <a:cubicBezTo>
-                  <a:pt x="3105483" y="-23061"/>
-                  <a:pt x="3247479" y="-44011"/>
-                  <a:pt x="3675888" y="0"/>
-                </a:cubicBezTo>
-                <a:cubicBezTo>
-                  <a:pt x="4104297" y="44011"/>
-                  <a:pt x="4280918" y="4017"/>
-                  <a:pt x="4581144" y="0"/>
-                </a:cubicBezTo>
-                <a:cubicBezTo>
-                  <a:pt x="4881370" y="-4017"/>
-                  <a:pt x="5021699" y="-11889"/>
-                  <a:pt x="5157216" y="0"/>
-                </a:cubicBezTo>
-                <a:cubicBezTo>
-                  <a:pt x="5292733" y="11889"/>
-                  <a:pt x="5603398" y="-17698"/>
-                  <a:pt x="5952744" y="0"/>
-                </a:cubicBezTo>
-                <a:cubicBezTo>
-                  <a:pt x="6302090" y="17698"/>
-                  <a:pt x="6353093" y="-11909"/>
-                  <a:pt x="6638544" y="0"/>
-                </a:cubicBezTo>
-                <a:cubicBezTo>
-                  <a:pt x="6923995" y="11909"/>
-                  <a:pt x="7053404" y="21630"/>
-                  <a:pt x="7214616" y="0"/>
-                </a:cubicBezTo>
-                <a:cubicBezTo>
-                  <a:pt x="7375828" y="-21630"/>
-                  <a:pt x="7837963" y="3886"/>
-                  <a:pt x="8010144" y="0"/>
-                </a:cubicBezTo>
-                <a:cubicBezTo>
-                  <a:pt x="8182325" y="-3886"/>
-                  <a:pt x="8224183" y="16009"/>
-                  <a:pt x="8366760" y="0"/>
-                </a:cubicBezTo>
-                <a:cubicBezTo>
-                  <a:pt x="8509337" y="-16009"/>
-                  <a:pt x="8687920" y="-5720"/>
-                  <a:pt x="8942832" y="0"/>
-                </a:cubicBezTo>
-                <a:cubicBezTo>
-                  <a:pt x="9197744" y="5720"/>
-                  <a:pt x="9368437" y="20479"/>
-                  <a:pt x="9628632" y="0"/>
-                </a:cubicBezTo>
-                <a:cubicBezTo>
-                  <a:pt x="9888827" y="-20479"/>
-                  <a:pt x="10560858" y="-20746"/>
-                  <a:pt x="10972800" y="0"/>
-                </a:cubicBezTo>
-                <a:cubicBezTo>
-                  <a:pt x="10972186" y="5722"/>
-                  <a:pt x="10972980" y="12495"/>
-                  <a:pt x="10972800" y="18288"/>
-                </a:cubicBezTo>
-                <a:cubicBezTo>
-                  <a:pt x="10786146" y="12536"/>
-                  <a:pt x="10623717" y="14033"/>
-                  <a:pt x="10506456" y="18288"/>
-                </a:cubicBezTo>
-                <a:cubicBezTo>
-                  <a:pt x="10389195" y="22543"/>
-                  <a:pt x="10296178" y="20107"/>
-                  <a:pt x="10149840" y="18288"/>
-                </a:cubicBezTo>
-                <a:cubicBezTo>
-                  <a:pt x="10003502" y="16469"/>
-                  <a:pt x="9767530" y="28891"/>
-                  <a:pt x="9464040" y="18288"/>
-                </a:cubicBezTo>
-                <a:cubicBezTo>
-                  <a:pt x="9160550" y="7685"/>
-                  <a:pt x="9229050" y="2659"/>
-                  <a:pt x="8997696" y="18288"/>
-                </a:cubicBezTo>
-                <a:cubicBezTo>
-                  <a:pt x="8766342" y="33917"/>
-                  <a:pt x="8340136" y="34864"/>
-                  <a:pt x="8092440" y="18288"/>
-                </a:cubicBezTo>
-                <a:cubicBezTo>
-                  <a:pt x="7844744" y="1712"/>
-                  <a:pt x="7863720" y="27405"/>
-                  <a:pt x="7735824" y="18288"/>
-                </a:cubicBezTo>
-                <a:cubicBezTo>
-                  <a:pt x="7607928" y="9171"/>
-                  <a:pt x="7323619" y="461"/>
-                  <a:pt x="7050024" y="18288"/>
-                </a:cubicBezTo>
-                <a:cubicBezTo>
-                  <a:pt x="6776429" y="36115"/>
-                  <a:pt x="6787899" y="28206"/>
-                  <a:pt x="6693408" y="18288"/>
-                </a:cubicBezTo>
-                <a:cubicBezTo>
-                  <a:pt x="6598917" y="8370"/>
-                  <a:pt x="6395231" y="19114"/>
-                  <a:pt x="6227064" y="18288"/>
-                </a:cubicBezTo>
-                <a:cubicBezTo>
-                  <a:pt x="6058897" y="17462"/>
-                  <a:pt x="5618582" y="1091"/>
-                  <a:pt x="5431536" y="18288"/>
-                </a:cubicBezTo>
-                <a:cubicBezTo>
-                  <a:pt x="5244490" y="35485"/>
-                  <a:pt x="4729797" y="-9650"/>
-                  <a:pt x="4526280" y="18288"/>
-                </a:cubicBezTo>
-                <a:cubicBezTo>
-                  <a:pt x="4322763" y="46226"/>
-                  <a:pt x="4216797" y="756"/>
-                  <a:pt x="4059936" y="18288"/>
-                </a:cubicBezTo>
-                <a:cubicBezTo>
-                  <a:pt x="3903075" y="35820"/>
-                  <a:pt x="3537912" y="42098"/>
-                  <a:pt x="3374136" y="18288"/>
-                </a:cubicBezTo>
-                <a:cubicBezTo>
-                  <a:pt x="3210360" y="-5522"/>
-                  <a:pt x="3126842" y="39135"/>
-                  <a:pt x="2907792" y="18288"/>
-                </a:cubicBezTo>
-                <a:cubicBezTo>
-                  <a:pt x="2688742" y="-2559"/>
-                  <a:pt x="2490436" y="34100"/>
-                  <a:pt x="2112264" y="18288"/>
-                </a:cubicBezTo>
-                <a:cubicBezTo>
-                  <a:pt x="1734092" y="2476"/>
-                  <a:pt x="1744622" y="-7274"/>
-                  <a:pt x="1536192" y="18288"/>
-                </a:cubicBezTo>
-                <a:cubicBezTo>
-                  <a:pt x="1327762" y="43850"/>
-                  <a:pt x="1189025" y="6435"/>
-                  <a:pt x="1069848" y="18288"/>
-                </a:cubicBezTo>
-                <a:cubicBezTo>
-                  <a:pt x="950671" y="30141"/>
-                  <a:pt x="858345" y="33684"/>
-                  <a:pt x="713232" y="18288"/>
-                </a:cubicBezTo>
-                <a:cubicBezTo>
-                  <a:pt x="568119" y="2892"/>
-                  <a:pt x="250292" y="5410"/>
-                  <a:pt x="0" y="18288"/>
-                </a:cubicBezTo>
-                <a:cubicBezTo>
-                  <a:pt x="465" y="13062"/>
-                  <a:pt x="-894" y="9029"/>
-                  <a:pt x="0" y="0"/>
-                </a:cubicBezTo>
-                <a:close/>
-              </a:path>
-            </a:pathLst>
-          </a:custGeom>
-          <a:solidFill>
-            <a:schemeClr val="accent2">
-              <a:alpha val="75000"/>
-            </a:schemeClr>
-          </a:solidFill>
-          <a:ln w="44450" cap="rnd">
-            <a:solidFill>
-              <a:schemeClr val="accent2">
-                <a:alpha val="75000"/>
-              </a:schemeClr>
-            </a:solidFill>
-            <a:round/>
-            <a:extLst>
-              <a:ext uri="{C807C97D-BFC1-408E-A445-0C87EB9F89A2}">
-                <ask:lineSketchStyleProps xmlns:ask="http://schemas.microsoft.com/office/drawing/2018/sketchyshapes" sd="2727557108">
-                  <a:prstGeom prst="rect">
-                    <a:avLst/>
-                  </a:prstGeom>
-                  <ask:type>
-                    <ask:lineSketchFreehand/>
-                  </ask:type>
-                </ask:lineSketchStyleProps>
-              </a:ext>
-            </a:extLst>
-          </a:ln>
-        </p:spPr>
-        <p:style>
-          <a:lnRef idx="2">
-            <a:schemeClr val="accent1">
-              <a:shade val="50000"/>
-            </a:schemeClr>
-          </a:lnRef>
-          <a:fillRef idx="1">
-            <a:schemeClr val="accent1"/>
-          </a:fillRef>
-          <a:effectRef idx="0">
-            <a:schemeClr val="accent1"/>
-          </a:effectRef>
-          <a:fontRef idx="minor">
-            <a:schemeClr val="lt1"/>
-          </a:fontRef>
-        </p:style>
-        <p:txBody>
-          <a:bodyPr rtlCol="0" anchor="ctr"/>
-          <a:lstStyle/>
-          <a:p>
-            <a:pPr algn="ctr"/>
-            <a:endParaRPr lang="en-US"/>
-          </a:p>
-        </p:txBody>
-      </p:sp>
-      <p:sp>
-        <p:nvSpPr>
-          <p:cNvPr id="33" name="Content Placeholder 3">
-            <a:extLst>
-              <a:ext uri="{FF2B5EF4-FFF2-40B4-BE49-F238E27FC236}">
-                <a16:creationId xmlns:a16="http://schemas.microsoft.com/office/drawing/2014/main" id="{77E2D2AC-46B3-4926-CB7E-B3BAAF19E69D}"/>
-              </a:ext>
-            </a:extLst>
-          </p:cNvPr>
-          <p:cNvSpPr>
-            <a:spLocks noGrp="1"/>
-          </p:cNvSpPr>
-          <p:nvPr>
-            <p:ph idx="1"/>
-          </p:nvPr>
-        </p:nvSpPr>
-        <p:spPr>
-          <a:xfrm>
-            <a:off x="572493" y="2071316"/>
-            <a:ext cx="10972800" cy="4119172"/>
-          </a:xfrm>
-        </p:spPr>
-        <p:txBody>
-          <a:bodyPr anchor="t">
-            <a:normAutofit lnSpcReduction="10000"/>
-          </a:bodyPr>
-          <a:lstStyle/>
-          <a:p>
-            <a:pPr marL="0" indent="0">
-              <a:buNone/>
-            </a:pPr>
-            <a:r>
-              <a:rPr lang="en-GB" sz="2000" dirty="0"/>
-              <a:t>To use SonarQube in a local environment you can use simply use </a:t>
-            </a:r>
-            <a:r>
-              <a:rPr lang="en-GB" sz="2000" dirty="0">
-                <a:hlinkClick r:id="rId2"/>
-              </a:rPr>
-              <a:t>docker</a:t>
-            </a:r>
-            <a:r>
-              <a:rPr lang="en-GB" sz="2000" dirty="0"/>
-              <a:t>. </a:t>
-            </a:r>
-          </a:p>
-          <a:p>
-            <a:pPr marL="0" indent="0">
-              <a:buNone/>
-            </a:pPr>
-            <a:r>
-              <a:rPr lang="en-GB" sz="2000" dirty="0"/>
-              <a:t>Once Docker has been installed, you can download and launch a local version of </a:t>
-            </a:r>
-            <a:r>
-              <a:rPr lang="en-GB" sz="2000" dirty="0" err="1"/>
-              <a:t>Sonarquube</a:t>
-            </a:r>
-            <a:r>
-              <a:rPr lang="en-GB" sz="2000" dirty="0"/>
-              <a:t> through the command: </a:t>
-            </a:r>
-          </a:p>
-          <a:p>
-            <a:pPr marL="0" indent="0" algn="ctr">
-              <a:buNone/>
-            </a:pPr>
-            <a:r>
-              <a:rPr lang="en-GB" b="1" i="1" dirty="0"/>
-              <a:t>docker run –d –p 9000:9000 </a:t>
-            </a:r>
-            <a:r>
-              <a:rPr lang="en-GB" b="1" i="1" dirty="0" err="1"/>
-              <a:t>sonarqube</a:t>
-            </a:r>
-            <a:endParaRPr lang="en-GB" b="1" i="1" dirty="0"/>
-          </a:p>
-          <a:p>
-            <a:pPr marL="0" indent="0">
-              <a:buNone/>
-            </a:pPr>
-            <a:endParaRPr lang="en-GB" sz="2000" dirty="0"/>
-          </a:p>
-          <a:p>
-            <a:pPr marL="0" indent="0">
-              <a:buNone/>
-            </a:pPr>
-            <a:r>
-              <a:rPr lang="en-GB" sz="2000" dirty="0"/>
-              <a:t>With this command the SonarQube image will be automatically downloaded and run. The web interface will be available at </a:t>
-            </a:r>
-            <a:r>
-              <a:rPr lang="en-GB" sz="2000" b="1" dirty="0"/>
-              <a:t>localhost:9000</a:t>
-            </a:r>
-            <a:r>
-              <a:rPr lang="en-GB" sz="2000" dirty="0"/>
-              <a:t> with default credentials </a:t>
-            </a:r>
-            <a:r>
-              <a:rPr lang="en-GB" sz="2000" b="1" dirty="0"/>
-              <a:t>admin/admin</a:t>
-            </a:r>
-          </a:p>
-          <a:p>
-            <a:pPr marL="0" indent="0">
-              <a:buNone/>
-            </a:pPr>
-            <a:endParaRPr lang="en-GB" sz="2000" dirty="0"/>
-          </a:p>
-          <a:p>
-            <a:pPr marL="0" indent="0">
-              <a:buNone/>
-            </a:pPr>
-            <a:r>
-              <a:rPr lang="en-GB" sz="2000" b="1" dirty="0"/>
-              <a:t>IMPORTANT</a:t>
-            </a:r>
-            <a:r>
-              <a:rPr lang="en-GB" sz="2000" dirty="0"/>
-              <a:t>: Actually official image of SonarQube is not supported by new silicon processor by Apple. You can run run this command instead of previous one:</a:t>
-            </a:r>
-          </a:p>
-          <a:p>
-            <a:pPr marL="0" indent="0" algn="ctr">
-              <a:buNone/>
-            </a:pPr>
-            <a:r>
-              <a:rPr lang="en-GB" b="1" i="1" dirty="0"/>
-              <a:t>docker run –d –p 9000:9000 </a:t>
-            </a:r>
-            <a:r>
-              <a:rPr lang="en-GB" b="1" i="1" dirty="0" err="1"/>
-              <a:t>mwizner</a:t>
-            </a:r>
-            <a:r>
-              <a:rPr lang="en-GB" b="1" i="1" dirty="0"/>
-              <a:t>/sonarqube</a:t>
-            </a:r>
-            <a:r>
-              <a:rPr lang="en-GB" b="1" i="1"/>
-              <a:t>:8.7.1-community</a:t>
-            </a:r>
-            <a:endParaRPr lang="en-GB" b="1" i="1" dirty="0"/>
-          </a:p>
-          <a:p>
-            <a:pPr marL="0" indent="0">
-              <a:buNone/>
-            </a:pPr>
-            <a:endParaRPr lang="en-GB" sz="2000" dirty="0"/>
-          </a:p>
-          <a:p>
-            <a:pPr marL="0" indent="0">
-              <a:buNone/>
-            </a:pPr>
-            <a:endParaRPr lang="en-GB" sz="2000" dirty="0"/>
-          </a:p>
-          <a:p>
-            <a:pPr marL="0" indent="0">
-              <a:buNone/>
-            </a:pPr>
-            <a:endParaRPr lang="en-GB" sz="2000" dirty="0"/>
-          </a:p>
-        </p:txBody>
-      </p:sp>
-      <p:pic>
-        <p:nvPicPr>
-          <p:cNvPr id="5" name="Picture 4" descr="SonarQube: un valido strumento di analisi statica del codice - Intré">
-            <a:extLst>
-              <a:ext uri="{FF2B5EF4-FFF2-40B4-BE49-F238E27FC236}">
-                <a16:creationId xmlns:a16="http://schemas.microsoft.com/office/drawing/2014/main" id="{F8915CE3-EE40-99EF-6854-3B1406BEC346}"/>
-              </a:ext>
-            </a:extLst>
-          </p:cNvPr>
-          <p:cNvPicPr>
-            <a:picLocks noChangeAspect="1" noChangeArrowheads="1"/>
-          </p:cNvPicPr>
-          <p:nvPr/>
-        </p:nvPicPr>
-        <p:blipFill>
-          <a:blip r:embed="rId3">
-            <a:extLst>
-              <a:ext uri="{28A0092B-C50C-407E-A947-70E740481C1C}">
-                <a14:useLocalDpi xmlns:a14="http://schemas.microsoft.com/office/drawing/2010/main" val="0"/>
-              </a:ext>
-            </a:extLst>
-          </a:blip>
-          <a:srcRect/>
-          <a:stretch>
-            <a:fillRect/>
-          </a:stretch>
-        </p:blipFill>
-        <p:spPr bwMode="auto">
-          <a:xfrm>
-            <a:off x="9559556" y="0"/>
-            <a:ext cx="2632444" cy="813384"/>
-          </a:xfrm>
-          <a:prstGeom prst="rect">
-            <a:avLst/>
-          </a:prstGeom>
-          <a:noFill/>
-          <a:extLst>
-            <a:ext uri="{909E8E84-426E-40DD-AFC4-6F175D3DCCD1}">
-              <a14:hiddenFill xmlns:a14="http://schemas.microsoft.com/office/drawing/2010/main">
-                <a:solidFill>
-                  <a:srgbClr val="FFFFFF"/>
-                </a:solidFill>
-              </a14:hiddenFill>
-            </a:ext>
-          </a:extLst>
-        </p:spPr>
-      </p:pic>
-      <p:pic>
-        <p:nvPicPr>
-          <p:cNvPr id="2" name="Picture 1" descr="Agile Lab">
-            <a:extLst>
-              <a:ext uri="{FF2B5EF4-FFF2-40B4-BE49-F238E27FC236}">
-                <a16:creationId xmlns:a16="http://schemas.microsoft.com/office/drawing/2014/main" id="{09677733-4396-B949-710D-E63A1F68AE1E}"/>
-              </a:ext>
-              <a:ext uri="{C183D7F6-B498-43B3-948B-1728B52AA6E4}">
-                <adec:decorative xmlns:adec="http://schemas.microsoft.com/office/drawing/2017/decorative" val="0"/>
-              </a:ext>
-            </a:extLst>
-          </p:cNvPr>
-          <p:cNvPicPr>
-            <a:picLocks noChangeAspect="1"/>
-          </p:cNvPicPr>
-          <p:nvPr/>
-        </p:nvPicPr>
-        <p:blipFill>
-          <a:blip r:embed="rId4"/>
-          <a:stretch>
-            <a:fillRect/>
-          </a:stretch>
-        </p:blipFill>
-        <p:spPr>
-          <a:xfrm>
-            <a:off x="1" y="0"/>
-            <a:ext cx="2322268" cy="641278"/>
-          </a:xfrm>
-          <a:prstGeom prst="rect">
-            <a:avLst/>
-          </a:prstGeom>
-        </p:spPr>
-      </p:pic>
-    </p:spTree>
-    <p:extLst>
-      <p:ext uri="{BB962C8B-B14F-4D97-AF65-F5344CB8AC3E}">
-        <p14:creationId xmlns:p14="http://schemas.microsoft.com/office/powerpoint/2010/main" val="618177655"/>
-      </p:ext>
-    </p:extLst>
-  </p:cSld>
-  <p:clrMapOvr>
-    <a:masterClrMapping/>
-  </p:clrMapOvr>
-</p:sld>
-</file>
-
 <file path=ppt/theme/theme1.xml><?xml version="1.0" encoding="utf-8"?>
 <a:theme xmlns:a="http://schemas.openxmlformats.org/drawingml/2006/main" name="Office Theme">
   <a:themeElements>

</xml_diff>